<commit_message>
Pindah repo ke github
</commit_message>
<xml_diff>
--- a/Materi/4-JavaScript-PP.pptx
+++ b/Materi/4-JavaScript-PP.pptx
@@ -1,49 +1,49 @@
 
 <file path=ppt/presentation.xml><?xml version="1.0" encoding="utf-8"?>
-<p:presentation xmlns:a="http://schemas.openxmlformats.org/drawingml/2006/main" xmlns:r="http://schemas.openxmlformats.org/officeDocument/2006/relationships" xmlns:p="http://schemas.openxmlformats.org/presentationml/2006/main">
+<p:presentation xmlns:a="http://schemas.openxmlformats.org/drawingml/2006/main" xmlns:r="http://schemas.openxmlformats.org/officeDocument/2006/relationships" xmlns:p="http://schemas.openxmlformats.org/presentationml/2006/main" saveSubsetFonts="1">
   <p:sldMasterIdLst>
-    <p:sldMasterId id="2147483648" r:id="rId5"/>
+    <p:sldMasterId id="2147483648" r:id="rId1"/>
   </p:sldMasterIdLst>
   <p:notesMasterIdLst>
-    <p:notesMasterId r:id="rId7"/>
+    <p:notesMasterId r:id="rId38"/>
   </p:notesMasterIdLst>
   <p:sldIdLst>
-    <p:sldId id="256" r:id="rId8"/>
-    <p:sldId id="257" r:id="rId9"/>
-    <p:sldId id="258" r:id="rId10"/>
-    <p:sldId id="259" r:id="rId11"/>
-    <p:sldId id="260" r:id="rId12"/>
-    <p:sldId id="261" r:id="rId13"/>
-    <p:sldId id="262" r:id="rId14"/>
-    <p:sldId id="263" r:id="rId15"/>
-    <p:sldId id="264" r:id="rId16"/>
-    <p:sldId id="265" r:id="rId17"/>
-    <p:sldId id="266" r:id="rId18"/>
-    <p:sldId id="267" r:id="rId19"/>
-    <p:sldId id="268" r:id="rId20"/>
-    <p:sldId id="269" r:id="rId21"/>
-    <p:sldId id="270" r:id="rId22"/>
-    <p:sldId id="271" r:id="rId23"/>
-    <p:sldId id="272" r:id="rId24"/>
-    <p:sldId id="273" r:id="rId25"/>
-    <p:sldId id="274" r:id="rId26"/>
-    <p:sldId id="275" r:id="rId27"/>
-    <p:sldId id="276" r:id="rId28"/>
-    <p:sldId id="277" r:id="rId29"/>
-    <p:sldId id="278" r:id="rId30"/>
-    <p:sldId id="279" r:id="rId31"/>
-    <p:sldId id="280" r:id="rId32"/>
-    <p:sldId id="281" r:id="rId33"/>
-    <p:sldId id="282" r:id="rId34"/>
-    <p:sldId id="283" r:id="rId35"/>
-    <p:sldId id="284" r:id="rId36"/>
-    <p:sldId id="285" r:id="rId37"/>
-    <p:sldId id="286" r:id="rId38"/>
-    <p:sldId id="287" r:id="rId39"/>
-    <p:sldId id="288" r:id="rId40"/>
-    <p:sldId id="289" r:id="rId41"/>
-    <p:sldId id="290" r:id="rId42"/>
-    <p:sldId id="291" r:id="rId43"/>
+    <p:sldId id="256" r:id="rId2"/>
+    <p:sldId id="257" r:id="rId3"/>
+    <p:sldId id="258" r:id="rId4"/>
+    <p:sldId id="259" r:id="rId5"/>
+    <p:sldId id="260" r:id="rId6"/>
+    <p:sldId id="261" r:id="rId7"/>
+    <p:sldId id="262" r:id="rId8"/>
+    <p:sldId id="263" r:id="rId9"/>
+    <p:sldId id="264" r:id="rId10"/>
+    <p:sldId id="265" r:id="rId11"/>
+    <p:sldId id="266" r:id="rId12"/>
+    <p:sldId id="267" r:id="rId13"/>
+    <p:sldId id="268" r:id="rId14"/>
+    <p:sldId id="269" r:id="rId15"/>
+    <p:sldId id="270" r:id="rId16"/>
+    <p:sldId id="271" r:id="rId17"/>
+    <p:sldId id="272" r:id="rId18"/>
+    <p:sldId id="273" r:id="rId19"/>
+    <p:sldId id="274" r:id="rId20"/>
+    <p:sldId id="275" r:id="rId21"/>
+    <p:sldId id="276" r:id="rId22"/>
+    <p:sldId id="277" r:id="rId23"/>
+    <p:sldId id="278" r:id="rId24"/>
+    <p:sldId id="279" r:id="rId25"/>
+    <p:sldId id="280" r:id="rId26"/>
+    <p:sldId id="281" r:id="rId27"/>
+    <p:sldId id="282" r:id="rId28"/>
+    <p:sldId id="283" r:id="rId29"/>
+    <p:sldId id="284" r:id="rId30"/>
+    <p:sldId id="285" r:id="rId31"/>
+    <p:sldId id="286" r:id="rId32"/>
+    <p:sldId id="287" r:id="rId33"/>
+    <p:sldId id="288" r:id="rId34"/>
+    <p:sldId id="289" r:id="rId35"/>
+    <p:sldId id="290" r:id="rId36"/>
+    <p:sldId id="291" r:id="rId37"/>
   </p:sldIdLst>
   <p:sldSz cx="13004800" cy="9753600"/>
   <p:notesSz cx="6858000" cy="9144000"/>
@@ -63,7 +63,7 @@
       <a:buFontTx/>
       <a:buNone/>
       <a:tabLst/>
-      <a:defRPr b="0" baseline="0" cap="none" i="0" spc="0" strike="noStrike" sz="1800" u="none" kumimoji="0" normalizeH="0">
+      <a:defRPr kumimoji="0" sz="1800" b="0" i="0" u="none" strike="noStrike" cap="none" spc="0" normalizeH="0" baseline="0">
         <a:ln>
           <a:noFill/>
         </a:ln>
@@ -89,7 +89,7 @@
       <a:buFontTx/>
       <a:buNone/>
       <a:tabLst/>
-      <a:defRPr b="0" baseline="0" cap="none" i="0" spc="0" strike="noStrike" sz="3600" u="none" kumimoji="0" normalizeH="0">
+      <a:defRPr kumimoji="0" sz="3600" b="0" i="0" u="none" strike="noStrike" cap="none" spc="0" normalizeH="0" baseline="0">
         <a:ln>
           <a:noFill/>
         </a:ln>
@@ -119,7 +119,7 @@
       <a:buFontTx/>
       <a:buNone/>
       <a:tabLst/>
-      <a:defRPr b="0" baseline="0" cap="none" i="0" spc="0" strike="noStrike" sz="3600" u="none" kumimoji="0" normalizeH="0">
+      <a:defRPr kumimoji="0" sz="3600" b="0" i="0" u="none" strike="noStrike" cap="none" spc="0" normalizeH="0" baseline="0">
         <a:ln>
           <a:noFill/>
         </a:ln>
@@ -149,7 +149,7 @@
       <a:buFontTx/>
       <a:buNone/>
       <a:tabLst/>
-      <a:defRPr b="0" baseline="0" cap="none" i="0" spc="0" strike="noStrike" sz="3600" u="none" kumimoji="0" normalizeH="0">
+      <a:defRPr kumimoji="0" sz="3600" b="0" i="0" u="none" strike="noStrike" cap="none" spc="0" normalizeH="0" baseline="0">
         <a:ln>
           <a:noFill/>
         </a:ln>
@@ -179,7 +179,7 @@
       <a:buFontTx/>
       <a:buNone/>
       <a:tabLst/>
-      <a:defRPr b="0" baseline="0" cap="none" i="0" spc="0" strike="noStrike" sz="3600" u="none" kumimoji="0" normalizeH="0">
+      <a:defRPr kumimoji="0" sz="3600" b="0" i="0" u="none" strike="noStrike" cap="none" spc="0" normalizeH="0" baseline="0">
         <a:ln>
           <a:noFill/>
         </a:ln>
@@ -209,7 +209,7 @@
       <a:buFontTx/>
       <a:buNone/>
       <a:tabLst/>
-      <a:defRPr b="0" baseline="0" cap="none" i="0" spc="0" strike="noStrike" sz="3600" u="none" kumimoji="0" normalizeH="0">
+      <a:defRPr kumimoji="0" sz="3600" b="0" i="0" u="none" strike="noStrike" cap="none" spc="0" normalizeH="0" baseline="0">
         <a:ln>
           <a:noFill/>
         </a:ln>
@@ -239,7 +239,7 @@
       <a:buFontTx/>
       <a:buNone/>
       <a:tabLst/>
-      <a:defRPr b="0" baseline="0" cap="none" i="0" spc="0" strike="noStrike" sz="3600" u="none" kumimoji="0" normalizeH="0">
+      <a:defRPr kumimoji="0" sz="3600" b="0" i="0" u="none" strike="noStrike" cap="none" spc="0" normalizeH="0" baseline="0">
         <a:ln>
           <a:noFill/>
         </a:ln>
@@ -269,7 +269,7 @@
       <a:buFontTx/>
       <a:buNone/>
       <a:tabLst/>
-      <a:defRPr b="0" baseline="0" cap="none" i="0" spc="0" strike="noStrike" sz="3600" u="none" kumimoji="0" normalizeH="0">
+      <a:defRPr kumimoji="0" sz="3600" b="0" i="0" u="none" strike="noStrike" cap="none" spc="0" normalizeH="0" baseline="0">
         <a:ln>
           <a:noFill/>
         </a:ln>
@@ -299,7 +299,7 @@
       <a:buFontTx/>
       <a:buNone/>
       <a:tabLst/>
-      <a:defRPr b="0" baseline="0" cap="none" i="0" spc="0" strike="noStrike" sz="3600" u="none" kumimoji="0" normalizeH="0">
+      <a:defRPr kumimoji="0" sz="3600" b="0" i="0" u="none" strike="noStrike" cap="none" spc="0" normalizeH="0" baseline="0">
         <a:ln>
           <a:noFill/>
         </a:ln>
@@ -329,7 +329,7 @@
       <a:buFontTx/>
       <a:buNone/>
       <a:tabLst/>
-      <a:defRPr b="0" baseline="0" cap="none" i="0" spc="0" strike="noStrike" sz="3600" u="none" kumimoji="0" normalizeH="0">
+      <a:defRPr kumimoji="0" sz="3600" b="0" i="0" u="none" strike="noStrike" cap="none" spc="0" normalizeH="0" baseline="0">
         <a:ln>
           <a:noFill/>
         </a:ln>
@@ -348,13 +348,14 @@
 </p:presentation>
 </file>
 
-<file path=ppt/commentAuthors.xml><?xml version="1.0" encoding="utf-8"?>
-<p:cmAuthorLst xmlns:a="http://schemas.openxmlformats.org/drawingml/2006/main" xmlns:r="http://schemas.openxmlformats.org/officeDocument/2006/relationships" xmlns:p="http://schemas.openxmlformats.org/presentationml/2006/main"/>
-</file>
-
 <file path=ppt/notesMasters/notesMaster1.xml><?xml version="1.0" encoding="utf-8"?>
 <p:notesMaster xmlns:a="http://schemas.openxmlformats.org/drawingml/2006/main" xmlns:r="http://schemas.openxmlformats.org/officeDocument/2006/relationships" xmlns:p="http://schemas.openxmlformats.org/presentationml/2006/main">
   <p:cSld>
+    <p:bg>
+      <p:bgRef idx="1001">
+        <a:schemeClr val="bg1"/>
+      </p:bgRef>
+    </p:bg>
     <p:spTree>
       <p:nvGrpSpPr>
         <p:cNvPr id="1" name=""/>
@@ -372,7 +373,9 @@
       <p:sp>
         <p:nvSpPr>
           <p:cNvPr id="116" name="Shape 116"/>
-          <p:cNvSpPr/>
+          <p:cNvSpPr>
+            <a:spLocks noGrp="1" noRot="1" noChangeAspect="1"/>
+          </p:cNvSpPr>
           <p:nvPr>
             <p:ph type="sldImg"/>
           </p:nvPr>
@@ -390,14 +393,16 @@
           <a:bodyPr/>
           <a:lstStyle/>
           <a:p>
-            <a:pPr/>
+            <a:endParaRPr/>
           </a:p>
         </p:txBody>
       </p:sp>
       <p:sp>
         <p:nvSpPr>
           <p:cNvPr id="117" name="Shape 117"/>
-          <p:cNvSpPr/>
+          <p:cNvSpPr>
+            <a:spLocks noGrp="1"/>
+          </p:cNvSpPr>
           <p:nvPr>
             <p:ph type="body" sz="quarter" idx="1"/>
           </p:nvPr>
@@ -415,11 +420,16 @@
           <a:bodyPr/>
           <a:lstStyle/>
           <a:p>
-            <a:pPr/>
+            <a:endParaRPr/>
           </a:p>
         </p:txBody>
       </p:sp>
     </p:spTree>
+    <p:extLst>
+      <p:ext uri="{BB962C8B-B14F-4D97-AF65-F5344CB8AC3E}">
+        <p14:creationId xmlns:p14="http://schemas.microsoft.com/office/powerpoint/2010/main" val="1512637199"/>
+      </p:ext>
+    </p:extLst>
   </p:cSld>
   <p:clrMap bg1="lt1" tx1="dk1" bg2="lt2" tx2="dk2" accent1="accent1" accent2="accent2" accent3="accent3" accent4="accent4" accent5="accent5" accent6="accent6" hlink="hlink" folHlink="folHlink"/>
   <p:notesStyle>
@@ -527,7 +537,7 @@
 </file>
 
 <file path=ppt/slideLayouts/slideLayout1.xml><?xml version="1.0" encoding="utf-8"?>
-<p:sldLayout xmlns:a="http://schemas.openxmlformats.org/drawingml/2006/main" xmlns:r="http://schemas.openxmlformats.org/officeDocument/2006/relationships" xmlns:p="http://schemas.openxmlformats.org/presentationml/2006/main" type="title" showMasterSp="1" showMasterPhAnim="1">
+<p:sldLayout xmlns:a="http://schemas.openxmlformats.org/drawingml/2006/main" xmlns:r="http://schemas.openxmlformats.org/officeDocument/2006/relationships" xmlns:p="http://schemas.openxmlformats.org/presentationml/2006/main" type="title">
   <p:cSld name="Title &amp; Subtitle">
     <p:spTree>
       <p:nvGrpSpPr>
@@ -546,7 +556,9 @@
       <p:sp>
         <p:nvSpPr>
           <p:cNvPr id="11" name="Shape 11"/>
-          <p:cNvSpPr/>
+          <p:cNvSpPr>
+            <a:spLocks noGrp="1"/>
+          </p:cNvSpPr>
           <p:nvPr>
             <p:ph type="title"/>
           </p:nvPr>
@@ -564,7 +576,6 @@
           <a:bodyPr anchor="b"/>
           <a:lstStyle/>
           <a:p>
-            <a:pPr/>
             <a:r>
               <a:t>Title Text</a:t>
             </a:r>
@@ -574,7 +585,9 @@
       <p:sp>
         <p:nvSpPr>
           <p:cNvPr id="12" name="Shape 12"/>
-          <p:cNvSpPr/>
+          <p:cNvSpPr>
+            <a:spLocks noGrp="1"/>
+          </p:cNvSpPr>
           <p:nvPr>
             <p:ph type="body" sz="quarter" idx="1"/>
           </p:nvPr>
@@ -633,7 +646,6 @@
             </a:lvl5pPr>
           </a:lstStyle>
           <a:p>
-            <a:pPr/>
             <a:r>
               <a:t>Body Level One</a:t>
             </a:r>
@@ -667,7 +679,9 @@
       <p:sp>
         <p:nvSpPr>
           <p:cNvPr id="13" name="Shape 13"/>
-          <p:cNvSpPr/>
+          <p:cNvSpPr>
+            <a:spLocks noGrp="1"/>
+          </p:cNvSpPr>
           <p:nvPr>
             <p:ph type="sldNum" sz="quarter" idx="2"/>
           </p:nvPr>
@@ -681,8 +695,10 @@
           <a:bodyPr/>
           <a:lstStyle/>
           <a:p>
-            <a:pPr/>
-            <a:fld id="{86CB4B4D-7CA3-9044-876B-883B54F8677D}" type="slidenum"/>
+            <a:fld id="{86CB4B4D-7CA3-9044-876B-883B54F8677D}" type="slidenum">
+              <a:t>‹#›</a:t>
+            </a:fld>
+            <a:endParaRPr/>
           </a:p>
         </p:txBody>
       </p:sp>
@@ -691,12 +707,12 @@
   <p:clrMapOvr>
     <a:masterClrMapping/>
   </p:clrMapOvr>
-  <p:transition xmlns:p14="http://schemas.microsoft.com/office/powerpoint/2010/main" spd="med" advClick="1"/>
+  <p:transition spd="med"/>
 </p:sldLayout>
 </file>
 
 <file path=ppt/slideLayouts/slideLayout10.xml><?xml version="1.0" encoding="utf-8"?>
-<p:sldLayout xmlns:a="http://schemas.openxmlformats.org/drawingml/2006/main" xmlns:r="http://schemas.openxmlformats.org/officeDocument/2006/relationships" xmlns:p="http://schemas.openxmlformats.org/presentationml/2006/main" type="tx" showMasterSp="1" showMasterPhAnim="1">
+<p:sldLayout xmlns:a="http://schemas.openxmlformats.org/drawingml/2006/main" xmlns:r="http://schemas.openxmlformats.org/officeDocument/2006/relationships" xmlns:p="http://schemas.openxmlformats.org/presentationml/2006/main" type="tx">
   <p:cSld name="Quote">
     <p:spTree>
       <p:nvGrpSpPr>
@@ -715,7 +731,9 @@
       <p:sp>
         <p:nvSpPr>
           <p:cNvPr id="93" name="Shape 93"/>
-          <p:cNvSpPr/>
+          <p:cNvSpPr>
+            <a:spLocks noGrp="1"/>
+          </p:cNvSpPr>
           <p:nvPr>
             <p:ph type="body" sz="quarter" idx="13"/>
           </p:nvPr>
@@ -744,7 +762,6 @@
             </a:lvl1pPr>
           </a:lstStyle>
           <a:p>
-            <a:pPr/>
             <a:r>
               <a:t>–Johnny Appleseed</a:t>
             </a:r>
@@ -754,7 +771,9 @@
       <p:sp>
         <p:nvSpPr>
           <p:cNvPr id="94" name="Shape 94"/>
-          <p:cNvSpPr/>
+          <p:cNvSpPr>
+            <a:spLocks noGrp="1"/>
+          </p:cNvSpPr>
           <p:nvPr>
             <p:ph type="body" sz="quarter" idx="14"/>
           </p:nvPr>
@@ -783,7 +802,6 @@
             </a:lvl1pPr>
           </a:lstStyle>
           <a:p>
-            <a:pPr/>
             <a:r>
               <a:t>“Type a quote here.” </a:t>
             </a:r>
@@ -793,7 +811,9 @@
       <p:sp>
         <p:nvSpPr>
           <p:cNvPr id="95" name="Shape 95"/>
-          <p:cNvSpPr/>
+          <p:cNvSpPr>
+            <a:spLocks noGrp="1"/>
+          </p:cNvSpPr>
           <p:nvPr>
             <p:ph type="sldNum" sz="quarter" idx="2"/>
           </p:nvPr>
@@ -807,8 +827,10 @@
           <a:bodyPr/>
           <a:lstStyle/>
           <a:p>
-            <a:pPr/>
-            <a:fld id="{86CB4B4D-7CA3-9044-876B-883B54F8677D}" type="slidenum"/>
+            <a:fld id="{86CB4B4D-7CA3-9044-876B-883B54F8677D}" type="slidenum">
+              <a:t>‹#›</a:t>
+            </a:fld>
+            <a:endParaRPr/>
           </a:p>
         </p:txBody>
       </p:sp>
@@ -817,12 +839,12 @@
   <p:clrMapOvr>
     <a:masterClrMapping/>
   </p:clrMapOvr>
-  <p:transition xmlns:p14="http://schemas.microsoft.com/office/powerpoint/2010/main" spd="med" advClick="1"/>
+  <p:transition spd="med"/>
 </p:sldLayout>
 </file>
 
 <file path=ppt/slideLayouts/slideLayout11.xml><?xml version="1.0" encoding="utf-8"?>
-<p:sldLayout xmlns:a="http://schemas.openxmlformats.org/drawingml/2006/main" xmlns:r="http://schemas.openxmlformats.org/officeDocument/2006/relationships" xmlns:p="http://schemas.openxmlformats.org/presentationml/2006/main" type="tx" showMasterSp="1" showMasterPhAnim="1">
+<p:sldLayout xmlns:a="http://schemas.openxmlformats.org/drawingml/2006/main" xmlns:r="http://schemas.openxmlformats.org/officeDocument/2006/relationships" xmlns:p="http://schemas.openxmlformats.org/presentationml/2006/main" type="tx">
   <p:cSld name="Photo">
     <p:spTree>
       <p:nvGrpSpPr>
@@ -841,7 +863,9 @@
       <p:sp>
         <p:nvSpPr>
           <p:cNvPr id="102" name="Shape 102"/>
-          <p:cNvSpPr/>
+          <p:cNvSpPr>
+            <a:spLocks noGrp="1"/>
+          </p:cNvSpPr>
           <p:nvPr>
             <p:ph type="pic" idx="13"/>
           </p:nvPr>
@@ -861,14 +885,16 @@
           </a:bodyPr>
           <a:lstStyle/>
           <a:p>
-            <a:pPr/>
+            <a:endParaRPr/>
           </a:p>
         </p:txBody>
       </p:sp>
       <p:sp>
         <p:nvSpPr>
           <p:cNvPr id="103" name="Shape 103"/>
-          <p:cNvSpPr/>
+          <p:cNvSpPr>
+            <a:spLocks noGrp="1"/>
+          </p:cNvSpPr>
           <p:nvPr>
             <p:ph type="sldNum" sz="quarter" idx="2"/>
           </p:nvPr>
@@ -882,8 +908,10 @@
           <a:bodyPr/>
           <a:lstStyle/>
           <a:p>
-            <a:pPr/>
-            <a:fld id="{86CB4B4D-7CA3-9044-876B-883B54F8677D}" type="slidenum"/>
+            <a:fld id="{86CB4B4D-7CA3-9044-876B-883B54F8677D}" type="slidenum">
+              <a:t>‹#›</a:t>
+            </a:fld>
+            <a:endParaRPr/>
           </a:p>
         </p:txBody>
       </p:sp>
@@ -892,12 +920,12 @@
   <p:clrMapOvr>
     <a:masterClrMapping/>
   </p:clrMapOvr>
-  <p:transition xmlns:p14="http://schemas.microsoft.com/office/powerpoint/2010/main" spd="med" advClick="1"/>
+  <p:transition spd="med"/>
 </p:sldLayout>
 </file>
 
 <file path=ppt/slideLayouts/slideLayout12.xml><?xml version="1.0" encoding="utf-8"?>
-<p:sldLayout xmlns:a="http://schemas.openxmlformats.org/drawingml/2006/main" xmlns:r="http://schemas.openxmlformats.org/officeDocument/2006/relationships" xmlns:p="http://schemas.openxmlformats.org/presentationml/2006/main" type="tx" showMasterSp="1" showMasterPhAnim="1">
+<p:sldLayout xmlns:a="http://schemas.openxmlformats.org/drawingml/2006/main" xmlns:r="http://schemas.openxmlformats.org/officeDocument/2006/relationships" xmlns:p="http://schemas.openxmlformats.org/presentationml/2006/main" type="tx">
   <p:cSld name="Blank">
     <p:spTree>
       <p:nvGrpSpPr>
@@ -916,7 +944,9 @@
       <p:sp>
         <p:nvSpPr>
           <p:cNvPr id="110" name="Shape 110"/>
-          <p:cNvSpPr/>
+          <p:cNvSpPr>
+            <a:spLocks noGrp="1"/>
+          </p:cNvSpPr>
           <p:nvPr>
             <p:ph type="sldNum" sz="quarter" idx="2"/>
           </p:nvPr>
@@ -930,8 +960,10 @@
           <a:bodyPr/>
           <a:lstStyle/>
           <a:p>
-            <a:pPr/>
-            <a:fld id="{86CB4B4D-7CA3-9044-876B-883B54F8677D}" type="slidenum"/>
+            <a:fld id="{86CB4B4D-7CA3-9044-876B-883B54F8677D}" type="slidenum">
+              <a:t>‹#›</a:t>
+            </a:fld>
+            <a:endParaRPr/>
           </a:p>
         </p:txBody>
       </p:sp>
@@ -940,12 +972,12 @@
   <p:clrMapOvr>
     <a:masterClrMapping/>
   </p:clrMapOvr>
-  <p:transition xmlns:p14="http://schemas.microsoft.com/office/powerpoint/2010/main" spd="med" advClick="1"/>
+  <p:transition spd="med"/>
 </p:sldLayout>
 </file>
 
 <file path=ppt/slideLayouts/slideLayout2.xml><?xml version="1.0" encoding="utf-8"?>
-<p:sldLayout xmlns:a="http://schemas.openxmlformats.org/drawingml/2006/main" xmlns:r="http://schemas.openxmlformats.org/officeDocument/2006/relationships" xmlns:p="http://schemas.openxmlformats.org/presentationml/2006/main" type="tx" showMasterSp="1" showMasterPhAnim="1">
+<p:sldLayout xmlns:a="http://schemas.openxmlformats.org/drawingml/2006/main" xmlns:r="http://schemas.openxmlformats.org/officeDocument/2006/relationships" xmlns:p="http://schemas.openxmlformats.org/presentationml/2006/main" type="tx">
   <p:cSld name="Photo - Horizontal">
     <p:spTree>
       <p:nvGrpSpPr>
@@ -964,7 +996,9 @@
       <p:sp>
         <p:nvSpPr>
           <p:cNvPr id="20" name="Shape 20"/>
-          <p:cNvSpPr/>
+          <p:cNvSpPr>
+            <a:spLocks noGrp="1"/>
+          </p:cNvSpPr>
           <p:nvPr>
             <p:ph type="pic" idx="13"/>
           </p:nvPr>
@@ -984,14 +1018,16 @@
           </a:bodyPr>
           <a:lstStyle/>
           <a:p>
-            <a:pPr/>
+            <a:endParaRPr/>
           </a:p>
         </p:txBody>
       </p:sp>
       <p:sp>
         <p:nvSpPr>
           <p:cNvPr id="21" name="Shape 21"/>
-          <p:cNvSpPr/>
+          <p:cNvSpPr>
+            <a:spLocks noGrp="1"/>
+          </p:cNvSpPr>
           <p:nvPr>
             <p:ph type="title"/>
           </p:nvPr>
@@ -1009,7 +1045,6 @@
           <a:bodyPr anchor="b"/>
           <a:lstStyle/>
           <a:p>
-            <a:pPr/>
             <a:r>
               <a:t>Title Text</a:t>
             </a:r>
@@ -1019,7 +1054,9 @@
       <p:sp>
         <p:nvSpPr>
           <p:cNvPr id="22" name="Shape 22"/>
-          <p:cNvSpPr/>
+          <p:cNvSpPr>
+            <a:spLocks noGrp="1"/>
+          </p:cNvSpPr>
           <p:nvPr>
             <p:ph type="body" sz="quarter" idx="1"/>
           </p:nvPr>
@@ -1078,7 +1115,6 @@
             </a:lvl5pPr>
           </a:lstStyle>
           <a:p>
-            <a:pPr/>
             <a:r>
               <a:t>Body Level One</a:t>
             </a:r>
@@ -1112,7 +1148,9 @@
       <p:sp>
         <p:nvSpPr>
           <p:cNvPr id="23" name="Shape 23"/>
-          <p:cNvSpPr/>
+          <p:cNvSpPr>
+            <a:spLocks noGrp="1"/>
+          </p:cNvSpPr>
           <p:nvPr>
             <p:ph type="sldNum" sz="quarter" idx="2"/>
           </p:nvPr>
@@ -1130,8 +1168,10 @@
           <a:bodyPr/>
           <a:lstStyle/>
           <a:p>
-            <a:pPr/>
-            <a:fld id="{86CB4B4D-7CA3-9044-876B-883B54F8677D}" type="slidenum"/>
+            <a:fld id="{86CB4B4D-7CA3-9044-876B-883B54F8677D}" type="slidenum">
+              <a:t>‹#›</a:t>
+            </a:fld>
+            <a:endParaRPr/>
           </a:p>
         </p:txBody>
       </p:sp>
@@ -1140,12 +1180,12 @@
   <p:clrMapOvr>
     <a:masterClrMapping/>
   </p:clrMapOvr>
-  <p:transition xmlns:p14="http://schemas.microsoft.com/office/powerpoint/2010/main" spd="med" advClick="1"/>
+  <p:transition spd="med"/>
 </p:sldLayout>
 </file>
 
 <file path=ppt/slideLayouts/slideLayout3.xml><?xml version="1.0" encoding="utf-8"?>
-<p:sldLayout xmlns:a="http://schemas.openxmlformats.org/drawingml/2006/main" xmlns:r="http://schemas.openxmlformats.org/officeDocument/2006/relationships" xmlns:p="http://schemas.openxmlformats.org/presentationml/2006/main" type="tx" showMasterSp="1" showMasterPhAnim="1">
+<p:sldLayout xmlns:a="http://schemas.openxmlformats.org/drawingml/2006/main" xmlns:r="http://schemas.openxmlformats.org/officeDocument/2006/relationships" xmlns:p="http://schemas.openxmlformats.org/presentationml/2006/main" type="tx">
   <p:cSld name="Title - Center">
     <p:spTree>
       <p:nvGrpSpPr>
@@ -1164,7 +1204,9 @@
       <p:sp>
         <p:nvSpPr>
           <p:cNvPr id="30" name="Shape 30"/>
-          <p:cNvSpPr/>
+          <p:cNvSpPr>
+            <a:spLocks noGrp="1"/>
+          </p:cNvSpPr>
           <p:nvPr>
             <p:ph type="title"/>
           </p:nvPr>
@@ -1182,7 +1224,6 @@
           <a:bodyPr/>
           <a:lstStyle/>
           <a:p>
-            <a:pPr/>
             <a:r>
               <a:t>Title Text</a:t>
             </a:r>
@@ -1192,7 +1233,9 @@
       <p:sp>
         <p:nvSpPr>
           <p:cNvPr id="31" name="Shape 31"/>
-          <p:cNvSpPr/>
+          <p:cNvSpPr>
+            <a:spLocks noGrp="1"/>
+          </p:cNvSpPr>
           <p:nvPr>
             <p:ph type="sldNum" sz="quarter" idx="2"/>
           </p:nvPr>
@@ -1206,8 +1249,10 @@
           <a:bodyPr/>
           <a:lstStyle/>
           <a:p>
-            <a:pPr/>
-            <a:fld id="{86CB4B4D-7CA3-9044-876B-883B54F8677D}" type="slidenum"/>
+            <a:fld id="{86CB4B4D-7CA3-9044-876B-883B54F8677D}" type="slidenum">
+              <a:t>‹#›</a:t>
+            </a:fld>
+            <a:endParaRPr/>
           </a:p>
         </p:txBody>
       </p:sp>
@@ -1216,12 +1261,12 @@
   <p:clrMapOvr>
     <a:masterClrMapping/>
   </p:clrMapOvr>
-  <p:transition xmlns:p14="http://schemas.microsoft.com/office/powerpoint/2010/main" spd="med" advClick="1"/>
+  <p:transition spd="med"/>
 </p:sldLayout>
 </file>
 
 <file path=ppt/slideLayouts/slideLayout4.xml><?xml version="1.0" encoding="utf-8"?>
-<p:sldLayout xmlns:a="http://schemas.openxmlformats.org/drawingml/2006/main" xmlns:r="http://schemas.openxmlformats.org/officeDocument/2006/relationships" xmlns:p="http://schemas.openxmlformats.org/presentationml/2006/main" type="tx" showMasterSp="1" showMasterPhAnim="1">
+<p:sldLayout xmlns:a="http://schemas.openxmlformats.org/drawingml/2006/main" xmlns:r="http://schemas.openxmlformats.org/officeDocument/2006/relationships" xmlns:p="http://schemas.openxmlformats.org/presentationml/2006/main" type="tx">
   <p:cSld name="Photo - Vertical">
     <p:spTree>
       <p:nvGrpSpPr>
@@ -1240,7 +1285,9 @@
       <p:sp>
         <p:nvSpPr>
           <p:cNvPr id="38" name="Shape 38"/>
-          <p:cNvSpPr/>
+          <p:cNvSpPr>
+            <a:spLocks noGrp="1"/>
+          </p:cNvSpPr>
           <p:nvPr>
             <p:ph type="pic" sz="half" idx="13"/>
           </p:nvPr>
@@ -1260,14 +1307,16 @@
           </a:bodyPr>
           <a:lstStyle/>
           <a:p>
-            <a:pPr/>
+            <a:endParaRPr/>
           </a:p>
         </p:txBody>
       </p:sp>
       <p:sp>
         <p:nvSpPr>
           <p:cNvPr id="39" name="Shape 39"/>
-          <p:cNvSpPr/>
+          <p:cNvSpPr>
+            <a:spLocks noGrp="1"/>
+          </p:cNvSpPr>
           <p:nvPr>
             <p:ph type="title"/>
           </p:nvPr>
@@ -1289,7 +1338,6 @@
             </a:lvl1pPr>
           </a:lstStyle>
           <a:p>
-            <a:pPr/>
             <a:r>
               <a:t>Title Text</a:t>
             </a:r>
@@ -1299,7 +1347,9 @@
       <p:sp>
         <p:nvSpPr>
           <p:cNvPr id="40" name="Shape 40"/>
-          <p:cNvSpPr/>
+          <p:cNvSpPr>
+            <a:spLocks noGrp="1"/>
+          </p:cNvSpPr>
           <p:nvPr>
             <p:ph type="body" sz="quarter" idx="1"/>
           </p:nvPr>
@@ -1358,7 +1408,6 @@
             </a:lvl5pPr>
           </a:lstStyle>
           <a:p>
-            <a:pPr/>
             <a:r>
               <a:t>Body Level One</a:t>
             </a:r>
@@ -1392,7 +1441,9 @@
       <p:sp>
         <p:nvSpPr>
           <p:cNvPr id="41" name="Shape 41"/>
-          <p:cNvSpPr/>
+          <p:cNvSpPr>
+            <a:spLocks noGrp="1"/>
+          </p:cNvSpPr>
           <p:nvPr>
             <p:ph type="sldNum" sz="quarter" idx="2"/>
           </p:nvPr>
@@ -1406,8 +1457,10 @@
           <a:bodyPr/>
           <a:lstStyle/>
           <a:p>
-            <a:pPr/>
-            <a:fld id="{86CB4B4D-7CA3-9044-876B-883B54F8677D}" type="slidenum"/>
+            <a:fld id="{86CB4B4D-7CA3-9044-876B-883B54F8677D}" type="slidenum">
+              <a:t>‹#›</a:t>
+            </a:fld>
+            <a:endParaRPr/>
           </a:p>
         </p:txBody>
       </p:sp>
@@ -1416,12 +1469,12 @@
   <p:clrMapOvr>
     <a:masterClrMapping/>
   </p:clrMapOvr>
-  <p:transition xmlns:p14="http://schemas.microsoft.com/office/powerpoint/2010/main" spd="med" advClick="1"/>
+  <p:transition spd="med"/>
 </p:sldLayout>
 </file>
 
 <file path=ppt/slideLayouts/slideLayout5.xml><?xml version="1.0" encoding="utf-8"?>
-<p:sldLayout xmlns:a="http://schemas.openxmlformats.org/drawingml/2006/main" xmlns:r="http://schemas.openxmlformats.org/officeDocument/2006/relationships" xmlns:p="http://schemas.openxmlformats.org/presentationml/2006/main" type="tx" showMasterSp="1" showMasterPhAnim="1">
+<p:sldLayout xmlns:a="http://schemas.openxmlformats.org/drawingml/2006/main" xmlns:r="http://schemas.openxmlformats.org/officeDocument/2006/relationships" xmlns:p="http://schemas.openxmlformats.org/presentationml/2006/main" type="tx">
   <p:cSld name="Title - Top">
     <p:spTree>
       <p:nvGrpSpPr>
@@ -1440,7 +1493,9 @@
       <p:sp>
         <p:nvSpPr>
           <p:cNvPr id="48" name="Shape 48"/>
-          <p:cNvSpPr/>
+          <p:cNvSpPr>
+            <a:spLocks noGrp="1"/>
+          </p:cNvSpPr>
           <p:nvPr>
             <p:ph type="title"/>
           </p:nvPr>
@@ -1454,7 +1509,6 @@
           <a:bodyPr/>
           <a:lstStyle/>
           <a:p>
-            <a:pPr/>
             <a:r>
               <a:t>Title Text</a:t>
             </a:r>
@@ -1464,7 +1518,9 @@
       <p:sp>
         <p:nvSpPr>
           <p:cNvPr id="49" name="Shape 49"/>
-          <p:cNvSpPr/>
+          <p:cNvSpPr>
+            <a:spLocks noGrp="1"/>
+          </p:cNvSpPr>
           <p:nvPr>
             <p:ph type="sldNum" sz="quarter" idx="2"/>
           </p:nvPr>
@@ -1478,8 +1534,10 @@
           <a:bodyPr/>
           <a:lstStyle/>
           <a:p>
-            <a:pPr/>
-            <a:fld id="{86CB4B4D-7CA3-9044-876B-883B54F8677D}" type="slidenum"/>
+            <a:fld id="{86CB4B4D-7CA3-9044-876B-883B54F8677D}" type="slidenum">
+              <a:t>‹#›</a:t>
+            </a:fld>
+            <a:endParaRPr/>
           </a:p>
         </p:txBody>
       </p:sp>
@@ -1488,12 +1546,12 @@
   <p:clrMapOvr>
     <a:masterClrMapping/>
   </p:clrMapOvr>
-  <p:transition xmlns:p14="http://schemas.microsoft.com/office/powerpoint/2010/main" spd="med" advClick="1"/>
+  <p:transition spd="med"/>
 </p:sldLayout>
 </file>
 
 <file path=ppt/slideLayouts/slideLayout6.xml><?xml version="1.0" encoding="utf-8"?>
-<p:sldLayout xmlns:a="http://schemas.openxmlformats.org/drawingml/2006/main" xmlns:r="http://schemas.openxmlformats.org/officeDocument/2006/relationships" xmlns:p="http://schemas.openxmlformats.org/presentationml/2006/main" type="tx" showMasterSp="1" showMasterPhAnim="1">
+<p:sldLayout xmlns:a="http://schemas.openxmlformats.org/drawingml/2006/main" xmlns:r="http://schemas.openxmlformats.org/officeDocument/2006/relationships" xmlns:p="http://schemas.openxmlformats.org/presentationml/2006/main" type="tx">
   <p:cSld name="Title &amp; Bullets">
     <p:spTree>
       <p:nvGrpSpPr>
@@ -1512,7 +1570,9 @@
       <p:sp>
         <p:nvSpPr>
           <p:cNvPr id="56" name="Shape 56"/>
-          <p:cNvSpPr/>
+          <p:cNvSpPr>
+            <a:spLocks noGrp="1"/>
+          </p:cNvSpPr>
           <p:nvPr>
             <p:ph type="title"/>
           </p:nvPr>
@@ -1526,7 +1586,6 @@
           <a:bodyPr/>
           <a:lstStyle/>
           <a:p>
-            <a:pPr/>
             <a:r>
               <a:t>Title Text</a:t>
             </a:r>
@@ -1536,7 +1595,9 @@
       <p:sp>
         <p:nvSpPr>
           <p:cNvPr id="57" name="Shape 57"/>
-          <p:cNvSpPr/>
+          <p:cNvSpPr>
+            <a:spLocks noGrp="1"/>
+          </p:cNvSpPr>
           <p:nvPr>
             <p:ph type="body" idx="1"/>
           </p:nvPr>
@@ -1550,7 +1611,6 @@
           <a:bodyPr/>
           <a:lstStyle/>
           <a:p>
-            <a:pPr/>
             <a:r>
               <a:t>Body Level One</a:t>
             </a:r>
@@ -1584,7 +1644,9 @@
       <p:sp>
         <p:nvSpPr>
           <p:cNvPr id="58" name="Shape 58"/>
-          <p:cNvSpPr/>
+          <p:cNvSpPr>
+            <a:spLocks noGrp="1"/>
+          </p:cNvSpPr>
           <p:nvPr>
             <p:ph type="sldNum" sz="quarter" idx="2"/>
           </p:nvPr>
@@ -1598,8 +1660,10 @@
           <a:bodyPr/>
           <a:lstStyle/>
           <a:p>
-            <a:pPr/>
-            <a:fld id="{86CB4B4D-7CA3-9044-876B-883B54F8677D}" type="slidenum"/>
+            <a:fld id="{86CB4B4D-7CA3-9044-876B-883B54F8677D}" type="slidenum">
+              <a:t>‹#›</a:t>
+            </a:fld>
+            <a:endParaRPr/>
           </a:p>
         </p:txBody>
       </p:sp>
@@ -1608,12 +1672,12 @@
   <p:clrMapOvr>
     <a:masterClrMapping/>
   </p:clrMapOvr>
-  <p:transition xmlns:p14="http://schemas.microsoft.com/office/powerpoint/2010/main" spd="med" advClick="1"/>
+  <p:transition spd="med"/>
 </p:sldLayout>
 </file>
 
 <file path=ppt/slideLayouts/slideLayout7.xml><?xml version="1.0" encoding="utf-8"?>
-<p:sldLayout xmlns:a="http://schemas.openxmlformats.org/drawingml/2006/main" xmlns:r="http://schemas.openxmlformats.org/officeDocument/2006/relationships" xmlns:p="http://schemas.openxmlformats.org/presentationml/2006/main" type="tx" showMasterSp="1" showMasterPhAnim="1">
+<p:sldLayout xmlns:a="http://schemas.openxmlformats.org/drawingml/2006/main" xmlns:r="http://schemas.openxmlformats.org/officeDocument/2006/relationships" xmlns:p="http://schemas.openxmlformats.org/presentationml/2006/main" type="tx">
   <p:cSld name="Title, Bullets &amp; Photo">
     <p:spTree>
       <p:nvGrpSpPr>
@@ -1632,7 +1696,9 @@
       <p:sp>
         <p:nvSpPr>
           <p:cNvPr id="65" name="Shape 65"/>
-          <p:cNvSpPr/>
+          <p:cNvSpPr>
+            <a:spLocks noGrp="1"/>
+          </p:cNvSpPr>
           <p:nvPr>
             <p:ph type="pic" sz="half" idx="13"/>
           </p:nvPr>
@@ -1652,14 +1718,16 @@
           </a:bodyPr>
           <a:lstStyle/>
           <a:p>
-            <a:pPr/>
+            <a:endParaRPr/>
           </a:p>
         </p:txBody>
       </p:sp>
       <p:sp>
         <p:nvSpPr>
           <p:cNvPr id="66" name="Shape 66"/>
-          <p:cNvSpPr/>
+          <p:cNvSpPr>
+            <a:spLocks noGrp="1"/>
+          </p:cNvSpPr>
           <p:nvPr>
             <p:ph type="title"/>
           </p:nvPr>
@@ -1673,7 +1741,6 @@
           <a:bodyPr/>
           <a:lstStyle/>
           <a:p>
-            <a:pPr/>
             <a:r>
               <a:t>Title Text</a:t>
             </a:r>
@@ -1683,7 +1750,9 @@
       <p:sp>
         <p:nvSpPr>
           <p:cNvPr id="67" name="Shape 67"/>
-          <p:cNvSpPr/>
+          <p:cNvSpPr>
+            <a:spLocks noGrp="1"/>
+          </p:cNvSpPr>
           <p:nvPr>
             <p:ph type="body" sz="half" idx="1"/>
           </p:nvPr>
@@ -1732,7 +1801,6 @@
             </a:lvl5pPr>
           </a:lstStyle>
           <a:p>
-            <a:pPr/>
             <a:r>
               <a:t>Body Level One</a:t>
             </a:r>
@@ -1766,7 +1834,9 @@
       <p:sp>
         <p:nvSpPr>
           <p:cNvPr id="68" name="Shape 68"/>
-          <p:cNvSpPr/>
+          <p:cNvSpPr>
+            <a:spLocks noGrp="1"/>
+          </p:cNvSpPr>
           <p:nvPr>
             <p:ph type="sldNum" sz="quarter" idx="2"/>
           </p:nvPr>
@@ -1780,8 +1850,10 @@
           <a:bodyPr/>
           <a:lstStyle/>
           <a:p>
-            <a:pPr/>
-            <a:fld id="{86CB4B4D-7CA3-9044-876B-883B54F8677D}" type="slidenum"/>
+            <a:fld id="{86CB4B4D-7CA3-9044-876B-883B54F8677D}" type="slidenum">
+              <a:t>‹#›</a:t>
+            </a:fld>
+            <a:endParaRPr/>
           </a:p>
         </p:txBody>
       </p:sp>
@@ -1790,12 +1862,12 @@
   <p:clrMapOvr>
     <a:masterClrMapping/>
   </p:clrMapOvr>
-  <p:transition xmlns:p14="http://schemas.microsoft.com/office/powerpoint/2010/main" spd="med" advClick="1"/>
+  <p:transition spd="med"/>
 </p:sldLayout>
 </file>
 
 <file path=ppt/slideLayouts/slideLayout8.xml><?xml version="1.0" encoding="utf-8"?>
-<p:sldLayout xmlns:a="http://schemas.openxmlformats.org/drawingml/2006/main" xmlns:r="http://schemas.openxmlformats.org/officeDocument/2006/relationships" xmlns:p="http://schemas.openxmlformats.org/presentationml/2006/main" type="tx" showMasterSp="1" showMasterPhAnim="1">
+<p:sldLayout xmlns:a="http://schemas.openxmlformats.org/drawingml/2006/main" xmlns:r="http://schemas.openxmlformats.org/officeDocument/2006/relationships" xmlns:p="http://schemas.openxmlformats.org/presentationml/2006/main" type="tx">
   <p:cSld name="Bullets">
     <p:spTree>
       <p:nvGrpSpPr>
@@ -1814,7 +1886,9 @@
       <p:sp>
         <p:nvSpPr>
           <p:cNvPr id="75" name="Shape 75"/>
-          <p:cNvSpPr/>
+          <p:cNvSpPr>
+            <a:spLocks noGrp="1"/>
+          </p:cNvSpPr>
           <p:nvPr>
             <p:ph type="body" idx="1"/>
           </p:nvPr>
@@ -1832,7 +1906,6 @@
           <a:bodyPr/>
           <a:lstStyle/>
           <a:p>
-            <a:pPr/>
             <a:r>
               <a:t>Body Level One</a:t>
             </a:r>
@@ -1866,7 +1939,9 @@
       <p:sp>
         <p:nvSpPr>
           <p:cNvPr id="76" name="Shape 76"/>
-          <p:cNvSpPr/>
+          <p:cNvSpPr>
+            <a:spLocks noGrp="1"/>
+          </p:cNvSpPr>
           <p:nvPr>
             <p:ph type="sldNum" sz="quarter" idx="2"/>
           </p:nvPr>
@@ -1880,8 +1955,10 @@
           <a:bodyPr/>
           <a:lstStyle/>
           <a:p>
-            <a:pPr/>
-            <a:fld id="{86CB4B4D-7CA3-9044-876B-883B54F8677D}" type="slidenum"/>
+            <a:fld id="{86CB4B4D-7CA3-9044-876B-883B54F8677D}" type="slidenum">
+              <a:t>‹#›</a:t>
+            </a:fld>
+            <a:endParaRPr/>
           </a:p>
         </p:txBody>
       </p:sp>
@@ -1890,12 +1967,12 @@
   <p:clrMapOvr>
     <a:masterClrMapping/>
   </p:clrMapOvr>
-  <p:transition xmlns:p14="http://schemas.microsoft.com/office/powerpoint/2010/main" spd="med" advClick="1"/>
+  <p:transition spd="med"/>
 </p:sldLayout>
 </file>
 
 <file path=ppt/slideLayouts/slideLayout9.xml><?xml version="1.0" encoding="utf-8"?>
-<p:sldLayout xmlns:a="http://schemas.openxmlformats.org/drawingml/2006/main" xmlns:r="http://schemas.openxmlformats.org/officeDocument/2006/relationships" xmlns:p="http://schemas.openxmlformats.org/presentationml/2006/main" type="tx" showMasterSp="1" showMasterPhAnim="1">
+<p:sldLayout xmlns:a="http://schemas.openxmlformats.org/drawingml/2006/main" xmlns:r="http://schemas.openxmlformats.org/officeDocument/2006/relationships" xmlns:p="http://schemas.openxmlformats.org/presentationml/2006/main" type="tx">
   <p:cSld name="Photo - 3 Up">
     <p:spTree>
       <p:nvGrpSpPr>
@@ -1914,7 +1991,9 @@
       <p:sp>
         <p:nvSpPr>
           <p:cNvPr id="83" name="Shape 83"/>
-          <p:cNvSpPr/>
+          <p:cNvSpPr>
+            <a:spLocks noGrp="1"/>
+          </p:cNvSpPr>
           <p:nvPr>
             <p:ph type="pic" sz="quarter" idx="13"/>
           </p:nvPr>
@@ -1934,14 +2013,16 @@
           </a:bodyPr>
           <a:lstStyle/>
           <a:p>
-            <a:pPr/>
+            <a:endParaRPr/>
           </a:p>
         </p:txBody>
       </p:sp>
       <p:sp>
         <p:nvSpPr>
           <p:cNvPr id="84" name="Shape 84"/>
-          <p:cNvSpPr/>
+          <p:cNvSpPr>
+            <a:spLocks noGrp="1"/>
+          </p:cNvSpPr>
           <p:nvPr>
             <p:ph type="pic" sz="quarter" idx="14"/>
           </p:nvPr>
@@ -1961,14 +2042,16 @@
           </a:bodyPr>
           <a:lstStyle/>
           <a:p>
-            <a:pPr/>
+            <a:endParaRPr/>
           </a:p>
         </p:txBody>
       </p:sp>
       <p:sp>
         <p:nvSpPr>
           <p:cNvPr id="85" name="Shape 85"/>
-          <p:cNvSpPr/>
+          <p:cNvSpPr>
+            <a:spLocks noGrp="1"/>
+          </p:cNvSpPr>
           <p:nvPr>
             <p:ph type="pic" sz="half" idx="15"/>
           </p:nvPr>
@@ -1988,14 +2071,16 @@
           </a:bodyPr>
           <a:lstStyle/>
           <a:p>
-            <a:pPr/>
+            <a:endParaRPr/>
           </a:p>
         </p:txBody>
       </p:sp>
       <p:sp>
         <p:nvSpPr>
           <p:cNvPr id="86" name="Shape 86"/>
-          <p:cNvSpPr/>
+          <p:cNvSpPr>
+            <a:spLocks noGrp="1"/>
+          </p:cNvSpPr>
           <p:nvPr>
             <p:ph type="sldNum" sz="quarter" idx="2"/>
           </p:nvPr>
@@ -2009,8 +2094,10 @@
           <a:bodyPr/>
           <a:lstStyle/>
           <a:p>
-            <a:pPr/>
-            <a:fld id="{86CB4B4D-7CA3-9044-876B-883B54F8677D}" type="slidenum"/>
+            <a:fld id="{86CB4B4D-7CA3-9044-876B-883B54F8677D}" type="slidenum">
+              <a:t>‹#›</a:t>
+            </a:fld>
+            <a:endParaRPr/>
           </a:p>
         </p:txBody>
       </p:sp>
@@ -2019,7 +2106,7 @@
   <p:clrMapOvr>
     <a:masterClrMapping/>
   </p:clrMapOvr>
-  <p:transition xmlns:p14="http://schemas.microsoft.com/office/powerpoint/2010/main" spd="med" advClick="1"/>
+  <p:transition spd="med"/>
 </p:sldLayout>
 </file>
 
@@ -2031,6 +2118,7 @@
         <a:solidFill>
           <a:srgbClr val="FFFFFF"/>
         </a:solidFill>
+        <a:effectLst/>
       </p:bgPr>
     </p:bg>
     <p:spTree>
@@ -2050,7 +2138,9 @@
       <p:sp>
         <p:nvSpPr>
           <p:cNvPr id="2" name="Shape 2"/>
-          <p:cNvSpPr/>
+          <p:cNvSpPr>
+            <a:spLocks noGrp="1"/>
+          </p:cNvSpPr>
           <p:nvPr>
             <p:ph type="title"/>
           </p:nvPr>
@@ -2074,11 +2164,10 @@
         </p:spPr>
         <p:txBody>
           <a:bodyPr lIns="50800" tIns="50800" rIns="50800" bIns="50800" anchor="ctr">
-            <a:normAutofit fontScale="100000" lnSpcReduction="0"/>
+            <a:normAutofit/>
           </a:bodyPr>
           <a:lstStyle/>
           <a:p>
-            <a:pPr/>
             <a:r>
               <a:t>Title Text</a:t>
             </a:r>
@@ -2088,7 +2177,9 @@
       <p:sp>
         <p:nvSpPr>
           <p:cNvPr id="3" name="Shape 3"/>
-          <p:cNvSpPr/>
+          <p:cNvSpPr>
+            <a:spLocks noGrp="1"/>
+          </p:cNvSpPr>
           <p:nvPr>
             <p:ph type="body" idx="1"/>
           </p:nvPr>
@@ -2112,11 +2203,10 @@
         </p:spPr>
         <p:txBody>
           <a:bodyPr lIns="50800" tIns="50800" rIns="50800" bIns="50800" anchor="ctr">
-            <a:normAutofit fontScale="100000" lnSpcReduction="0"/>
+            <a:normAutofit/>
           </a:bodyPr>
           <a:lstStyle/>
           <a:p>
-            <a:pPr/>
             <a:r>
               <a:t>Body Level One</a:t>
             </a:r>
@@ -2150,7 +2240,9 @@
       <p:sp>
         <p:nvSpPr>
           <p:cNvPr id="4" name="Shape 4"/>
-          <p:cNvSpPr/>
+          <p:cNvSpPr>
+            <a:spLocks noGrp="1"/>
+          </p:cNvSpPr>
           <p:nvPr>
             <p:ph type="sldNum" sz="quarter" idx="2"/>
           </p:nvPr>
@@ -2177,8 +2269,10 @@
             </a:lvl1pPr>
           </a:lstStyle>
           <a:p>
-            <a:pPr/>
-            <a:fld id="{86CB4B4D-7CA3-9044-876B-883B54F8677D}" type="slidenum"/>
+            <a:fld id="{86CB4B4D-7CA3-9044-876B-883B54F8677D}" type="slidenum">
+              <a:t>‹#›</a:t>
+            </a:fld>
+            <a:endParaRPr/>
           </a:p>
         </p:txBody>
       </p:sp>
@@ -2186,20 +2280,20 @@
   </p:cSld>
   <p:clrMap bg1="lt1" tx1="dk1" bg2="lt2" tx2="dk2" accent1="accent1" accent2="accent2" accent3="accent3" accent4="accent4" accent5="accent5" accent6="accent6" hlink="hlink" folHlink="folHlink"/>
   <p:sldLayoutIdLst>
-    <p:sldLayoutId id="2147483649" r:id="rId2"/>
-    <p:sldLayoutId id="2147483650" r:id="rId3"/>
-    <p:sldLayoutId id="2147483651" r:id="rId4"/>
-    <p:sldLayoutId id="2147483652" r:id="rId5"/>
-    <p:sldLayoutId id="2147483653" r:id="rId6"/>
-    <p:sldLayoutId id="2147483654" r:id="rId7"/>
-    <p:sldLayoutId id="2147483655" r:id="rId8"/>
-    <p:sldLayoutId id="2147483656" r:id="rId9"/>
-    <p:sldLayoutId id="2147483657" r:id="rId10"/>
-    <p:sldLayoutId id="2147483658" r:id="rId11"/>
-    <p:sldLayoutId id="2147483659" r:id="rId12"/>
-    <p:sldLayoutId id="2147483660" r:id="rId13"/>
+    <p:sldLayoutId id="2147483649" r:id="rId1"/>
+    <p:sldLayoutId id="2147483650" r:id="rId2"/>
+    <p:sldLayoutId id="2147483651" r:id="rId3"/>
+    <p:sldLayoutId id="2147483652" r:id="rId4"/>
+    <p:sldLayoutId id="2147483653" r:id="rId5"/>
+    <p:sldLayoutId id="2147483654" r:id="rId6"/>
+    <p:sldLayoutId id="2147483655" r:id="rId7"/>
+    <p:sldLayoutId id="2147483656" r:id="rId8"/>
+    <p:sldLayoutId id="2147483657" r:id="rId9"/>
+    <p:sldLayoutId id="2147483658" r:id="rId10"/>
+    <p:sldLayoutId id="2147483659" r:id="rId11"/>
+    <p:sldLayoutId id="2147483660" r:id="rId12"/>
   </p:sldLayoutIdLst>
-  <p:transition xmlns:p14="http://schemas.microsoft.com/office/powerpoint/2010/main" spd="med" advClick="1"/>
+  <p:transition spd="med"/>
   <p:txStyles>
     <p:titleStyle>
       <a:lvl1pPr marL="0" marR="0" indent="0" algn="ctr" defTabSz="584200" rtl="0" latinLnBrk="0">
@@ -2217,7 +2311,7 @@
         <a:buFontTx/>
         <a:buNone/>
         <a:tabLst/>
-        <a:defRPr b="0" baseline="0" cap="none" i="0" spc="0" strike="noStrike" sz="8000" u="none">
+        <a:defRPr sz="8000" b="0" i="0" u="none" strike="noStrike" cap="none" spc="0" baseline="0">
           <a:ln>
             <a:noFill/>
           </a:ln>
@@ -2246,7 +2340,7 @@
         <a:buFontTx/>
         <a:buNone/>
         <a:tabLst/>
-        <a:defRPr b="0" baseline="0" cap="none" i="0" spc="0" strike="noStrike" sz="8000" u="none">
+        <a:defRPr sz="8000" b="0" i="0" u="none" strike="noStrike" cap="none" spc="0" baseline="0">
           <a:ln>
             <a:noFill/>
           </a:ln>
@@ -2275,7 +2369,7 @@
         <a:buFontTx/>
         <a:buNone/>
         <a:tabLst/>
-        <a:defRPr b="0" baseline="0" cap="none" i="0" spc="0" strike="noStrike" sz="8000" u="none">
+        <a:defRPr sz="8000" b="0" i="0" u="none" strike="noStrike" cap="none" spc="0" baseline="0">
           <a:ln>
             <a:noFill/>
           </a:ln>
@@ -2304,7 +2398,7 @@
         <a:buFontTx/>
         <a:buNone/>
         <a:tabLst/>
-        <a:defRPr b="0" baseline="0" cap="none" i="0" spc="0" strike="noStrike" sz="8000" u="none">
+        <a:defRPr sz="8000" b="0" i="0" u="none" strike="noStrike" cap="none" spc="0" baseline="0">
           <a:ln>
             <a:noFill/>
           </a:ln>
@@ -2333,7 +2427,7 @@
         <a:buFontTx/>
         <a:buNone/>
         <a:tabLst/>
-        <a:defRPr b="0" baseline="0" cap="none" i="0" spc="0" strike="noStrike" sz="8000" u="none">
+        <a:defRPr sz="8000" b="0" i="0" u="none" strike="noStrike" cap="none" spc="0" baseline="0">
           <a:ln>
             <a:noFill/>
           </a:ln>
@@ -2362,7 +2456,7 @@
         <a:buFontTx/>
         <a:buNone/>
         <a:tabLst/>
-        <a:defRPr b="0" baseline="0" cap="none" i="0" spc="0" strike="noStrike" sz="8000" u="none">
+        <a:defRPr sz="8000" b="0" i="0" u="none" strike="noStrike" cap="none" spc="0" baseline="0">
           <a:ln>
             <a:noFill/>
           </a:ln>
@@ -2391,7 +2485,7 @@
         <a:buFontTx/>
         <a:buNone/>
         <a:tabLst/>
-        <a:defRPr b="0" baseline="0" cap="none" i="0" spc="0" strike="noStrike" sz="8000" u="none">
+        <a:defRPr sz="8000" b="0" i="0" u="none" strike="noStrike" cap="none" spc="0" baseline="0">
           <a:ln>
             <a:noFill/>
           </a:ln>
@@ -2420,7 +2514,7 @@
         <a:buFontTx/>
         <a:buNone/>
         <a:tabLst/>
-        <a:defRPr b="0" baseline="0" cap="none" i="0" spc="0" strike="noStrike" sz="8000" u="none">
+        <a:defRPr sz="8000" b="0" i="0" u="none" strike="noStrike" cap="none" spc="0" baseline="0">
           <a:ln>
             <a:noFill/>
           </a:ln>
@@ -2449,7 +2543,7 @@
         <a:buFontTx/>
         <a:buNone/>
         <a:tabLst/>
-        <a:defRPr b="0" baseline="0" cap="none" i="0" spc="0" strike="noStrike" sz="8000" u="none">
+        <a:defRPr sz="8000" b="0" i="0" u="none" strike="noStrike" cap="none" spc="0" baseline="0">
           <a:ln>
             <a:noFill/>
           </a:ln>
@@ -2480,7 +2574,7 @@
         <a:buFontTx/>
         <a:buChar char="•"/>
         <a:tabLst/>
-        <a:defRPr b="0" baseline="0" cap="none" i="0" spc="0" strike="noStrike" sz="3600" u="none">
+        <a:defRPr sz="3600" b="0" i="0" u="none" strike="noStrike" cap="none" spc="0" baseline="0">
           <a:ln>
             <a:noFill/>
           </a:ln>
@@ -2509,7 +2603,7 @@
         <a:buFontTx/>
         <a:buChar char="•"/>
         <a:tabLst/>
-        <a:defRPr b="0" baseline="0" cap="none" i="0" spc="0" strike="noStrike" sz="3600" u="none">
+        <a:defRPr sz="3600" b="0" i="0" u="none" strike="noStrike" cap="none" spc="0" baseline="0">
           <a:ln>
             <a:noFill/>
           </a:ln>
@@ -2538,7 +2632,7 @@
         <a:buFontTx/>
         <a:buChar char="•"/>
         <a:tabLst/>
-        <a:defRPr b="0" baseline="0" cap="none" i="0" spc="0" strike="noStrike" sz="3600" u="none">
+        <a:defRPr sz="3600" b="0" i="0" u="none" strike="noStrike" cap="none" spc="0" baseline="0">
           <a:ln>
             <a:noFill/>
           </a:ln>
@@ -2567,7 +2661,7 @@
         <a:buFontTx/>
         <a:buChar char="•"/>
         <a:tabLst/>
-        <a:defRPr b="0" baseline="0" cap="none" i="0" spc="0" strike="noStrike" sz="3600" u="none">
+        <a:defRPr sz="3600" b="0" i="0" u="none" strike="noStrike" cap="none" spc="0" baseline="0">
           <a:ln>
             <a:noFill/>
           </a:ln>
@@ -2596,7 +2690,7 @@
         <a:buFontTx/>
         <a:buChar char="•"/>
         <a:tabLst/>
-        <a:defRPr b="0" baseline="0" cap="none" i="0" spc="0" strike="noStrike" sz="3600" u="none">
+        <a:defRPr sz="3600" b="0" i="0" u="none" strike="noStrike" cap="none" spc="0" baseline="0">
           <a:ln>
             <a:noFill/>
           </a:ln>
@@ -2625,7 +2719,7 @@
         <a:buFontTx/>
         <a:buChar char="•"/>
         <a:tabLst/>
-        <a:defRPr b="0" baseline="0" cap="none" i="0" spc="0" strike="noStrike" sz="3600" u="none">
+        <a:defRPr sz="3600" b="0" i="0" u="none" strike="noStrike" cap="none" spc="0" baseline="0">
           <a:ln>
             <a:noFill/>
           </a:ln>
@@ -2654,7 +2748,7 @@
         <a:buFontTx/>
         <a:buChar char="•"/>
         <a:tabLst/>
-        <a:defRPr b="0" baseline="0" cap="none" i="0" spc="0" strike="noStrike" sz="3600" u="none">
+        <a:defRPr sz="3600" b="0" i="0" u="none" strike="noStrike" cap="none" spc="0" baseline="0">
           <a:ln>
             <a:noFill/>
           </a:ln>
@@ -2683,7 +2777,7 @@
         <a:buFontTx/>
         <a:buChar char="•"/>
         <a:tabLst/>
-        <a:defRPr b="0" baseline="0" cap="none" i="0" spc="0" strike="noStrike" sz="3600" u="none">
+        <a:defRPr sz="3600" b="0" i="0" u="none" strike="noStrike" cap="none" spc="0" baseline="0">
           <a:ln>
             <a:noFill/>
           </a:ln>
@@ -2712,7 +2806,7 @@
         <a:buFontTx/>
         <a:buChar char="•"/>
         <a:tabLst/>
-        <a:defRPr b="0" baseline="0" cap="none" i="0" spc="0" strike="noStrike" sz="3600" u="none">
+        <a:defRPr sz="3600" b="0" i="0" u="none" strike="noStrike" cap="none" spc="0" baseline="0">
           <a:ln>
             <a:noFill/>
           </a:ln>
@@ -2743,7 +2837,7 @@
         <a:buFontTx/>
         <a:buNone/>
         <a:tabLst/>
-        <a:defRPr b="0" baseline="0" cap="none" i="0" spc="0" strike="noStrike" sz="1800" u="none">
+        <a:defRPr sz="1800" b="0" i="0" u="none" strike="noStrike" cap="none" spc="0" baseline="0">
           <a:ln>
             <a:noFill/>
           </a:ln>
@@ -2772,7 +2866,7 @@
         <a:buFontTx/>
         <a:buNone/>
         <a:tabLst/>
-        <a:defRPr b="0" baseline="0" cap="none" i="0" spc="0" strike="noStrike" sz="1800" u="none">
+        <a:defRPr sz="1800" b="0" i="0" u="none" strike="noStrike" cap="none" spc="0" baseline="0">
           <a:ln>
             <a:noFill/>
           </a:ln>
@@ -2801,7 +2895,7 @@
         <a:buFontTx/>
         <a:buNone/>
         <a:tabLst/>
-        <a:defRPr b="0" baseline="0" cap="none" i="0" spc="0" strike="noStrike" sz="1800" u="none">
+        <a:defRPr sz="1800" b="0" i="0" u="none" strike="noStrike" cap="none" spc="0" baseline="0">
           <a:ln>
             <a:noFill/>
           </a:ln>
@@ -2830,7 +2924,7 @@
         <a:buFontTx/>
         <a:buNone/>
         <a:tabLst/>
-        <a:defRPr b="0" baseline="0" cap="none" i="0" spc="0" strike="noStrike" sz="1800" u="none">
+        <a:defRPr sz="1800" b="0" i="0" u="none" strike="noStrike" cap="none" spc="0" baseline="0">
           <a:ln>
             <a:noFill/>
           </a:ln>
@@ -2859,7 +2953,7 @@
         <a:buFontTx/>
         <a:buNone/>
         <a:tabLst/>
-        <a:defRPr b="0" baseline="0" cap="none" i="0" spc="0" strike="noStrike" sz="1800" u="none">
+        <a:defRPr sz="1800" b="0" i="0" u="none" strike="noStrike" cap="none" spc="0" baseline="0">
           <a:ln>
             <a:noFill/>
           </a:ln>
@@ -2888,7 +2982,7 @@
         <a:buFontTx/>
         <a:buNone/>
         <a:tabLst/>
-        <a:defRPr b="0" baseline="0" cap="none" i="0" spc="0" strike="noStrike" sz="1800" u="none">
+        <a:defRPr sz="1800" b="0" i="0" u="none" strike="noStrike" cap="none" spc="0" baseline="0">
           <a:ln>
             <a:noFill/>
           </a:ln>
@@ -2917,7 +3011,7 @@
         <a:buFontTx/>
         <a:buNone/>
         <a:tabLst/>
-        <a:defRPr b="0" baseline="0" cap="none" i="0" spc="0" strike="noStrike" sz="1800" u="none">
+        <a:defRPr sz="1800" b="0" i="0" u="none" strike="noStrike" cap="none" spc="0" baseline="0">
           <a:ln>
             <a:noFill/>
           </a:ln>
@@ -2946,7 +3040,7 @@
         <a:buFontTx/>
         <a:buNone/>
         <a:tabLst/>
-        <a:defRPr b="0" baseline="0" cap="none" i="0" spc="0" strike="noStrike" sz="1800" u="none">
+        <a:defRPr sz="1800" b="0" i="0" u="none" strike="noStrike" cap="none" spc="0" baseline="0">
           <a:ln>
             <a:noFill/>
           </a:ln>
@@ -2975,7 +3069,7 @@
         <a:buFontTx/>
         <a:buNone/>
         <a:tabLst/>
-        <a:defRPr b="0" baseline="0" cap="none" i="0" spc="0" strike="noStrike" sz="1800" u="none">
+        <a:defRPr sz="1800" b="0" i="0" u="none" strike="noStrike" cap="none" spc="0" baseline="0">
           <a:ln>
             <a:noFill/>
           </a:ln>
@@ -2995,7 +3089,7 @@
 </file>
 
 <file path=ppt/slides/slide1.xml><?xml version="1.0" encoding="utf-8"?>
-<p:sld xmlns:a="http://schemas.openxmlformats.org/drawingml/2006/main" xmlns:r="http://schemas.openxmlformats.org/officeDocument/2006/relationships" xmlns:p="http://schemas.openxmlformats.org/presentationml/2006/main" showMasterSp="1" showMasterPhAnim="1">
+<p:sld xmlns:a="http://schemas.openxmlformats.org/drawingml/2006/main" xmlns:r="http://schemas.openxmlformats.org/officeDocument/2006/relationships" xmlns:p="http://schemas.openxmlformats.org/presentationml/2006/main">
   <p:cSld>
     <p:spTree>
       <p:nvGrpSpPr>
@@ -3014,7 +3108,9 @@
       <p:sp>
         <p:nvSpPr>
           <p:cNvPr id="119" name="Shape 119"/>
-          <p:cNvSpPr/>
+          <p:cNvSpPr>
+            <a:spLocks noGrp="1"/>
+          </p:cNvSpPr>
           <p:nvPr>
             <p:ph type="ctrTitle"/>
           </p:nvPr>
@@ -3028,7 +3124,6 @@
           <a:bodyPr/>
           <a:lstStyle/>
           <a:p>
-            <a:pPr/>
             <a:r>
               <a:t>JavaScript Essential</a:t>
             </a:r>
@@ -3038,7 +3133,9 @@
       <p:sp>
         <p:nvSpPr>
           <p:cNvPr id="120" name="Shape 120"/>
-          <p:cNvSpPr/>
+          <p:cNvSpPr>
+            <a:spLocks noGrp="1"/>
+          </p:cNvSpPr>
           <p:nvPr>
             <p:ph type="subTitle" sz="quarter" idx="1"/>
           </p:nvPr>
@@ -3052,7 +3149,6 @@
           <a:bodyPr/>
           <a:lstStyle/>
           <a:p>
-            <a:pPr/>
             <a:r>
               <a:t>Full Stack JS Training </a:t>
             </a:r>
@@ -3064,12 +3160,19 @@
   <p:clrMapOvr>
     <a:masterClrMapping/>
   </p:clrMapOvr>
-  <p:transition xmlns:p14="http://schemas.microsoft.com/office/powerpoint/2010/main" spd="med" advClick="1"/>
+  <p:transition spd="med"/>
+  <p:timing>
+    <p:tnLst>
+      <p:par>
+        <p:cTn id="1" dur="indefinite" restart="never" nodeType="tmRoot"/>
+      </p:par>
+    </p:tnLst>
+  </p:timing>
 </p:sld>
 </file>
 
 <file path=ppt/slides/slide10.xml><?xml version="1.0" encoding="utf-8"?>
-<p:sld xmlns:a="http://schemas.openxmlformats.org/drawingml/2006/main" xmlns:r="http://schemas.openxmlformats.org/officeDocument/2006/relationships" xmlns:p="http://schemas.openxmlformats.org/presentationml/2006/main" showMasterSp="1" showMasterPhAnim="1">
+<p:sld xmlns:a="http://schemas.openxmlformats.org/drawingml/2006/main" xmlns:r="http://schemas.openxmlformats.org/officeDocument/2006/relationships" xmlns:p="http://schemas.openxmlformats.org/presentationml/2006/main">
   <p:cSld>
     <p:spTree>
       <p:nvGrpSpPr>
@@ -3088,7 +3191,9 @@
       <p:sp>
         <p:nvSpPr>
           <p:cNvPr id="153" name="Shape 153"/>
-          <p:cNvSpPr/>
+          <p:cNvSpPr>
+            <a:spLocks noGrp="1"/>
+          </p:cNvSpPr>
           <p:nvPr>
             <p:ph type="title"/>
           </p:nvPr>
@@ -3103,14 +3208,15 @@
           </a:prstGeom>
         </p:spPr>
         <p:txBody>
-          <a:bodyPr/>
+          <a:bodyPr>
+            <a:normAutofit fontScale="90000"/>
+          </a:bodyPr>
           <a:lstStyle>
             <a:lvl1pPr defTabSz="297941">
               <a:defRPr sz="4080"/>
             </a:lvl1pPr>
           </a:lstStyle>
           <a:p>
-            <a:pPr/>
             <a:r>
               <a:t>Array</a:t>
             </a:r>
@@ -3151,12 +3257,12 @@
   <p:clrMapOvr>
     <a:masterClrMapping/>
   </p:clrMapOvr>
-  <p:transition xmlns:p14="http://schemas.microsoft.com/office/powerpoint/2010/main" spd="med" advClick="1" p14:dur="1000"/>
+  <p:transition spd="slow"/>
 </p:sld>
 </file>
 
 <file path=ppt/slides/slide11.xml><?xml version="1.0" encoding="utf-8"?>
-<p:sld xmlns:a="http://schemas.openxmlformats.org/drawingml/2006/main" xmlns:r="http://schemas.openxmlformats.org/officeDocument/2006/relationships" xmlns:p="http://schemas.openxmlformats.org/presentationml/2006/main" showMasterSp="1" showMasterPhAnim="1">
+<p:sld xmlns:a="http://schemas.openxmlformats.org/drawingml/2006/main" xmlns:r="http://schemas.openxmlformats.org/officeDocument/2006/relationships" xmlns:p="http://schemas.openxmlformats.org/presentationml/2006/main">
   <p:cSld>
     <p:spTree>
       <p:nvGrpSpPr>
@@ -3175,7 +3281,9 @@
       <p:sp>
         <p:nvSpPr>
           <p:cNvPr id="156" name="Shape 156"/>
-          <p:cNvSpPr/>
+          <p:cNvSpPr>
+            <a:spLocks noGrp="1"/>
+          </p:cNvSpPr>
           <p:nvPr>
             <p:ph type="title"/>
           </p:nvPr>
@@ -3189,7 +3297,6 @@
           <a:bodyPr/>
           <a:lstStyle/>
           <a:p>
-            <a:pPr/>
             <a:r>
               <a:t>Object</a:t>
             </a:r>
@@ -3201,12 +3308,12 @@
   <p:clrMapOvr>
     <a:masterClrMapping/>
   </p:clrMapOvr>
-  <p:transition xmlns:p14="http://schemas.microsoft.com/office/powerpoint/2010/main" spd="med" advClick="1" p14:dur="1000"/>
+  <p:transition spd="slow"/>
 </p:sld>
 </file>
 
 <file path=ppt/slides/slide12.xml><?xml version="1.0" encoding="utf-8"?>
-<p:sld xmlns:a="http://schemas.openxmlformats.org/drawingml/2006/main" xmlns:r="http://schemas.openxmlformats.org/officeDocument/2006/relationships" xmlns:p="http://schemas.openxmlformats.org/presentationml/2006/main" showMasterSp="1" showMasterPhAnim="1">
+<p:sld xmlns:a="http://schemas.openxmlformats.org/drawingml/2006/main" xmlns:r="http://schemas.openxmlformats.org/officeDocument/2006/relationships" xmlns:p="http://schemas.openxmlformats.org/presentationml/2006/main">
   <p:cSld>
     <p:spTree>
       <p:nvGrpSpPr>
@@ -3226,7 +3333,7 @@
         <p:nvPicPr>
           <p:cNvPr id="158" name="Screen Shot 2018-01-08 at 11.00.12 AM.png"/>
           <p:cNvPicPr>
-            <a:picLocks noChangeAspect="1"/>
+            <a:picLocks noGrp="1" noChangeAspect="1"/>
           </p:cNvPicPr>
           <p:nvPr>
             <p:ph type="pic" idx="13"/>
@@ -3236,7 +3343,7 @@
           <a:blip r:embed="rId2">
             <a:extLst/>
           </a:blip>
-          <a:srcRect l="0" t="0" r="0" b="0"/>
+          <a:srcRect/>
           <a:stretch>
             <a:fillRect/>
           </a:stretch>
@@ -3289,7 +3396,6 @@
             </a:lvl1pPr>
           </a:lstStyle>
           <a:p>
-            <a:pPr/>
             <a:r>
               <a:t>Contoh Object Car</a:t>
             </a:r>
@@ -3328,6 +3434,7 @@
             <a:pPr>
               <a:defRPr sz="2400"/>
             </a:pPr>
+            <a:endParaRPr/>
           </a:p>
         </p:txBody>
       </p:sp>
@@ -3364,6 +3471,7 @@
             <a:pPr>
               <a:defRPr sz="2400"/>
             </a:pPr>
+            <a:endParaRPr/>
           </a:p>
         </p:txBody>
       </p:sp>
@@ -3412,7 +3520,6 @@
             </a:lvl1pPr>
           </a:lstStyle>
           <a:p>
-            <a:pPr/>
             <a:r>
               <a:t>Property</a:t>
             </a:r>
@@ -3450,6 +3557,7 @@
             <a:pPr>
               <a:defRPr sz="2400"/>
             </a:pPr>
+            <a:endParaRPr/>
           </a:p>
         </p:txBody>
       </p:sp>
@@ -3484,6 +3592,7 @@
             <a:pPr>
               <a:defRPr sz="2400"/>
             </a:pPr>
+            <a:endParaRPr/>
           </a:p>
         </p:txBody>
       </p:sp>
@@ -3516,6 +3625,7 @@
             <a:pPr>
               <a:defRPr sz="2400"/>
             </a:pPr>
+            <a:endParaRPr/>
           </a:p>
         </p:txBody>
       </p:sp>
@@ -3564,7 +3674,6 @@
             </a:lvl1pPr>
           </a:lstStyle>
           <a:p>
-            <a:pPr/>
             <a:r>
               <a:t>Key</a:t>
             </a:r>
@@ -3616,7 +3725,6 @@
             </a:lvl1pPr>
           </a:lstStyle>
           <a:p>
-            <a:pPr/>
             <a:r>
               <a:t>Value</a:t>
             </a:r>
@@ -3654,6 +3762,7 @@
             <a:pPr>
               <a:defRPr sz="2400"/>
             </a:pPr>
+            <a:endParaRPr/>
           </a:p>
         </p:txBody>
       </p:sp>
@@ -3701,7 +3810,6 @@
             </a:lvl1pPr>
           </a:lstStyle>
           <a:p>
-            <a:pPr/>
             <a:r>
               <a:t>Action / Event</a:t>
             </a:r>
@@ -3752,7 +3860,6 @@
             </a:lvl1pPr>
           </a:lstStyle>
           <a:p>
-            <a:pPr/>
             <a:r>
               <a:t>Subrutine</a:t>
             </a:r>
@@ -3764,14 +3871,14 @@
   <p:clrMapOvr>
     <a:masterClrMapping/>
   </p:clrMapOvr>
-  <p:transition xmlns:p14="http://schemas.microsoft.com/office/powerpoint/2010/main" spd="med" advClick="1" p14:dur="1000"/>
+  <p:transition spd="slow"/>
   <p:timing>
     <p:tnLst>
       <p:par>
-        <p:cTn id="1" nodeType="tmRoot" restart="never" dur="indefinite" fill="hold">
+        <p:cTn id="1" dur="indefinite" restart="never" fill="hold" nodeType="tmRoot">
           <p:childTnLst>
             <p:seq concurrent="1" prevAc="none" nextAc="seek">
-              <p:cTn id="2" nodeType="mainSeq" dur="indefinite" fill="hold">
+              <p:cTn id="2" dur="indefinite" fill="hold" nodeType="mainSeq">
                 <p:childTnLst>
                   <p:par>
                     <p:cTn id="3" fill="hold">
@@ -3786,11 +3893,11 @@
                             </p:stCondLst>
                             <p:childTnLst>
                               <p:par>
-                                <p:cTn id="5" presetClass="entr" nodeType="clickEffect" presetSubtype="0" presetID="1" grpId="1" fill="hold">
+                                <p:cTn id="5" presetID="1" presetClass="entr" presetSubtype="0" fill="hold" grpId="1" nodeType="clickEffect">
                                   <p:stCondLst>
                                     <p:cond delay="0"/>
                                   </p:stCondLst>
-                                  <p:iterate type="el" backwards="0">
+                                  <p:iterate>
                                     <p:tmAbs val="0"/>
                                   </p:iterate>
                                   <p:childTnLst>
@@ -3830,11 +3937,11 @@
                             </p:stCondLst>
                             <p:childTnLst>
                               <p:par>
-                                <p:cTn id="9" presetClass="entr" nodeType="clickEffect" presetSubtype="0" presetID="1" grpId="2" fill="hold">
+                                <p:cTn id="9" presetID="1" presetClass="entr" presetSubtype="0" fill="hold" grpId="2" nodeType="clickEffect">
                                   <p:stCondLst>
                                     <p:cond delay="0"/>
                                   </p:stCondLst>
-                                  <p:iterate type="el" backwards="0">
+                                  <p:iterate>
                                     <p:tmAbs val="0"/>
                                   </p:iterate>
                                   <p:childTnLst>
@@ -3865,11 +3972,11 @@
                             </p:stCondLst>
                             <p:childTnLst>
                               <p:par>
-                                <p:cTn id="12" presetClass="entr" nodeType="afterEffect" presetSubtype="0" presetID="1" grpId="3" fill="hold">
+                                <p:cTn id="12" presetID="1" presetClass="entr" presetSubtype="0" fill="hold" grpId="3" nodeType="afterEffect">
                                   <p:stCondLst>
                                     <p:cond delay="0"/>
                                   </p:stCondLst>
-                                  <p:iterate type="el" backwards="0">
+                                  <p:iterate>
                                     <p:tmAbs val="0"/>
                                   </p:iterate>
                                   <p:childTnLst>
@@ -3900,11 +4007,11 @@
                             </p:stCondLst>
                             <p:childTnLst>
                               <p:par>
-                                <p:cTn id="15" presetClass="exit" nodeType="afterEffect" presetSubtype="0" presetID="1" grpId="4" fill="hold">
+                                <p:cTn id="15" presetID="1" presetClass="exit" presetSubtype="0" fill="hold" grpId="4" nodeType="afterEffect">
                                   <p:stCondLst>
                                     <p:cond delay="0"/>
                                   </p:stCondLst>
-                                  <p:iterate type="el" backwards="0">
+                                  <p:iterate>
                                     <p:tmAbs val="0"/>
                                   </p:iterate>
                                   <p:childTnLst>
@@ -3948,11 +4055,11 @@
                             </p:stCondLst>
                             <p:childTnLst>
                               <p:par>
-                                <p:cTn id="19" presetClass="entr" nodeType="clickEffect" presetSubtype="0" presetID="1" grpId="5" fill="hold">
+                                <p:cTn id="19" presetID="1" presetClass="entr" presetSubtype="0" fill="hold" grpId="5" nodeType="clickEffect">
                                   <p:stCondLst>
                                     <p:cond delay="0"/>
                                   </p:stCondLst>
-                                  <p:iterate type="el" backwards="0">
+                                  <p:iterate>
                                     <p:tmAbs val="0"/>
                                   </p:iterate>
                                   <p:childTnLst>
@@ -3983,11 +4090,11 @@
                             </p:stCondLst>
                             <p:childTnLst>
                               <p:par>
-                                <p:cTn id="22" presetClass="entr" nodeType="afterEffect" presetSubtype="0" presetID="1" grpId="6" fill="hold">
+                                <p:cTn id="22" presetID="1" presetClass="entr" presetSubtype="0" fill="hold" grpId="6" nodeType="afterEffect">
                                   <p:stCondLst>
                                     <p:cond delay="0"/>
                                   </p:stCondLst>
-                                  <p:iterate type="el" backwards="0">
+                                  <p:iterate>
                                     <p:tmAbs val="0"/>
                                   </p:iterate>
                                   <p:childTnLst>
@@ -4018,11 +4125,11 @@
                             </p:stCondLst>
                             <p:childTnLst>
                               <p:par>
-                                <p:cTn id="25" presetClass="entr" nodeType="afterEffect" presetSubtype="0" presetID="1" grpId="7" fill="hold">
+                                <p:cTn id="25" presetID="1" presetClass="entr" presetSubtype="0" fill="hold" grpId="7" nodeType="afterEffect">
                                   <p:stCondLst>
                                     <p:cond delay="0"/>
                                   </p:stCondLst>
-                                  <p:iterate type="el" backwards="0">
+                                  <p:iterate>
                                     <p:tmAbs val="0"/>
                                   </p:iterate>
                                   <p:childTnLst>
@@ -4062,11 +4169,11 @@
                             </p:stCondLst>
                             <p:childTnLst>
                               <p:par>
-                                <p:cTn id="29" presetClass="entr" nodeType="clickEffect" presetSubtype="0" presetID="1" grpId="8" fill="hold">
+                                <p:cTn id="29" presetID="1" presetClass="entr" presetSubtype="0" fill="hold" grpId="8" nodeType="clickEffect">
                                   <p:stCondLst>
                                     <p:cond delay="0"/>
                                   </p:stCondLst>
-                                  <p:iterate type="el" backwards="0">
+                                  <p:iterate>
                                     <p:tmAbs val="0"/>
                                   </p:iterate>
                                   <p:childTnLst>
@@ -4106,11 +4213,11 @@
                             </p:stCondLst>
                             <p:childTnLst>
                               <p:par>
-                                <p:cTn id="33" presetClass="entr" nodeType="clickEffect" presetSubtype="0" presetID="1" grpId="9" fill="hold">
+                                <p:cTn id="33" presetID="1" presetClass="entr" presetSubtype="0" fill="hold" grpId="9" nodeType="clickEffect">
                                   <p:stCondLst>
                                     <p:cond delay="0"/>
                                   </p:stCondLst>
-                                  <p:iterate type="el" backwards="0">
+                                  <p:iterate>
                                     <p:tmAbs val="0"/>
                                   </p:iterate>
                                   <p:childTnLst>
@@ -4150,11 +4257,11 @@
                             </p:stCondLst>
                             <p:childTnLst>
                               <p:par>
-                                <p:cTn id="37" presetClass="exit" nodeType="clickEffect" presetSubtype="0" presetID="1" grpId="10" fill="hold">
+                                <p:cTn id="37" presetID="1" presetClass="exit" presetSubtype="0" fill="hold" grpId="10" nodeType="clickEffect">
                                   <p:stCondLst>
                                     <p:cond delay="0"/>
                                   </p:stCondLst>
-                                  <p:iterate type="el" backwards="0">
+                                  <p:iterate>
                                     <p:tmAbs val="0"/>
                                   </p:iterate>
                                   <p:childTnLst>
@@ -4189,11 +4296,11 @@
                             </p:stCondLst>
                             <p:childTnLst>
                               <p:par>
-                                <p:cTn id="40" presetClass="entr" nodeType="afterEffect" presetSubtype="0" presetID="1" grpId="11" fill="hold">
+                                <p:cTn id="40" presetID="1" presetClass="entr" presetSubtype="0" fill="hold" grpId="11" nodeType="afterEffect">
                                   <p:stCondLst>
                                     <p:cond delay="0"/>
                                   </p:stCondLst>
-                                  <p:iterate type="el" backwards="0">
+                                  <p:iterate>
                                     <p:tmAbs val="0"/>
                                   </p:iterate>
                                   <p:childTnLst>
@@ -4224,11 +4331,11 @@
                             </p:stCondLst>
                             <p:childTnLst>
                               <p:par>
-                                <p:cTn id="43" presetClass="entr" nodeType="afterEffect" presetSubtype="0" presetID="1" grpId="12" fill="hold">
+                                <p:cTn id="43" presetID="1" presetClass="entr" presetSubtype="0" fill="hold" grpId="12" nodeType="afterEffect">
                                   <p:stCondLst>
                                     <p:cond delay="0"/>
                                   </p:stCondLst>
-                                  <p:iterate type="el" backwards="0">
+                                  <p:iterate>
                                     <p:tmAbs val="0"/>
                                   </p:iterate>
                                   <p:childTnLst>
@@ -4259,11 +4366,11 @@
                             </p:stCondLst>
                             <p:childTnLst>
                               <p:par>
-                                <p:cTn id="46" presetClass="entr" nodeType="afterEffect" presetSubtype="0" presetID="1" grpId="13" fill="hold">
+                                <p:cTn id="46" presetID="1" presetClass="entr" presetSubtype="0" fill="hold" grpId="13" nodeType="afterEffect">
                                   <p:stCondLst>
                                     <p:cond delay="0"/>
                                   </p:stCondLst>
-                                  <p:iterate type="el" backwards="0">
+                                  <p:iterate>
                                     <p:tmAbs val="0"/>
                                   </p:iterate>
                                   <p:childTnLst>
@@ -4293,14 +4400,14 @@
                 </p:childTnLst>
               </p:cTn>
               <p:prevCondLst>
-                <p:cond evt="onPrev">
+                <p:cond evt="onPrev" delay="0">
                   <p:tgtEl>
                     <p:sldTgt/>
                   </p:tgtEl>
                 </p:cond>
               </p:prevCondLst>
               <p:nextCondLst>
-                <p:cond evt="onNext">
+                <p:cond evt="onNext" delay="0">
                   <p:tgtEl>
                     <p:sldTgt/>
                   </p:tgtEl>
@@ -4312,26 +4419,26 @@
       </p:par>
     </p:tnLst>
     <p:bldLst>
-      <p:bldP build="whole" bldLvl="1" animBg="1" rev="0" advAuto="0" spid="168" grpId="12"/>
-      <p:bldP build="whole" bldLvl="1" animBg="1" rev="0" advAuto="0" spid="163" grpId="2"/>
-      <p:bldP build="whole" bldLvl="1" animBg="1" rev="0" advAuto="0" spid="169" grpId="11"/>
-      <p:bldP build="whole" bldLvl="1" animBg="1" rev="0" advAuto="0" spid="170" grpId="13"/>
-      <p:bldP build="whole" bldLvl="1" animBg="1" rev="0" advAuto="0" spid="160" grpId="7"/>
-      <p:bldP build="whole" bldLvl="1" animBg="1" rev="0" advAuto="0" spid="160" grpId="10"/>
-      <p:bldP build="whole" bldLvl="1" animBg="1" rev="0" advAuto="0" spid="165" grpId="1"/>
-      <p:bldP build="whole" bldLvl="1" animBg="1" rev="0" advAuto="0" spid="165" grpId="4"/>
-      <p:bldP build="whole" bldLvl="1" animBg="1" rev="0" advAuto="0" spid="162" grpId="5"/>
-      <p:bldP build="whole" bldLvl="1" animBg="1" rev="0" advAuto="0" spid="166" grpId="8"/>
-      <p:bldP build="whole" bldLvl="1" animBg="1" rev="0" advAuto="0" spid="167" grpId="9"/>
-      <p:bldP build="whole" bldLvl="1" animBg="1" rev="0" advAuto="0" spid="161" grpId="6"/>
-      <p:bldP build="whole" bldLvl="1" animBg="1" rev="0" advAuto="0" spid="164" grpId="3"/>
+      <p:bldP spid="160" grpId="7" animBg="1" advAuto="0"/>
+      <p:bldP spid="160" grpId="10" animBg="1" advAuto="0"/>
+      <p:bldP spid="161" grpId="6" animBg="1" advAuto="0"/>
+      <p:bldP spid="162" grpId="5" animBg="1" advAuto="0"/>
+      <p:bldP spid="163" grpId="2" animBg="1" advAuto="0"/>
+      <p:bldP spid="164" grpId="3" animBg="1" advAuto="0"/>
+      <p:bldP spid="165" grpId="1" animBg="1" advAuto="0"/>
+      <p:bldP spid="165" grpId="4" animBg="1" advAuto="0"/>
+      <p:bldP spid="166" grpId="8" animBg="1" advAuto="0"/>
+      <p:bldP spid="167" grpId="9" animBg="1" advAuto="0"/>
+      <p:bldP spid="168" grpId="12" animBg="1" advAuto="0"/>
+      <p:bldP spid="169" grpId="11" animBg="1" advAuto="0"/>
+      <p:bldP spid="170" grpId="13" animBg="1" advAuto="0"/>
     </p:bldLst>
   </p:timing>
 </p:sld>
 </file>
 
 <file path=ppt/slides/slide13.xml><?xml version="1.0" encoding="utf-8"?>
-<p:sld xmlns:a="http://schemas.openxmlformats.org/drawingml/2006/main" xmlns:r="http://schemas.openxmlformats.org/officeDocument/2006/relationships" xmlns:p="http://schemas.openxmlformats.org/presentationml/2006/main" showMasterSp="1" showMasterPhAnim="1">
+<p:sld xmlns:a="http://schemas.openxmlformats.org/drawingml/2006/main" xmlns:r="http://schemas.openxmlformats.org/officeDocument/2006/relationships" xmlns:p="http://schemas.openxmlformats.org/presentationml/2006/main">
   <p:cSld>
     <p:spTree>
       <p:nvGrpSpPr>
@@ -4350,7 +4457,9 @@
       <p:sp>
         <p:nvSpPr>
           <p:cNvPr id="172" name="Shape 172"/>
-          <p:cNvSpPr/>
+          <p:cNvSpPr>
+            <a:spLocks noGrp="1"/>
+          </p:cNvSpPr>
           <p:nvPr>
             <p:ph type="title"/>
           </p:nvPr>
@@ -4364,7 +4473,6 @@
           <a:bodyPr/>
           <a:lstStyle/>
           <a:p>
-            <a:pPr/>
             <a:r>
               <a:t>Jadi apa itu Object</a:t>
             </a:r>
@@ -4400,7 +4508,6 @@
           </a:bodyPr>
           <a:lstStyle/>
           <a:p>
-            <a:pPr/>
             <a:r>
               <a:t>Object adalah benda, bisa apa saja yang bisa di definisikan/di deskripsikan menjadi </a:t>
             </a:r>
@@ -4421,7 +4528,6 @@
             </a:r>
           </a:p>
           <a:p>
-            <a:pPr/>
             <a:r>
               <a:rPr b="1">
                 <a:latin typeface="Helvetica"/>
@@ -4511,7 +4617,6 @@
             </a:lvl1pPr>
           </a:lstStyle>
           <a:p>
-            <a:pPr/>
             <a:r>
               <a:t>Contoh</a:t>
             </a:r>
@@ -4547,7 +4652,6 @@
           </a:bodyPr>
           <a:lstStyle/>
           <a:p>
-            <a:pPr/>
             <a:r>
               <a:t>Car</a:t>
             </a:r>
@@ -4583,7 +4687,6 @@
           </a:bodyPr>
           <a:lstStyle/>
           <a:p>
-            <a:pPr/>
             <a:r>
               <a:t>Home</a:t>
             </a:r>
@@ -4619,7 +4722,6 @@
           </a:bodyPr>
           <a:lstStyle/>
           <a:p>
-            <a:pPr/>
             <a:r>
               <a:t>Buah</a:t>
             </a:r>
@@ -4655,7 +4757,6 @@
           </a:bodyPr>
           <a:lstStyle/>
           <a:p>
-            <a:pPr/>
             <a:r>
               <a:t>Person</a:t>
             </a:r>
@@ -4691,7 +4792,6 @@
           </a:bodyPr>
           <a:lstStyle/>
           <a:p>
-            <a:pPr/>
             <a:r>
               <a:t>Joni</a:t>
             </a:r>
@@ -4727,7 +4827,6 @@
           </a:bodyPr>
           <a:lstStyle/>
           <a:p>
-            <a:pPr/>
             <a:r>
               <a:t>dan lain-lain</a:t>
             </a:r>
@@ -4762,6 +4861,7 @@
             <a:pPr>
               <a:defRPr sz="2400"/>
             </a:pPr>
+            <a:endParaRPr/>
           </a:p>
         </p:txBody>
       </p:sp>
@@ -4770,14 +4870,21 @@
   <p:clrMapOvr>
     <a:masterClrMapping/>
   </p:clrMapOvr>
-  <p:transition xmlns:p14="http://schemas.microsoft.com/office/powerpoint/2010/main" spd="slow" advClick="1" p14:dur="3000"/>
+  <mc:AlternateContent xmlns:mc="http://schemas.openxmlformats.org/markup-compatibility/2006">
+    <mc:Choice xmlns:p14="http://schemas.microsoft.com/office/powerpoint/2010/main" Requires="p14">
+      <p:transition spd="slow" p14:dur="3000"/>
+    </mc:Choice>
+    <mc:Fallback>
+      <p:transition spd="slow"/>
+    </mc:Fallback>
+  </mc:AlternateContent>
   <p:timing>
     <p:tnLst>
       <p:par>
-        <p:cTn id="1" nodeType="tmRoot" restart="never" dur="indefinite" fill="hold">
+        <p:cTn id="1" dur="indefinite" restart="never" fill="hold" nodeType="tmRoot">
           <p:childTnLst>
             <p:seq concurrent="1" prevAc="none" nextAc="seek">
-              <p:cTn id="2" nodeType="mainSeq" dur="indefinite" fill="hold">
+              <p:cTn id="2" dur="indefinite" fill="hold" nodeType="mainSeq">
                 <p:childTnLst>
                   <p:par>
                     <p:cTn id="3" fill="hold">
@@ -4792,11 +4899,11 @@
                             </p:stCondLst>
                             <p:childTnLst>
                               <p:par>
-                                <p:cTn id="5" presetClass="entr" nodeType="clickEffect" presetSubtype="1" presetID="2" grpId="1" fill="hold">
+                                <p:cTn id="5" presetID="2" presetClass="entr" presetSubtype="1" fill="hold" grpId="1" nodeType="clickEffect">
                                   <p:stCondLst>
                                     <p:cond delay="0"/>
                                   </p:stCondLst>
-                                  <p:iterate type="el" backwards="0">
+                                  <p:iterate>
                                     <p:tmAbs val="0"/>
                                   </p:iterate>
                                   <p:childTnLst>
@@ -4882,11 +4989,11 @@
                             </p:stCondLst>
                             <p:childTnLst>
                               <p:par>
-                                <p:cTn id="11" presetClass="entr" nodeType="clickEffect" presetSubtype="0" presetID="1" grpId="2" fill="hold">
+                                <p:cTn id="11" presetID="1" presetClass="entr" presetSubtype="0" fill="hold" grpId="2" nodeType="clickEffect">
                                   <p:stCondLst>
                                     <p:cond delay="0"/>
                                   </p:stCondLst>
-                                  <p:iterate type="el" backwards="0">
+                                  <p:iterate>
                                     <p:tmAbs val="0"/>
                                   </p:iterate>
                                   <p:childTnLst>
@@ -4926,11 +5033,11 @@
                             </p:stCondLst>
                             <p:childTnLst>
                               <p:par>
-                                <p:cTn id="15" presetClass="entr" nodeType="clickEffect" presetSubtype="0" presetID="1" grpId="3" fill="hold">
+                                <p:cTn id="15" presetID="1" presetClass="entr" presetSubtype="0" fill="hold" grpId="3" nodeType="clickEffect">
                                   <p:stCondLst>
                                     <p:cond delay="0"/>
                                   </p:stCondLst>
-                                  <p:iterate type="el" backwards="0">
+                                  <p:iterate>
                                     <p:tmAbs val="0"/>
                                   </p:iterate>
                                   <p:childTnLst>
@@ -4970,11 +5077,11 @@
                             </p:stCondLst>
                             <p:childTnLst>
                               <p:par>
-                                <p:cTn id="19" presetClass="entr" nodeType="clickEffect" presetSubtype="0" presetID="1" grpId="4" fill="hold">
+                                <p:cTn id="19" presetID="1" presetClass="entr" presetSubtype="0" fill="hold" grpId="4" nodeType="clickEffect">
                                   <p:stCondLst>
                                     <p:cond delay="0"/>
                                   </p:stCondLst>
-                                  <p:iterate type="el" backwards="0">
+                                  <p:iterate>
                                     <p:tmAbs val="0"/>
                                   </p:iterate>
                                   <p:childTnLst>
@@ -5014,11 +5121,11 @@
                             </p:stCondLst>
                             <p:childTnLst>
                               <p:par>
-                                <p:cTn id="23" presetClass="entr" nodeType="clickEffect" presetSubtype="0" presetID="1" grpId="5" fill="hold">
+                                <p:cTn id="23" presetID="1" presetClass="entr" presetSubtype="0" fill="hold" grpId="5" nodeType="clickEffect">
                                   <p:stCondLst>
                                     <p:cond delay="0"/>
                                   </p:stCondLst>
-                                  <p:iterate type="el" backwards="0">
+                                  <p:iterate>
                                     <p:tmAbs val="0"/>
                                   </p:iterate>
                                   <p:childTnLst>
@@ -5058,11 +5165,11 @@
                             </p:stCondLst>
                             <p:childTnLst>
                               <p:par>
-                                <p:cTn id="27" presetClass="entr" nodeType="clickEffect" presetSubtype="0" presetID="1" grpId="6" fill="hold">
+                                <p:cTn id="27" presetID="1" presetClass="entr" presetSubtype="0" fill="hold" grpId="6" nodeType="clickEffect">
                                   <p:stCondLst>
                                     <p:cond delay="0"/>
                                   </p:stCondLst>
-                                  <p:iterate type="el" backwards="0">
+                                  <p:iterate>
                                     <p:tmAbs val="0"/>
                                   </p:iterate>
                                   <p:childTnLst>
@@ -5102,11 +5209,11 @@
                             </p:stCondLst>
                             <p:childTnLst>
                               <p:par>
-                                <p:cTn id="31" presetClass="entr" nodeType="clickEffect" presetSubtype="0" presetID="1" grpId="7" fill="hold">
+                                <p:cTn id="31" presetID="1" presetClass="entr" presetSubtype="0" fill="hold" grpId="7" nodeType="clickEffect">
                                   <p:stCondLst>
                                     <p:cond delay="0"/>
                                   </p:stCondLst>
-                                  <p:iterate type="el" backwards="0">
+                                  <p:iterate>
                                     <p:tmAbs val="0"/>
                                   </p:iterate>
                                   <p:childTnLst>
@@ -5146,11 +5253,11 @@
                             </p:stCondLst>
                             <p:childTnLst>
                               <p:par>
-                                <p:cTn id="35" presetClass="entr" nodeType="clickEffect" presetSubtype="0" presetID="1" grpId="8" fill="hold">
+                                <p:cTn id="35" presetID="1" presetClass="entr" presetSubtype="0" fill="hold" grpId="8" nodeType="clickEffect">
                                   <p:stCondLst>
                                     <p:cond delay="0"/>
                                   </p:stCondLst>
-                                  <p:iterate type="el" backwards="0">
+                                  <p:iterate>
                                     <p:tmAbs val="0"/>
                                   </p:iterate>
                                   <p:childTnLst>
@@ -5190,11 +5297,11 @@
                             </p:stCondLst>
                             <p:childTnLst>
                               <p:par>
-                                <p:cTn id="39" presetClass="entr" nodeType="clickEffect" presetSubtype="0" presetID="1" grpId="9" fill="hold">
+                                <p:cTn id="39" presetID="1" presetClass="entr" presetSubtype="0" fill="hold" grpId="9" nodeType="clickEffect">
                                   <p:stCondLst>
                                     <p:cond delay="0"/>
                                   </p:stCondLst>
-                                  <p:iterate type="el" backwards="0">
+                                  <p:iterate>
                                     <p:tmAbs val="0"/>
                                   </p:iterate>
                                   <p:childTnLst>
@@ -5224,14 +5331,14 @@
                 </p:childTnLst>
               </p:cTn>
               <p:prevCondLst>
-                <p:cond evt="onPrev">
+                <p:cond evt="onPrev" delay="0">
                   <p:tgtEl>
                     <p:sldTgt/>
                   </p:tgtEl>
                 </p:cond>
               </p:prevCondLst>
               <p:nextCondLst>
-                <p:cond evt="onNext">
+                <p:cond evt="onNext" delay="0">
                   <p:tgtEl>
                     <p:sldTgt/>
                   </p:tgtEl>
@@ -5243,22 +5350,22 @@
       </p:par>
     </p:tnLst>
     <p:bldLst>
-      <p:bldP build="whole" bldLvl="1" animBg="1" rev="0" advAuto="0" spid="179" grpId="8"/>
-      <p:bldP build="whole" bldLvl="1" animBg="1" rev="0" advAuto="0" spid="174" grpId="3"/>
-      <p:bldP build="whole" bldLvl="1" animBg="1" rev="0" advAuto="0" spid="175" grpId="4"/>
-      <p:bldP build="whole" bldLvl="1" animBg="1" rev="0" advAuto="0" spid="180" grpId="9"/>
-      <p:bldP build="whole" bldLvl="1" animBg="1" rev="0" advAuto="0" spid="177" grpId="6"/>
-      <p:bldP build="whole" bldLvl="1" animBg="1" rev="0" advAuto="0" spid="173" grpId="1"/>
-      <p:bldP build="whole" bldLvl="1" animBg="1" rev="0" advAuto="0" spid="181" grpId="2"/>
-      <p:bldP build="whole" bldLvl="1" animBg="1" rev="0" advAuto="0" spid="176" grpId="5"/>
-      <p:bldP build="whole" bldLvl="1" animBg="1" rev="0" advAuto="0" spid="178" grpId="7"/>
+      <p:bldP spid="173" grpId="1" animBg="1" advAuto="0"/>
+      <p:bldP spid="174" grpId="3" animBg="1" advAuto="0"/>
+      <p:bldP spid="175" grpId="4" animBg="1" advAuto="0"/>
+      <p:bldP spid="176" grpId="5" animBg="1" advAuto="0"/>
+      <p:bldP spid="177" grpId="6" animBg="1" advAuto="0"/>
+      <p:bldP spid="178" grpId="7" animBg="1" advAuto="0"/>
+      <p:bldP spid="179" grpId="8" animBg="1" advAuto="0"/>
+      <p:bldP spid="180" grpId="9" animBg="1" advAuto="0"/>
+      <p:bldP spid="181" grpId="2" animBg="1" advAuto="0"/>
     </p:bldLst>
   </p:timing>
 </p:sld>
 </file>
 
 <file path=ppt/slides/slide14.xml><?xml version="1.0" encoding="utf-8"?>
-<p:sld xmlns:a="http://schemas.openxmlformats.org/drawingml/2006/main" xmlns:r="http://schemas.openxmlformats.org/officeDocument/2006/relationships" xmlns:p="http://schemas.openxmlformats.org/presentationml/2006/main" showMasterSp="1" showMasterPhAnim="1">
+<p:sld xmlns:a="http://schemas.openxmlformats.org/drawingml/2006/main" xmlns:r="http://schemas.openxmlformats.org/officeDocument/2006/relationships" xmlns:p="http://schemas.openxmlformats.org/presentationml/2006/main">
   <p:cSld>
     <p:spTree>
       <p:nvGrpSpPr>
@@ -5277,7 +5384,9 @@
       <p:sp>
         <p:nvSpPr>
           <p:cNvPr id="183" name="Shape 183"/>
-          <p:cNvSpPr/>
+          <p:cNvSpPr>
+            <a:spLocks noGrp="1"/>
+          </p:cNvSpPr>
           <p:nvPr>
             <p:ph type="title"/>
           </p:nvPr>
@@ -5295,7 +5404,6 @@
             </a:lvl1pPr>
           </a:lstStyle>
           <a:p>
-            <a:pPr/>
             <a:r>
               <a:t>Perbedaan Array &amp; Object</a:t>
             </a:r>
@@ -5333,7 +5441,6 @@
             <a:lvl1pPr algn="l"/>
           </a:lstStyle>
           <a:p>
-            <a:pPr/>
             <a:r>
               <a:t>Array adalah list dari Object</a:t>
             </a:r>
@@ -5400,6 +5507,7 @@
             <a:pPr>
               <a:defRPr sz="2400"/>
             </a:pPr>
+            <a:endParaRPr/>
           </a:p>
         </p:txBody>
       </p:sp>
@@ -5434,6 +5542,7 @@
             <a:pPr>
               <a:defRPr sz="2400"/>
             </a:pPr>
+            <a:endParaRPr/>
           </a:p>
         </p:txBody>
       </p:sp>
@@ -5466,6 +5575,7 @@
             <a:pPr>
               <a:defRPr sz="2400"/>
             </a:pPr>
+            <a:endParaRPr/>
           </a:p>
         </p:txBody>
       </p:sp>
@@ -5514,7 +5624,6 @@
             </a:lvl1pPr>
           </a:lstStyle>
           <a:p>
-            <a:pPr/>
             <a:r>
               <a:t>Dikelompokan dengan []</a:t>
             </a:r>
@@ -5552,6 +5661,7 @@
             <a:pPr>
               <a:defRPr sz="2400"/>
             </a:pPr>
+            <a:endParaRPr/>
           </a:p>
         </p:txBody>
       </p:sp>
@@ -5587,6 +5697,7 @@
             <a:pPr>
               <a:defRPr sz="2400"/>
             </a:pPr>
+            <a:endParaRPr/>
           </a:p>
         </p:txBody>
       </p:sp>
@@ -5634,7 +5745,6 @@
             </a:lvl1pPr>
           </a:lstStyle>
           <a:p>
-            <a:pPr/>
             <a:r>
               <a:t>Indentifikasi Otomatis dengan Index</a:t>
             </a:r>
@@ -5672,7 +5782,6 @@
             <a:lvl1pPr algn="l"/>
           </a:lstStyle>
           <a:p>
-            <a:pPr/>
             <a:r>
               <a:t>var shopList = [‘Apple’, ‘Orange’, ‘Pear’]</a:t>
             </a:r>
@@ -5684,12 +5793,12 @@
   <p:clrMapOvr>
     <a:masterClrMapping/>
   </p:clrMapOvr>
-  <p:transition xmlns:p14="http://schemas.microsoft.com/office/powerpoint/2010/main" spd="med" advClick="1" p14:dur="1000"/>
+  <p:transition spd="slow"/>
 </p:sld>
 </file>
 
 <file path=ppt/slides/slide15.xml><?xml version="1.0" encoding="utf-8"?>
-<p:sld xmlns:a="http://schemas.openxmlformats.org/drawingml/2006/main" xmlns:r="http://schemas.openxmlformats.org/officeDocument/2006/relationships" xmlns:p="http://schemas.openxmlformats.org/presentationml/2006/main" showMasterSp="1" showMasterPhAnim="1">
+<p:sld xmlns:a="http://schemas.openxmlformats.org/drawingml/2006/main" xmlns:r="http://schemas.openxmlformats.org/officeDocument/2006/relationships" xmlns:p="http://schemas.openxmlformats.org/presentationml/2006/main">
   <p:cSld>
     <p:spTree>
       <p:nvGrpSpPr>
@@ -5743,7 +5852,6 @@
             </a:lvl1pPr>
           </a:lstStyle>
           <a:p>
-            <a:pPr/>
             <a:r>
               <a:t>Tugas</a:t>
             </a:r>
@@ -5781,7 +5889,6 @@
             <a:lvl1pPr algn="l"/>
           </a:lstStyle>
           <a:p>
-            <a:pPr/>
             <a:r>
               <a:t>1. Buatlah sebuah Array yang memuat 5 buah element/data, yang masing-masing element/data nya berupa object. Contoh Car. Dan beri nama Array tersebut (terserah anda).</a:t>
             </a:r>
@@ -5819,7 +5926,6 @@
             <a:lvl1pPr algn="l"/>
           </a:lstStyle>
           <a:p>
-            <a:pPr/>
             <a:r>
               <a:t>2. Buatlah 5 buah Object dari ke 5 buah element/data Array tersebut diatas. Syarat Object terdiri dari 3 buah property dan 2 buah Action/Method/Function.</a:t>
             </a:r>
@@ -5831,12 +5937,12 @@
   <p:clrMapOvr>
     <a:masterClrMapping/>
   </p:clrMapOvr>
-  <p:transition xmlns:p14="http://schemas.microsoft.com/office/powerpoint/2010/main" spd="med" advClick="1" p14:dur="1000"/>
+  <p:transition spd="slow"/>
 </p:sld>
 </file>
 
 <file path=ppt/slides/slide16.xml><?xml version="1.0" encoding="utf-8"?>
-<p:sld xmlns:a="http://schemas.openxmlformats.org/drawingml/2006/main" xmlns:r="http://schemas.openxmlformats.org/officeDocument/2006/relationships" xmlns:p="http://schemas.openxmlformats.org/presentationml/2006/main" showMasterSp="1" showMasterPhAnim="1">
+<p:sld xmlns:a="http://schemas.openxmlformats.org/drawingml/2006/main" xmlns:r="http://schemas.openxmlformats.org/officeDocument/2006/relationships" xmlns:p="http://schemas.openxmlformats.org/presentationml/2006/main">
   <p:cSld>
     <p:spTree>
       <p:nvGrpSpPr>
@@ -5855,7 +5961,9 @@
       <p:sp>
         <p:nvSpPr>
           <p:cNvPr id="199" name="Shape 199"/>
-          <p:cNvSpPr/>
+          <p:cNvSpPr>
+            <a:spLocks noGrp="1"/>
+          </p:cNvSpPr>
           <p:nvPr>
             <p:ph type="title"/>
           </p:nvPr>
@@ -5873,7 +5981,6 @@
             </a:lvl1pPr>
           </a:lstStyle>
           <a:p>
-            <a:pPr/>
             <a:r>
               <a:t>Cara menyisipkan Array dan Object</a:t>
             </a:r>
@@ -5909,19 +6016,16 @@
           </a:bodyPr>
           <a:lstStyle/>
           <a:p>
-            <a:pPr/>
             <a:r>
               <a:t>Array di dalam Array,</a:t>
             </a:r>
           </a:p>
           <a:p>
-            <a:pPr/>
             <a:r>
               <a:t>Array didalam Object dan sebaliknya,</a:t>
             </a:r>
           </a:p>
           <a:p>
-            <a:pPr/>
             <a:r>
               <a:t>Object di dalam Object.</a:t>
             </a:r>
@@ -5933,12 +6037,12 @@
   <p:clrMapOvr>
     <a:masterClrMapping/>
   </p:clrMapOvr>
-  <p:transition xmlns:p14="http://schemas.microsoft.com/office/powerpoint/2010/main" spd="med" advClick="1" p14:dur="1000"/>
+  <p:transition spd="slow"/>
 </p:sld>
 </file>
 
 <file path=ppt/slides/slide17.xml><?xml version="1.0" encoding="utf-8"?>
-<p:sld xmlns:a="http://schemas.openxmlformats.org/drawingml/2006/main" xmlns:r="http://schemas.openxmlformats.org/officeDocument/2006/relationships" xmlns:p="http://schemas.openxmlformats.org/presentationml/2006/main" showMasterSp="1" showMasterPhAnim="1">
+<p:sld xmlns:a="http://schemas.openxmlformats.org/drawingml/2006/main" xmlns:r="http://schemas.openxmlformats.org/officeDocument/2006/relationships" xmlns:p="http://schemas.openxmlformats.org/presentationml/2006/main">
   <p:cSld>
     <p:spTree>
       <p:nvGrpSpPr>
@@ -5957,7 +6061,9 @@
       <p:sp>
         <p:nvSpPr>
           <p:cNvPr id="202" name="Shape 202"/>
-          <p:cNvSpPr/>
+          <p:cNvSpPr>
+            <a:spLocks noGrp="1"/>
+          </p:cNvSpPr>
           <p:nvPr>
             <p:ph type="title"/>
           </p:nvPr>
@@ -5971,7 +6077,6 @@
           <a:bodyPr/>
           <a:lstStyle/>
           <a:p>
-            <a:pPr/>
             <a:r>
               <a:t>Continue Learning</a:t>
             </a:r>
@@ -6008,7 +6113,7 @@
           <a:lstStyle>
             <a:lvl1pPr>
               <a:defRPr u="sng">
-                <a:hlinkClick r:id="rId2" invalidUrl="" action="" tgtFrame="" tooltip="" history="1" highlightClick="0" endSnd="0"/>
+                <a:hlinkClick r:id="rId2"/>
               </a:defRPr>
             </a:lvl1pPr>
           </a:lstStyle>
@@ -6018,7 +6123,7 @@
             </a:pPr>
             <a:r>
               <a:rPr u="sng">
-                <a:hlinkClick r:id="rId2" invalidUrl="" action="" tgtFrame="" tooltip="" history="1" highlightClick="0" endSnd="0"/>
+                <a:hlinkClick r:id="rId2"/>
               </a:rPr>
               <a:t>https://github.com/vanbumi/JavaScript-Tutorial</a:t>
             </a:r>
@@ -6030,12 +6135,12 @@
   <p:clrMapOvr>
     <a:masterClrMapping/>
   </p:clrMapOvr>
-  <p:transition xmlns:p14="http://schemas.microsoft.com/office/powerpoint/2010/main" spd="med" advClick="1" p14:dur="1000"/>
+  <p:transition spd="slow"/>
 </p:sld>
 </file>
 
 <file path=ppt/slides/slide18.xml><?xml version="1.0" encoding="utf-8"?>
-<p:sld xmlns:a="http://schemas.openxmlformats.org/drawingml/2006/main" xmlns:r="http://schemas.openxmlformats.org/officeDocument/2006/relationships" xmlns:p="http://schemas.openxmlformats.org/presentationml/2006/main" showMasterSp="1" showMasterPhAnim="1">
+<p:sld xmlns:a="http://schemas.openxmlformats.org/drawingml/2006/main" xmlns:r="http://schemas.openxmlformats.org/officeDocument/2006/relationships" xmlns:p="http://schemas.openxmlformats.org/presentationml/2006/main">
   <p:cSld>
     <p:spTree>
       <p:nvGrpSpPr>
@@ -6054,7 +6159,9 @@
       <p:sp>
         <p:nvSpPr>
           <p:cNvPr id="205" name="Shape 205"/>
-          <p:cNvSpPr/>
+          <p:cNvSpPr>
+            <a:spLocks noGrp="1"/>
+          </p:cNvSpPr>
           <p:nvPr>
             <p:ph type="title"/>
           </p:nvPr>
@@ -6072,7 +6179,6 @@
           <a:bodyPr/>
           <a:lstStyle/>
           <a:p>
-            <a:pPr/>
             <a:r>
               <a:t>Element Manipulation</a:t>
             </a:r>
@@ -6084,12 +6190,12 @@
   <p:clrMapOvr>
     <a:masterClrMapping/>
   </p:clrMapOvr>
-  <p:transition xmlns:p14="http://schemas.microsoft.com/office/powerpoint/2010/main" spd="med" advClick="1" p14:dur="1000"/>
+  <p:transition spd="slow"/>
 </p:sld>
 </file>
 
 <file path=ppt/slides/slide19.xml><?xml version="1.0" encoding="utf-8"?>
-<p:sld xmlns:a="http://schemas.openxmlformats.org/drawingml/2006/main" xmlns:r="http://schemas.openxmlformats.org/officeDocument/2006/relationships" xmlns:p="http://schemas.openxmlformats.org/presentationml/2006/main" showMasterSp="1" showMasterPhAnim="1">
+<p:sld xmlns:a="http://schemas.openxmlformats.org/drawingml/2006/main" xmlns:r="http://schemas.openxmlformats.org/officeDocument/2006/relationships" xmlns:p="http://schemas.openxmlformats.org/presentationml/2006/main">
   <p:cSld>
     <p:spTree>
       <p:nvGrpSpPr>
@@ -6108,7 +6214,9 @@
       <p:sp>
         <p:nvSpPr>
           <p:cNvPr id="207" name="Shape 207"/>
-          <p:cNvSpPr/>
+          <p:cNvSpPr>
+            <a:spLocks noGrp="1"/>
+          </p:cNvSpPr>
           <p:nvPr>
             <p:ph type="title"/>
           </p:nvPr>
@@ -6122,7 +6230,7 @@
           <a:bodyPr/>
           <a:lstStyle/>
           <a:p>
-            <a:pPr/>
+            <a:endParaRPr/>
           </a:p>
         </p:txBody>
       </p:sp>
@@ -6160,12 +6268,12 @@
   <p:clrMapOvr>
     <a:masterClrMapping/>
   </p:clrMapOvr>
-  <p:transition xmlns:p14="http://schemas.microsoft.com/office/powerpoint/2010/main" spd="med" advClick="1" p14:dur="1000"/>
+  <p:transition spd="slow"/>
 </p:sld>
 </file>
 
 <file path=ppt/slides/slide2.xml><?xml version="1.0" encoding="utf-8"?>
-<p:sld xmlns:a="http://schemas.openxmlformats.org/drawingml/2006/main" xmlns:r="http://schemas.openxmlformats.org/officeDocument/2006/relationships" xmlns:p="http://schemas.openxmlformats.org/presentationml/2006/main" showMasterSp="1" showMasterPhAnim="1">
+<p:sld xmlns:a="http://schemas.openxmlformats.org/drawingml/2006/main" xmlns:r="http://schemas.openxmlformats.org/officeDocument/2006/relationships" xmlns:p="http://schemas.openxmlformats.org/presentationml/2006/main">
   <p:cSld>
     <p:spTree>
       <p:nvGrpSpPr>
@@ -6184,7 +6292,9 @@
       <p:sp>
         <p:nvSpPr>
           <p:cNvPr id="122" name="Shape 122"/>
-          <p:cNvSpPr/>
+          <p:cNvSpPr>
+            <a:spLocks noGrp="1"/>
+          </p:cNvSpPr>
           <p:nvPr>
             <p:ph type="title"/>
           </p:nvPr>
@@ -6206,7 +6316,6 @@
             </a:lvl1pPr>
           </a:lstStyle>
           <a:p>
-            <a:pPr/>
             <a:r>
               <a:t>Apa itu JavaScript</a:t>
             </a:r>
@@ -6249,6 +6358,7 @@
           </a:p>
           <a:p>
             <a:pPr algn="l"/>
+            <a:endParaRPr/>
           </a:p>
           <a:p>
             <a:pPr algn="l"/>
@@ -6297,6 +6407,7 @@
               <a:buSzPct val="75000"/>
               <a:buChar char="•"/>
             </a:pPr>
+            <a:endParaRPr/>
           </a:p>
           <a:p>
             <a:pPr algn="l"/>
@@ -6311,12 +6422,19 @@
   <p:clrMapOvr>
     <a:masterClrMapping/>
   </p:clrMapOvr>
-  <p:transition xmlns:p14="http://schemas.microsoft.com/office/powerpoint/2010/main" spd="med" advClick="1" p14:dur="1000"/>
+  <p:transition spd="slow"/>
+  <p:timing>
+    <p:tnLst>
+      <p:par>
+        <p:cTn id="1" dur="indefinite" restart="never" nodeType="tmRoot"/>
+      </p:par>
+    </p:tnLst>
+  </p:timing>
 </p:sld>
 </file>
 
 <file path=ppt/slides/slide20.xml><?xml version="1.0" encoding="utf-8"?>
-<p:sld xmlns:a="http://schemas.openxmlformats.org/drawingml/2006/main" xmlns:r="http://schemas.openxmlformats.org/officeDocument/2006/relationships" xmlns:p="http://schemas.openxmlformats.org/presentationml/2006/main" showMasterSp="1" showMasterPhAnim="1">
+<p:sld xmlns:a="http://schemas.openxmlformats.org/drawingml/2006/main" xmlns:r="http://schemas.openxmlformats.org/officeDocument/2006/relationships" xmlns:p="http://schemas.openxmlformats.org/presentationml/2006/main">
   <p:cSld>
     <p:spTree>
       <p:nvGrpSpPr>
@@ -6335,7 +6453,9 @@
       <p:sp>
         <p:nvSpPr>
           <p:cNvPr id="210" name="Shape 210"/>
-          <p:cNvSpPr/>
+          <p:cNvSpPr>
+            <a:spLocks noGrp="1"/>
+          </p:cNvSpPr>
           <p:nvPr>
             <p:ph type="title"/>
           </p:nvPr>
@@ -6349,7 +6469,7 @@
           <a:bodyPr/>
           <a:lstStyle/>
           <a:p>
-            <a:pPr/>
+            <a:endParaRPr/>
           </a:p>
         </p:txBody>
       </p:sp>
@@ -6381,7 +6501,7 @@
             <a:miter lim="400000"/>
           </a:ln>
           <a:effectLst>
-            <a:reflection blurRad="0" stA="50000" stPos="0" endA="0" endPos="40000" dist="0" dir="5400000" fadeDir="5400000" sx="100000" sy="-100000" kx="0" ky="0" algn="bl" rotWithShape="0"/>
+            <a:reflection stA="50000" endPos="40000" dir="5400000" sy="-100000" algn="bl" rotWithShape="0"/>
           </a:effectLst>
         </p:spPr>
       </p:pic>
@@ -6390,12 +6510,12 @@
   <p:clrMapOvr>
     <a:masterClrMapping/>
   </p:clrMapOvr>
-  <p:transition xmlns:p14="http://schemas.microsoft.com/office/powerpoint/2010/main" spd="med" advClick="1" p14:dur="1000"/>
+  <p:transition spd="slow"/>
 </p:sld>
 </file>
 
 <file path=ppt/slides/slide21.xml><?xml version="1.0" encoding="utf-8"?>
-<p:sld xmlns:a="http://schemas.openxmlformats.org/drawingml/2006/main" xmlns:r="http://schemas.openxmlformats.org/officeDocument/2006/relationships" xmlns:p="http://schemas.openxmlformats.org/presentationml/2006/main" showMasterSp="1" showMasterPhAnim="1">
+<p:sld xmlns:a="http://schemas.openxmlformats.org/drawingml/2006/main" xmlns:r="http://schemas.openxmlformats.org/officeDocument/2006/relationships" xmlns:p="http://schemas.openxmlformats.org/presentationml/2006/main">
   <p:cSld>
     <p:spTree>
       <p:nvGrpSpPr>
@@ -6414,7 +6534,9 @@
       <p:sp>
         <p:nvSpPr>
           <p:cNvPr id="213" name="Shape 213"/>
-          <p:cNvSpPr/>
+          <p:cNvSpPr>
+            <a:spLocks noGrp="1"/>
+          </p:cNvSpPr>
           <p:nvPr>
             <p:ph type="title"/>
           </p:nvPr>
@@ -6428,7 +6550,7 @@
           <a:bodyPr/>
           <a:lstStyle/>
           <a:p>
-            <a:pPr/>
+            <a:endParaRPr/>
           </a:p>
         </p:txBody>
       </p:sp>
@@ -6466,12 +6588,12 @@
   <p:clrMapOvr>
     <a:masterClrMapping/>
   </p:clrMapOvr>
-  <p:transition xmlns:p14="http://schemas.microsoft.com/office/powerpoint/2010/main" spd="med" advClick="1" p14:dur="1000"/>
+  <p:transition spd="slow"/>
 </p:sld>
 </file>
 
 <file path=ppt/slides/slide22.xml><?xml version="1.0" encoding="utf-8"?>
-<p:sld xmlns:a="http://schemas.openxmlformats.org/drawingml/2006/main" xmlns:r="http://schemas.openxmlformats.org/officeDocument/2006/relationships" xmlns:p="http://schemas.openxmlformats.org/presentationml/2006/main" showMasterSp="1" showMasterPhAnim="1">
+<p:sld xmlns:a="http://schemas.openxmlformats.org/drawingml/2006/main" xmlns:r="http://schemas.openxmlformats.org/officeDocument/2006/relationships" xmlns:p="http://schemas.openxmlformats.org/presentationml/2006/main">
   <p:cSld>
     <p:spTree>
       <p:nvGrpSpPr>
@@ -6545,7 +6667,6 @@
           </a:bodyPr>
           <a:lstStyle/>
           <a:p>
-            <a:pPr/>
             <a:r>
               <a:t>Give id for h1</a:t>
             </a:r>
@@ -6557,12 +6678,12 @@
   <p:clrMapOvr>
     <a:masterClrMapping/>
   </p:clrMapOvr>
-  <p:transition xmlns:p14="http://schemas.microsoft.com/office/powerpoint/2010/main" spd="med" advClick="1" p14:dur="1000"/>
+  <p:transition spd="slow"/>
 </p:sld>
 </file>
 
 <file path=ppt/slides/slide23.xml><?xml version="1.0" encoding="utf-8"?>
-<p:sld xmlns:a="http://schemas.openxmlformats.org/drawingml/2006/main" xmlns:r="http://schemas.openxmlformats.org/officeDocument/2006/relationships" xmlns:p="http://schemas.openxmlformats.org/presentationml/2006/main" showMasterSp="1" showMasterPhAnim="1">
+<p:sld xmlns:a="http://schemas.openxmlformats.org/drawingml/2006/main" xmlns:r="http://schemas.openxmlformats.org/officeDocument/2006/relationships" xmlns:p="http://schemas.openxmlformats.org/presentationml/2006/main">
   <p:cSld>
     <p:spTree>
       <p:nvGrpSpPr>
@@ -6645,7 +6766,6 @@
             </a:lvl1pPr>
           </a:lstStyle>
           <a:p>
-            <a:pPr/>
             <a:r>
               <a:t>Create Variable</a:t>
             </a:r>
@@ -6657,12 +6777,12 @@
   <p:clrMapOvr>
     <a:masterClrMapping/>
   </p:clrMapOvr>
-  <p:transition xmlns:p14="http://schemas.microsoft.com/office/powerpoint/2010/main" spd="med" advClick="1" p14:dur="1000"/>
+  <p:transition spd="slow"/>
 </p:sld>
 </file>
 
 <file path=ppt/slides/slide24.xml><?xml version="1.0" encoding="utf-8"?>
-<p:sld xmlns:a="http://schemas.openxmlformats.org/drawingml/2006/main" xmlns:r="http://schemas.openxmlformats.org/officeDocument/2006/relationships" xmlns:p="http://schemas.openxmlformats.org/presentationml/2006/main" showMasterSp="1" showMasterPhAnim="1">
+<p:sld xmlns:a="http://schemas.openxmlformats.org/drawingml/2006/main" xmlns:r="http://schemas.openxmlformats.org/officeDocument/2006/relationships" xmlns:p="http://schemas.openxmlformats.org/presentationml/2006/main">
   <p:cSld>
     <p:spTree>
       <p:nvGrpSpPr>
@@ -6681,7 +6801,9 @@
       <p:sp>
         <p:nvSpPr>
           <p:cNvPr id="222" name="Shape 222"/>
-          <p:cNvSpPr/>
+          <p:cNvSpPr>
+            <a:spLocks noGrp="1"/>
+          </p:cNvSpPr>
           <p:nvPr>
             <p:ph type="title"/>
           </p:nvPr>
@@ -6695,7 +6817,7 @@
           <a:bodyPr/>
           <a:lstStyle/>
           <a:p>
-            <a:pPr/>
+            <a:endParaRPr/>
           </a:p>
         </p:txBody>
       </p:sp>
@@ -6757,7 +6879,7 @@
           </a:bodyPr>
           <a:lstStyle>
             <a:lvl1pPr algn="l">
-              <a:defRPr b="1" sz="2800">
+              <a:defRPr sz="2800" b="1">
                 <a:solidFill>
                   <a:schemeClr val="accent5"/>
                 </a:solidFill>
@@ -6769,7 +6891,6 @@
             </a:lvl1pPr>
           </a:lstStyle>
           <a:p>
-            <a:pPr/>
             <a:r>
               <a:t>Create new file main.js</a:t>
             </a:r>
@@ -6781,12 +6902,12 @@
   <p:clrMapOvr>
     <a:masterClrMapping/>
   </p:clrMapOvr>
-  <p:transition xmlns:p14="http://schemas.microsoft.com/office/powerpoint/2010/main" spd="med" advClick="1" p14:dur="1000"/>
+  <p:transition spd="slow"/>
 </p:sld>
 </file>
 
 <file path=ppt/slides/slide25.xml><?xml version="1.0" encoding="utf-8"?>
-<p:sld xmlns:a="http://schemas.openxmlformats.org/drawingml/2006/main" xmlns:r="http://schemas.openxmlformats.org/officeDocument/2006/relationships" xmlns:p="http://schemas.openxmlformats.org/presentationml/2006/main" showMasterSp="1" showMasterPhAnim="1">
+<p:sld xmlns:a="http://schemas.openxmlformats.org/drawingml/2006/main" xmlns:r="http://schemas.openxmlformats.org/officeDocument/2006/relationships" xmlns:p="http://schemas.openxmlformats.org/presentationml/2006/main">
   <p:cSld>
     <p:spTree>
       <p:nvGrpSpPr>
@@ -6861,7 +6982,7 @@
           <a:lstStyle/>
           <a:p>
             <a:pPr algn="r">
-              <a:defRPr b="1" sz="3000">
+              <a:defRPr sz="3000" b="1">
                 <a:solidFill>
                   <a:schemeClr val="accent5">
                     <a:hueOff val="-444211"/>
@@ -6881,7 +7002,7 @@
           </a:p>
           <a:p>
             <a:pPr algn="r">
-              <a:defRPr b="1" sz="3000">
+              <a:defRPr sz="3000" b="1">
                 <a:solidFill>
                   <a:schemeClr val="accent5">
                     <a:hueOff val="-444211"/>
@@ -6930,7 +7051,7 @@
           </a:bodyPr>
           <a:lstStyle>
             <a:lvl1pPr algn="r">
-              <a:defRPr b="1" sz="3000">
+              <a:defRPr sz="3000" b="1">
                 <a:solidFill>
                   <a:schemeClr val="accent5">
                     <a:hueOff val="-444211"/>
@@ -6946,7 +7067,6 @@
             </a:lvl1pPr>
           </a:lstStyle>
           <a:p>
-            <a:pPr/>
             <a:r>
               <a:t>Membuat id untuk  parent list —&gt; ul</a:t>
             </a:r>
@@ -6958,12 +7078,12 @@
   <p:clrMapOvr>
     <a:masterClrMapping/>
   </p:clrMapOvr>
-  <p:transition xmlns:p14="http://schemas.microsoft.com/office/powerpoint/2010/main" spd="med" advClick="1" p14:dur="1000"/>
+  <p:transition spd="slow"/>
 </p:sld>
 </file>
 
 <file path=ppt/slides/slide26.xml><?xml version="1.0" encoding="utf-8"?>
-<p:sld xmlns:a="http://schemas.openxmlformats.org/drawingml/2006/main" xmlns:r="http://schemas.openxmlformats.org/officeDocument/2006/relationships" xmlns:p="http://schemas.openxmlformats.org/presentationml/2006/main" showMasterSp="1" showMasterPhAnim="1">
+<p:sld xmlns:a="http://schemas.openxmlformats.org/drawingml/2006/main" xmlns:r="http://schemas.openxmlformats.org/officeDocument/2006/relationships" xmlns:p="http://schemas.openxmlformats.org/presentationml/2006/main">
   <p:cSld>
     <p:spTree>
       <p:nvGrpSpPr>
@@ -7082,7 +7202,6 @@
             </a:lvl1pPr>
           </a:lstStyle>
           <a:p>
-            <a:pPr/>
             <a:r>
               <a:t>Membuat variable yang select semua list item</a:t>
             </a:r>
@@ -7118,6 +7237,7 @@
             <a:pPr>
               <a:defRPr sz="2400"/>
             </a:pPr>
+            <a:endParaRPr/>
           </a:p>
         </p:txBody>
       </p:sp>
@@ -7150,6 +7270,7 @@
             <a:pPr>
               <a:defRPr sz="2400"/>
             </a:pPr>
+            <a:endParaRPr/>
           </a:p>
         </p:txBody>
       </p:sp>
@@ -7158,12 +7279,12 @@
   <p:clrMapOvr>
     <a:masterClrMapping/>
   </p:clrMapOvr>
-  <p:transition xmlns:p14="http://schemas.microsoft.com/office/powerpoint/2010/main" spd="med" advClick="1" p14:dur="1000"/>
+  <p:transition spd="slow"/>
 </p:sld>
 </file>
 
 <file path=ppt/slides/slide27.xml><?xml version="1.0" encoding="utf-8"?>
-<p:sld xmlns:a="http://schemas.openxmlformats.org/drawingml/2006/main" xmlns:r="http://schemas.openxmlformats.org/officeDocument/2006/relationships" xmlns:p="http://schemas.openxmlformats.org/presentationml/2006/main" showMasterSp="1" showMasterPhAnim="1">
+<p:sld xmlns:a="http://schemas.openxmlformats.org/drawingml/2006/main" xmlns:r="http://schemas.openxmlformats.org/officeDocument/2006/relationships" xmlns:p="http://schemas.openxmlformats.org/presentationml/2006/main">
   <p:cSld>
     <p:spTree>
       <p:nvGrpSpPr>
@@ -7246,7 +7367,6 @@
             </a:lvl1pPr>
           </a:lstStyle>
           <a:p>
-            <a:pPr/>
             <a:r>
               <a:t>Select masing2 item untuk merubah text</a:t>
             </a:r>
@@ -7258,12 +7378,12 @@
   <p:clrMapOvr>
     <a:masterClrMapping/>
   </p:clrMapOvr>
-  <p:transition xmlns:p14="http://schemas.microsoft.com/office/powerpoint/2010/main" spd="med" advClick="1" p14:dur="1000"/>
+  <p:transition spd="slow"/>
 </p:sld>
 </file>
 
 <file path=ppt/slides/slide28.xml><?xml version="1.0" encoding="utf-8"?>
-<p:sld xmlns:a="http://schemas.openxmlformats.org/drawingml/2006/main" xmlns:r="http://schemas.openxmlformats.org/officeDocument/2006/relationships" xmlns:p="http://schemas.openxmlformats.org/presentationml/2006/main" showMasterSp="1" showMasterPhAnim="1">
+<p:sld xmlns:a="http://schemas.openxmlformats.org/drawingml/2006/main" xmlns:r="http://schemas.openxmlformats.org/officeDocument/2006/relationships" xmlns:p="http://schemas.openxmlformats.org/presentationml/2006/main">
   <p:cSld>
     <p:spTree>
       <p:nvGrpSpPr>
@@ -7282,7 +7402,9 @@
       <p:sp>
         <p:nvSpPr>
           <p:cNvPr id="239" name="Shape 239"/>
-          <p:cNvSpPr/>
+          <p:cNvSpPr>
+            <a:spLocks noGrp="1"/>
+          </p:cNvSpPr>
           <p:nvPr>
             <p:ph type="title"/>
           </p:nvPr>
@@ -7304,7 +7426,6 @@
             </a:lvl1pPr>
           </a:lstStyle>
           <a:p>
-            <a:pPr/>
             <a:r>
               <a:t>Create Loop di file main.js</a:t>
             </a:r>
@@ -7374,12 +7495,12 @@
   <p:clrMapOvr>
     <a:masterClrMapping/>
   </p:clrMapOvr>
-  <p:transition xmlns:p14="http://schemas.microsoft.com/office/powerpoint/2010/main" spd="med" advClick="1" p14:dur="1000"/>
+  <p:transition spd="slow"/>
 </p:sld>
 </file>
 
 <file path=ppt/slides/slide29.xml><?xml version="1.0" encoding="utf-8"?>
-<p:sld xmlns:a="http://schemas.openxmlformats.org/drawingml/2006/main" xmlns:r="http://schemas.openxmlformats.org/officeDocument/2006/relationships" xmlns:p="http://schemas.openxmlformats.org/presentationml/2006/main" showMasterSp="1" showMasterPhAnim="1">
+<p:sld xmlns:a="http://schemas.openxmlformats.org/drawingml/2006/main" xmlns:r="http://schemas.openxmlformats.org/officeDocument/2006/relationships" xmlns:p="http://schemas.openxmlformats.org/presentationml/2006/main">
   <p:cSld>
     <p:spTree>
       <p:nvGrpSpPr>
@@ -7398,7 +7519,9 @@
       <p:sp>
         <p:nvSpPr>
           <p:cNvPr id="243" name="Shape 243"/>
-          <p:cNvSpPr/>
+          <p:cNvSpPr>
+            <a:spLocks noGrp="1"/>
+          </p:cNvSpPr>
           <p:nvPr>
             <p:ph type="title"/>
           </p:nvPr>
@@ -7420,7 +7543,6 @@
             </a:lvl1pPr>
           </a:lstStyle>
           <a:p>
-            <a:pPr/>
             <a:r>
               <a:t>method addEventListener</a:t>
             </a:r>
@@ -7490,12 +7612,12 @@
   <p:clrMapOvr>
     <a:masterClrMapping/>
   </p:clrMapOvr>
-  <p:transition xmlns:p14="http://schemas.microsoft.com/office/powerpoint/2010/main" spd="med" advClick="1" p14:dur="1000"/>
+  <p:transition spd="slow"/>
 </p:sld>
 </file>
 
 <file path=ppt/slides/slide3.xml><?xml version="1.0" encoding="utf-8"?>
-<p:sld xmlns:a="http://schemas.openxmlformats.org/drawingml/2006/main" xmlns:r="http://schemas.openxmlformats.org/officeDocument/2006/relationships" xmlns:p="http://schemas.openxmlformats.org/presentationml/2006/main" showMasterSp="1" showMasterPhAnim="1">
+<p:sld xmlns:a="http://schemas.openxmlformats.org/drawingml/2006/main" xmlns:r="http://schemas.openxmlformats.org/officeDocument/2006/relationships" xmlns:p="http://schemas.openxmlformats.org/presentationml/2006/main">
   <p:cSld>
     <p:spTree>
       <p:nvGrpSpPr>
@@ -7523,7 +7645,7 @@
           <a:blip r:embed="rId2">
             <a:extLst/>
           </a:blip>
-          <a:srcRect l="0" t="0" r="0" b="0"/>
+          <a:srcRect/>
           <a:stretch>
             <a:fillRect/>
           </a:stretch>
@@ -7546,12 +7668,19 @@
   <p:clrMapOvr>
     <a:masterClrMapping/>
   </p:clrMapOvr>
-  <p:transition xmlns:p14="http://schemas.microsoft.com/office/powerpoint/2010/main" spd="med" advClick="1" p14:dur="1000"/>
+  <p:transition spd="slow"/>
+  <p:timing>
+    <p:tnLst>
+      <p:par>
+        <p:cTn id="1" dur="indefinite" restart="never" nodeType="tmRoot"/>
+      </p:par>
+    </p:tnLst>
+  </p:timing>
 </p:sld>
 </file>
 
 <file path=ppt/slides/slide30.xml><?xml version="1.0" encoding="utf-8"?>
-<p:sld xmlns:a="http://schemas.openxmlformats.org/drawingml/2006/main" xmlns:r="http://schemas.openxmlformats.org/officeDocument/2006/relationships" xmlns:p="http://schemas.openxmlformats.org/presentationml/2006/main" showMasterSp="1" showMasterPhAnim="1">
+<p:sld xmlns:a="http://schemas.openxmlformats.org/drawingml/2006/main" xmlns:r="http://schemas.openxmlformats.org/officeDocument/2006/relationships" xmlns:p="http://schemas.openxmlformats.org/presentationml/2006/main">
   <p:cSld>
     <p:spTree>
       <p:nvGrpSpPr>
@@ -7570,7 +7699,9 @@
       <p:sp>
         <p:nvSpPr>
           <p:cNvPr id="247" name="Shape 247"/>
-          <p:cNvSpPr/>
+          <p:cNvSpPr>
+            <a:spLocks noGrp="1"/>
+          </p:cNvSpPr>
           <p:nvPr>
             <p:ph type="title"/>
           </p:nvPr>
@@ -7592,7 +7723,6 @@
             </a:lvl1pPr>
           </a:lstStyle>
           <a:p>
-            <a:pPr/>
             <a:r>
               <a:t>Membuat variable Headline</a:t>
             </a:r>
@@ -7662,12 +7792,12 @@
   <p:clrMapOvr>
     <a:masterClrMapping/>
   </p:clrMapOvr>
-  <p:transition xmlns:p14="http://schemas.microsoft.com/office/powerpoint/2010/main" spd="med" advClick="1" p14:dur="1000"/>
+  <p:transition spd="slow"/>
 </p:sld>
 </file>
 
 <file path=ppt/slides/slide31.xml><?xml version="1.0" encoding="utf-8"?>
-<p:sld xmlns:a="http://schemas.openxmlformats.org/drawingml/2006/main" xmlns:r="http://schemas.openxmlformats.org/officeDocument/2006/relationships" xmlns:p="http://schemas.openxmlformats.org/presentationml/2006/main" showMasterSp="1" showMasterPhAnim="1">
+<p:sld xmlns:a="http://schemas.openxmlformats.org/drawingml/2006/main" xmlns:r="http://schemas.openxmlformats.org/officeDocument/2006/relationships" xmlns:p="http://schemas.openxmlformats.org/presentationml/2006/main">
   <p:cSld>
     <p:spTree>
       <p:nvGrpSpPr>
@@ -7773,7 +7903,9 @@
       <p:sp>
         <p:nvSpPr>
           <p:cNvPr id="254" name="Shape 254"/>
-          <p:cNvSpPr/>
+          <p:cNvSpPr>
+            <a:spLocks noGrp="1"/>
+          </p:cNvSpPr>
           <p:nvPr>
             <p:ph type="title"/>
           </p:nvPr>
@@ -7795,7 +7927,6 @@
             </a:lvl1pPr>
           </a:lstStyle>
           <a:p>
-            <a:pPr/>
             <a:r>
               <a:t>Membuat button click dan membuat item baru</a:t>
             </a:r>
@@ -7847,7 +7978,6 @@
             </a:lvl1pPr>
           </a:lstStyle>
           <a:p>
-            <a:pPr/>
             <a:r>
               <a:t>membuat id untuk button</a:t>
             </a:r>
@@ -7883,6 +8013,7 @@
             <a:pPr>
               <a:defRPr sz="2400"/>
             </a:pPr>
+            <a:endParaRPr/>
           </a:p>
         </p:txBody>
       </p:sp>
@@ -7931,7 +8062,6 @@
             </a:lvl1pPr>
           </a:lstStyle>
           <a:p>
-            <a:pPr/>
             <a:r>
               <a:t>membuat variable button</a:t>
             </a:r>
@@ -8021,7 +8151,7 @@
         </p:spPr>
         <p:txBody>
           <a:bodyPr lIns="50800" tIns="50800" rIns="50800" bIns="50800" anchor="ctr">
-            <a:normAutofit fontScale="100000" lnSpcReduction="0"/>
+            <a:normAutofit/>
           </a:bodyPr>
           <a:lstStyle>
             <a:lvl1pPr defTabSz="297941">
@@ -8033,7 +8163,6 @@
             </a:lvl1pPr>
           </a:lstStyle>
           <a:p>
-            <a:pPr/>
             <a:r>
               <a:t>membuat variable list</a:t>
             </a:r>
@@ -8045,12 +8174,12 @@
   <p:clrMapOvr>
     <a:masterClrMapping/>
   </p:clrMapOvr>
-  <p:transition xmlns:p14="http://schemas.microsoft.com/office/powerpoint/2010/main" spd="med" advClick="1" p14:dur="1000"/>
+  <p:transition spd="slow"/>
 </p:sld>
 </file>
 
 <file path=ppt/slides/slide32.xml><?xml version="1.0" encoding="utf-8"?>
-<p:sld xmlns:a="http://schemas.openxmlformats.org/drawingml/2006/main" xmlns:r="http://schemas.openxmlformats.org/officeDocument/2006/relationships" xmlns:p="http://schemas.openxmlformats.org/presentationml/2006/main" showMasterSp="1" showMasterPhAnim="1">
+<p:sld xmlns:a="http://schemas.openxmlformats.org/drawingml/2006/main" xmlns:r="http://schemas.openxmlformats.org/officeDocument/2006/relationships" xmlns:p="http://schemas.openxmlformats.org/presentationml/2006/main">
   <p:cSld>
     <p:spTree>
       <p:nvGrpSpPr>
@@ -8069,7 +8198,9 @@
       <p:sp>
         <p:nvSpPr>
           <p:cNvPr id="262" name="Shape 262"/>
-          <p:cNvSpPr/>
+          <p:cNvSpPr>
+            <a:spLocks noGrp="1"/>
+          </p:cNvSpPr>
           <p:nvPr>
             <p:ph type="title"/>
           </p:nvPr>
@@ -8099,7 +8230,6 @@
             </a:lvl1pPr>
           </a:lstStyle>
           <a:p>
-            <a:pPr/>
             <a:r>
               <a:t>dicoba click button</a:t>
             </a:r>
@@ -8189,7 +8319,7 @@
         </p:spPr>
         <p:txBody>
           <a:bodyPr lIns="50800" tIns="50800" rIns="50800" bIns="50800" anchor="ctr">
-            <a:normAutofit fontScale="100000" lnSpcReduction="0"/>
+            <a:normAutofit/>
           </a:bodyPr>
           <a:lstStyle>
             <a:lvl1pPr defTabSz="286258">
@@ -8205,7 +8335,6 @@
             </a:lvl1pPr>
           </a:lstStyle>
           <a:p>
-            <a:pPr/>
             <a:r>
               <a:t>tambahkan &lt;li&gt;</a:t>
             </a:r>
@@ -8217,12 +8346,12 @@
   <p:clrMapOvr>
     <a:masterClrMapping/>
   </p:clrMapOvr>
-  <p:transition xmlns:p14="http://schemas.microsoft.com/office/powerpoint/2010/main" spd="med" advClick="1" p14:dur="1000"/>
+  <p:transition spd="slow"/>
 </p:sld>
 </file>
 
 <file path=ppt/slides/slide33.xml><?xml version="1.0" encoding="utf-8"?>
-<p:sld xmlns:a="http://schemas.openxmlformats.org/drawingml/2006/main" xmlns:r="http://schemas.openxmlformats.org/officeDocument/2006/relationships" xmlns:p="http://schemas.openxmlformats.org/presentationml/2006/main" showMasterSp="1" showMasterPhAnim="1">
+<p:sld xmlns:a="http://schemas.openxmlformats.org/drawingml/2006/main" xmlns:r="http://schemas.openxmlformats.org/officeDocument/2006/relationships" xmlns:p="http://schemas.openxmlformats.org/presentationml/2006/main">
   <p:cSld>
     <p:spTree>
       <p:nvGrpSpPr>
@@ -8241,7 +8370,9 @@
       <p:sp>
         <p:nvSpPr>
           <p:cNvPr id="267" name="Shape 267"/>
-          <p:cNvSpPr/>
+          <p:cNvSpPr>
+            <a:spLocks noGrp="1"/>
+          </p:cNvSpPr>
           <p:nvPr>
             <p:ph type="title"/>
           </p:nvPr>
@@ -8267,7 +8398,6 @@
             </a:lvl1pPr>
           </a:lstStyle>
           <a:p>
-            <a:pPr/>
             <a:r>
               <a:t>membuat variable baru newItemCounter</a:t>
             </a:r>
@@ -8386,7 +8516,7 @@
         </p:spPr>
         <p:txBody>
           <a:bodyPr lIns="50800" tIns="50800" rIns="50800" bIns="50800" anchor="ctr">
-            <a:normAutofit fontScale="100000" lnSpcReduction="0"/>
+            <a:normAutofit/>
           </a:bodyPr>
           <a:lstStyle>
             <a:lvl1pPr algn="l" defTabSz="268731">
@@ -8398,7 +8528,6 @@
             </a:lvl1pPr>
           </a:lstStyle>
           <a:p>
-            <a:pPr/>
             <a:r>
               <a:t>update function nya</a:t>
             </a:r>
@@ -8410,12 +8539,12 @@
   <p:clrMapOvr>
     <a:masterClrMapping/>
   </p:clrMapOvr>
-  <p:transition xmlns:p14="http://schemas.microsoft.com/office/powerpoint/2010/main" spd="med" advClick="1" p14:dur="1000"/>
+  <p:transition spd="slow"/>
 </p:sld>
 </file>
 
 <file path=ppt/slides/slide34.xml><?xml version="1.0" encoding="utf-8"?>
-<p:sld xmlns:a="http://schemas.openxmlformats.org/drawingml/2006/main" xmlns:r="http://schemas.openxmlformats.org/officeDocument/2006/relationships" xmlns:p="http://schemas.openxmlformats.org/presentationml/2006/main" showMasterSp="1" showMasterPhAnim="1">
+<p:sld xmlns:a="http://schemas.openxmlformats.org/drawingml/2006/main" xmlns:r="http://schemas.openxmlformats.org/officeDocument/2006/relationships" xmlns:p="http://schemas.openxmlformats.org/presentationml/2006/main">
   <p:cSld>
     <p:spTree>
       <p:nvGrpSpPr>
@@ -8492,7 +8621,9 @@
       <p:sp>
         <p:nvSpPr>
           <p:cNvPr id="275" name="Shape 275"/>
-          <p:cNvSpPr/>
+          <p:cNvSpPr>
+            <a:spLocks noGrp="1"/>
+          </p:cNvSpPr>
           <p:nvPr>
             <p:ph type="title"/>
           </p:nvPr>
@@ -8518,7 +8649,6 @@
             </a:lvl1pPr>
           </a:lstStyle>
           <a:p>
-            <a:pPr/>
             <a:r>
               <a:t>menambahkan background item pada saat di click</a:t>
             </a:r>
@@ -8579,7 +8709,7 @@
         </p:spPr>
         <p:txBody>
           <a:bodyPr lIns="50800" tIns="50800" rIns="50800" bIns="50800" anchor="ctr">
-            <a:normAutofit fontScale="100000" lnSpcReduction="0"/>
+            <a:normAutofit/>
           </a:bodyPr>
           <a:lstStyle>
             <a:lvl1pPr algn="l" defTabSz="268731">
@@ -8591,7 +8721,6 @@
             </a:lvl1pPr>
           </a:lstStyle>
           <a:p>
-            <a:pPr/>
             <a:r>
               <a:t>agar tidak setelah di klik item kembali ke background semula</a:t>
             </a:r>
@@ -8639,7 +8768,6 @@
             </a:lvl1pPr>
           </a:lstStyle>
           <a:p>
-            <a:pPr/>
             <a:r>
               <a:t>end here</a:t>
             </a:r>
@@ -8651,12 +8779,12 @@
   <p:clrMapOvr>
     <a:masterClrMapping/>
   </p:clrMapOvr>
-  <p:transition xmlns:p14="http://schemas.microsoft.com/office/powerpoint/2010/main" spd="med" advClick="1" p14:dur="1000"/>
+  <p:transition spd="slow"/>
 </p:sld>
 </file>
 
 <file path=ppt/slides/slide35.xml><?xml version="1.0" encoding="utf-8"?>
-<p:sld xmlns:a="http://schemas.openxmlformats.org/drawingml/2006/main" xmlns:r="http://schemas.openxmlformats.org/officeDocument/2006/relationships" xmlns:p="http://schemas.openxmlformats.org/presentationml/2006/main" showMasterSp="1" showMasterPhAnim="1">
+<p:sld xmlns:a="http://schemas.openxmlformats.org/drawingml/2006/main" xmlns:r="http://schemas.openxmlformats.org/officeDocument/2006/relationships" xmlns:p="http://schemas.openxmlformats.org/presentationml/2006/main">
   <p:cSld>
     <p:spTree>
       <p:nvGrpSpPr>
@@ -8675,7 +8803,9 @@
       <p:sp>
         <p:nvSpPr>
           <p:cNvPr id="280" name="Shape 280"/>
-          <p:cNvSpPr/>
+          <p:cNvSpPr>
+            <a:spLocks noGrp="1"/>
+          </p:cNvSpPr>
           <p:nvPr>
             <p:ph type="title"/>
           </p:nvPr>
@@ -8689,7 +8819,7 @@
           <a:bodyPr/>
           <a:lstStyle/>
           <a:p>
-            <a:pPr/>
+            <a:endParaRPr/>
           </a:p>
         </p:txBody>
       </p:sp>
@@ -8785,12 +8915,12 @@
   <p:clrMapOvr>
     <a:masterClrMapping/>
   </p:clrMapOvr>
-  <p:transition xmlns:p14="http://schemas.microsoft.com/office/powerpoint/2010/main" spd="med" advClick="1" p14:dur="1000"/>
+  <p:transition spd="slow"/>
 </p:sld>
 </file>
 
 <file path=ppt/slides/slide36.xml><?xml version="1.0" encoding="utf-8"?>
-<p:sld xmlns:a="http://schemas.openxmlformats.org/drawingml/2006/main" xmlns:r="http://schemas.openxmlformats.org/officeDocument/2006/relationships" xmlns:p="http://schemas.openxmlformats.org/presentationml/2006/main" showMasterSp="1" showMasterPhAnim="1">
+<p:sld xmlns:a="http://schemas.openxmlformats.org/drawingml/2006/main" xmlns:r="http://schemas.openxmlformats.org/officeDocument/2006/relationships" xmlns:p="http://schemas.openxmlformats.org/presentationml/2006/main">
   <p:cSld>
     <p:spTree>
       <p:nvGrpSpPr>
@@ -8809,7 +8939,9 @@
       <p:sp>
         <p:nvSpPr>
           <p:cNvPr id="285" name="Shape 285"/>
-          <p:cNvSpPr/>
+          <p:cNvSpPr>
+            <a:spLocks noGrp="1"/>
+          </p:cNvSpPr>
           <p:nvPr>
             <p:ph type="title"/>
           </p:nvPr>
@@ -8823,7 +8955,7 @@
           <a:bodyPr/>
           <a:lstStyle/>
           <a:p>
-            <a:pPr/>
+            <a:endParaRPr/>
           </a:p>
         </p:txBody>
       </p:sp>
@@ -8919,12 +9051,12 @@
   <p:clrMapOvr>
     <a:masterClrMapping/>
   </p:clrMapOvr>
-  <p:transition xmlns:p14="http://schemas.microsoft.com/office/powerpoint/2010/main" spd="med" advClick="1" p14:dur="1000"/>
+  <p:transition spd="slow"/>
 </p:sld>
 </file>
 
 <file path=ppt/slides/slide4.xml><?xml version="1.0" encoding="utf-8"?>
-<p:sld xmlns:a="http://schemas.openxmlformats.org/drawingml/2006/main" xmlns:r="http://schemas.openxmlformats.org/officeDocument/2006/relationships" xmlns:p="http://schemas.openxmlformats.org/presentationml/2006/main" showMasterSp="1" showMasterPhAnim="1">
+<p:sld xmlns:a="http://schemas.openxmlformats.org/drawingml/2006/main" xmlns:r="http://schemas.openxmlformats.org/officeDocument/2006/relationships" xmlns:p="http://schemas.openxmlformats.org/presentationml/2006/main">
   <p:cSld>
     <p:spTree>
       <p:nvGrpSpPr>
@@ -8974,12 +9106,19 @@
   <p:clrMapOvr>
     <a:masterClrMapping/>
   </p:clrMapOvr>
-  <p:transition xmlns:p14="http://schemas.microsoft.com/office/powerpoint/2010/main" spd="med" advClick="1" p14:dur="1000"/>
+  <p:transition spd="slow"/>
+  <p:timing>
+    <p:tnLst>
+      <p:par>
+        <p:cTn id="1" dur="indefinite" restart="never" nodeType="tmRoot"/>
+      </p:par>
+    </p:tnLst>
+  </p:timing>
 </p:sld>
 </file>
 
 <file path=ppt/slides/slide5.xml><?xml version="1.0" encoding="utf-8"?>
-<p:sld xmlns:a="http://schemas.openxmlformats.org/drawingml/2006/main" xmlns:r="http://schemas.openxmlformats.org/officeDocument/2006/relationships" xmlns:p="http://schemas.openxmlformats.org/presentationml/2006/main" showMasterSp="1" showMasterPhAnim="1">
+<p:sld xmlns:a="http://schemas.openxmlformats.org/drawingml/2006/main" xmlns:r="http://schemas.openxmlformats.org/officeDocument/2006/relationships" xmlns:p="http://schemas.openxmlformats.org/presentationml/2006/main">
   <p:cSld>
     <p:spTree>
       <p:nvGrpSpPr>
@@ -9019,7 +9158,7 @@
             <a:miter lim="400000"/>
           </a:ln>
           <a:effectLst>
-            <a:outerShdw sx="100000" sy="100000" kx="0" ky="0" algn="b" rotWithShape="0" blurRad="38100" dist="25400" dir="5400000">
+            <a:outerShdw blurRad="38100" dist="25400" dir="5400000" rotWithShape="0">
               <a:srgbClr val="000000">
                 <a:alpha val="50000"/>
               </a:srgbClr>
@@ -9037,6 +9176,7 @@
                 </a:solidFill>
               </a:defRPr>
             </a:pPr>
+            <a:endParaRPr/>
           </a:p>
         </p:txBody>
       </p:sp>
@@ -9069,7 +9209,6 @@
           </a:bodyPr>
           <a:lstStyle/>
           <a:p>
-            <a:pPr/>
             <a:r>
               <a:rPr b="1">
                 <a:latin typeface="Helvetica"/>
@@ -9114,7 +9253,6 @@
           </a:bodyPr>
           <a:lstStyle/>
           <a:p>
-            <a:pPr/>
             <a:r>
               <a:t>Lightweight</a:t>
             </a:r>
@@ -9154,7 +9292,6 @@
             </a:lvl1pPr>
           </a:lstStyle>
           <a:p>
-            <a:pPr/>
             <a:r>
               <a:t>Cross-platform</a:t>
             </a:r>
@@ -9194,7 +9331,6 @@
             </a:lvl1pPr>
           </a:lstStyle>
           <a:p>
-            <a:pPr/>
             <a:r>
               <a:t>Object Oriented</a:t>
             </a:r>
@@ -9230,7 +9366,6 @@
           </a:bodyPr>
           <a:lstStyle/>
           <a:p>
-            <a:pPr/>
             <a:r>
               <a:t>Programming Language</a:t>
             </a:r>
@@ -9278,7 +9413,6 @@
             </a:lvl1pPr>
           </a:lstStyle>
           <a:p>
-            <a:pPr/>
             <a:r>
               <a:t>Today JS!!</a:t>
             </a:r>
@@ -9323,7 +9457,6 @@
             </a:lvl1pPr>
           </a:lstStyle>
           <a:p>
-            <a:pPr/>
             <a:r>
               <a:t>NODE JS as Server-side language!!</a:t>
             </a:r>
@@ -9359,7 +9492,6 @@
           </a:bodyPr>
           <a:lstStyle/>
           <a:p>
-            <a:pPr/>
             <a:r>
               <a:t>Client-side language</a:t>
             </a:r>
@@ -9371,14 +9503,14 @@
   <p:clrMapOvr>
     <a:masterClrMapping/>
   </p:clrMapOvr>
-  <p:transition xmlns:p14="http://schemas.microsoft.com/office/powerpoint/2010/main" spd="med" advClick="1" p14:dur="1000"/>
+  <p:transition spd="slow"/>
   <p:timing>
     <p:tnLst>
       <p:par>
-        <p:cTn id="1" nodeType="tmRoot" restart="never" dur="indefinite" fill="hold">
+        <p:cTn id="1" dur="indefinite" restart="never" fill="hold" nodeType="tmRoot">
           <p:childTnLst>
             <p:seq concurrent="1" prevAc="none" nextAc="seek">
-              <p:cTn id="2" nodeType="mainSeq" dur="indefinite" fill="hold">
+              <p:cTn id="2" dur="indefinite" fill="hold" nodeType="mainSeq">
                 <p:childTnLst>
                   <p:par>
                     <p:cTn id="3" fill="hold">
@@ -9393,11 +9525,11 @@
                             </p:stCondLst>
                             <p:childTnLst>
                               <p:par>
-                                <p:cTn id="5" presetClass="entr" nodeType="clickEffect" presetSubtype="10" presetID="19" grpId="1" fill="hold">
+                                <p:cTn id="5" presetID="19" presetClass="entr" presetSubtype="10" fill="hold" grpId="1" nodeType="clickEffect">
                                   <p:stCondLst>
                                     <p:cond delay="0"/>
                                   </p:stCondLst>
-                                  <p:iterate type="el" backwards="0">
+                                  <p:iterate>
                                     <p:tmAbs val="0"/>
                                   </p:iterate>
                                   <p:childTnLst>
@@ -9483,11 +9615,11 @@
                             </p:stCondLst>
                             <p:childTnLst>
                               <p:par>
-                                <p:cTn id="11" presetClass="entr" nodeType="clickEffect" presetSubtype="8" presetID="2" grpId="2" fill="hold">
+                                <p:cTn id="11" presetID="2" presetClass="entr" presetSubtype="8" fill="hold" grpId="2" nodeType="clickEffect">
                                   <p:stCondLst>
                                     <p:cond delay="0"/>
                                   </p:stCondLst>
-                                  <p:iterate type="el" backwards="0">
+                                  <p:iterate>
                                     <p:tmAbs val="0"/>
                                   </p:iterate>
                                   <p:childTnLst>
@@ -9573,11 +9705,11 @@
                             </p:stCondLst>
                             <p:childTnLst>
                               <p:par>
-                                <p:cTn id="17" presetClass="entr" nodeType="clickEffect" presetSubtype="32" presetID="23" grpId="3" fill="hold">
+                                <p:cTn id="17" presetID="23" presetClass="entr" presetSubtype="32" fill="hold" grpId="3" nodeType="clickEffect">
                                   <p:stCondLst>
                                     <p:cond delay="0"/>
                                   </p:stCondLst>
-                                  <p:iterate type="el" backwards="0">
+                                  <p:iterate>
                                     <p:tmAbs val="0"/>
                                   </p:iterate>
                                   <p:childTnLst>
@@ -9663,11 +9795,11 @@
                             </p:stCondLst>
                             <p:childTnLst>
                               <p:par>
-                                <p:cTn id="23" presetClass="entr" nodeType="clickEffect" presetSubtype="1" presetID="2" grpId="4" fill="hold">
+                                <p:cTn id="23" presetID="2" presetClass="entr" presetSubtype="1" fill="hold" grpId="4" nodeType="clickEffect">
                                   <p:stCondLst>
                                     <p:cond delay="0"/>
                                   </p:stCondLst>
-                                  <p:iterate type="el" backwards="0">
+                                  <p:iterate>
                                     <p:tmAbs val="0"/>
                                   </p:iterate>
                                   <p:childTnLst>
@@ -9753,11 +9885,11 @@
                             </p:stCondLst>
                             <p:childTnLst>
                               <p:par>
-                                <p:cTn id="29" presetClass="entr" nodeType="clickEffect" presetSubtype="32" presetID="4" grpId="5" fill="hold">
+                                <p:cTn id="29" presetID="4" presetClass="entr" presetSubtype="32" fill="hold" grpId="5" nodeType="clickEffect">
                                   <p:stCondLst>
                                     <p:cond delay="0"/>
                                   </p:stCondLst>
-                                  <p:iterate type="el" backwards="0">
+                                  <p:iterate>
                                     <p:tmAbs val="0"/>
                                   </p:iterate>
                                   <p:childTnLst>
@@ -9775,7 +9907,7 @@
                                         <p:strVal val="visible"/>
                                       </p:to>
                                     </p:set>
-                                    <p:animEffect filter="box(out)" transition="in">
+                                    <p:animEffect transition="in" filter="box(out)">
                                       <p:cBhvr>
                                         <p:cTn id="31" dur="3000"/>
                                         <p:tgtEl>
@@ -9805,11 +9937,11 @@
                             </p:stCondLst>
                             <p:childTnLst>
                               <p:par>
-                                <p:cTn id="34" presetClass="entr" nodeType="clickEffect" presetSubtype="0" presetID="1" grpId="6" fill="hold">
+                                <p:cTn id="34" presetID="1" presetClass="entr" presetSubtype="0" fill="hold" grpId="6" nodeType="clickEffect">
                                   <p:stCondLst>
                                     <p:cond delay="0"/>
                                   </p:stCondLst>
-                                  <p:iterate type="el" backwards="0">
+                                  <p:iterate>
                                     <p:tmAbs val="0"/>
                                   </p:iterate>
                                   <p:childTnLst>
@@ -9840,11 +9972,11 @@
                             </p:stCondLst>
                             <p:childTnLst>
                               <p:par>
-                                <p:cTn id="37" presetClass="entr" nodeType="afterEffect" presetSubtype="0" presetID="1" grpId="7" fill="hold">
+                                <p:cTn id="37" presetID="1" presetClass="entr" presetSubtype="0" fill="hold" grpId="7" nodeType="afterEffect">
                                   <p:stCondLst>
                                     <p:cond delay="0"/>
                                   </p:stCondLst>
-                                  <p:iterate type="el" backwards="0">
+                                  <p:iterate>
                                     <p:tmAbs val="0"/>
                                   </p:iterate>
                                   <p:childTnLst>
@@ -9875,7 +10007,7 @@
                             </p:stCondLst>
                             <p:childTnLst>
                               <p:par>
-                                <p:cTn id="40" presetClass="emph" nodeType="afterEffect" presetSubtype="0" presetID="35" grpId="8" repeatCount="20000" fill="hold">
+                                <p:cTn id="40" presetID="35" presetClass="emph" presetSubtype="0" repeatCount="20000" fill="hold" grpId="8" nodeType="afterEffect">
                                   <p:stCondLst>
                                     <p:cond delay="0"/>
                                   </p:stCondLst>
@@ -9916,11 +10048,11 @@
                             </p:stCondLst>
                             <p:childTnLst>
                               <p:par>
-                                <p:cTn id="43" presetClass="entr" nodeType="afterEffect" presetSubtype="32" presetID="23" grpId="9" fill="hold">
+                                <p:cTn id="43" presetID="23" presetClass="entr" presetSubtype="32" fill="hold" grpId="9" nodeType="afterEffect">
                                   <p:stCondLst>
                                     <p:cond delay="0"/>
                                   </p:stCondLst>
-                                  <p:iterate type="el" backwards="0">
+                                  <p:iterate>
                                     <p:tmAbs val="0"/>
                                   </p:iterate>
                                   <p:childTnLst>
@@ -9996,14 +10128,14 @@
                 </p:childTnLst>
               </p:cTn>
               <p:prevCondLst>
-                <p:cond evt="onPrev">
+                <p:cond evt="onPrev" delay="0">
                   <p:tgtEl>
                     <p:sldTgt/>
                   </p:tgtEl>
                 </p:cond>
               </p:prevCondLst>
               <p:nextCondLst>
-                <p:cond evt="onNext">
+                <p:cond evt="onNext" delay="0">
                   <p:tgtEl>
                     <p:sldTgt/>
                   </p:tgtEl>
@@ -10015,22 +10147,22 @@
       </p:par>
     </p:tnLst>
     <p:bldLst>
-      <p:bldP build="whole" bldLvl="1" animBg="1" rev="0" advAuto="0" spid="133" grpId="3"/>
-      <p:bldP build="whole" bldLvl="1" animBg="1" rev="0" advAuto="0" spid="134" grpId="4"/>
-      <p:bldP build="whole" bldLvl="1" animBg="1" rev="0" advAuto="0" spid="131" grpId="1"/>
-      <p:bldP build="whole" bldLvl="1" animBg="1" rev="0" advAuto="0" spid="137" grpId="5"/>
-      <p:bldP build="whole" bldLvl="1" animBg="1" rev="0" advAuto="0" spid="132" grpId="2"/>
-      <p:bldP build="whole" bldLvl="1" animBg="1" rev="0" advAuto="0" spid="129" grpId="6"/>
-      <p:bldP build="whole" bldLvl="1" animBg="1" rev="0" advAuto="0" spid="135" grpId="7"/>
-      <p:bldP build="whole" bldLvl="1" animBg="1" rev="0" advAuto="0" spid="135" grpId="8"/>
-      <p:bldP build="whole" bldLvl="1" animBg="1" rev="0" advAuto="0" spid="136" grpId="9"/>
+      <p:bldP spid="129" grpId="6" animBg="1" advAuto="0"/>
+      <p:bldP spid="131" grpId="1" animBg="1" advAuto="0"/>
+      <p:bldP spid="132" grpId="2" animBg="1" advAuto="0"/>
+      <p:bldP spid="133" grpId="3" animBg="1" advAuto="0"/>
+      <p:bldP spid="134" grpId="4" animBg="1" advAuto="0"/>
+      <p:bldP spid="135" grpId="7" animBg="1" advAuto="0"/>
+      <p:bldP spid="135" grpId="8" animBg="1" advAuto="0"/>
+      <p:bldP spid="136" grpId="9" animBg="1" advAuto="0"/>
+      <p:bldP spid="137" grpId="5" animBg="1" advAuto="0"/>
     </p:bldLst>
   </p:timing>
 </p:sld>
 </file>
 
 <file path=ppt/slides/slide6.xml><?xml version="1.0" encoding="utf-8"?>
-<p:sld xmlns:a="http://schemas.openxmlformats.org/drawingml/2006/main" xmlns:r="http://schemas.openxmlformats.org/officeDocument/2006/relationships" xmlns:p="http://schemas.openxmlformats.org/presentationml/2006/main" showMasterSp="1" showMasterPhAnim="1">
+<p:sld xmlns:a="http://schemas.openxmlformats.org/drawingml/2006/main" xmlns:r="http://schemas.openxmlformats.org/officeDocument/2006/relationships" xmlns:p="http://schemas.openxmlformats.org/presentationml/2006/main">
   <p:cSld>
     <p:spTree>
       <p:nvGrpSpPr>
@@ -10049,7 +10181,9 @@
       <p:sp>
         <p:nvSpPr>
           <p:cNvPr id="139" name="Shape 139"/>
-          <p:cNvSpPr/>
+          <p:cNvSpPr>
+            <a:spLocks noGrp="1"/>
+          </p:cNvSpPr>
           <p:nvPr>
             <p:ph type="title"/>
           </p:nvPr>
@@ -10064,14 +10198,15 @@
           </a:prstGeom>
         </p:spPr>
         <p:txBody>
-          <a:bodyPr/>
+          <a:bodyPr>
+            <a:normAutofit fontScale="90000"/>
+          </a:bodyPr>
           <a:lstStyle>
             <a:lvl1pPr defTabSz="420624">
               <a:defRPr sz="5760"/>
             </a:lvl1pPr>
           </a:lstStyle>
           <a:p>
-            <a:pPr/>
             <a:r>
               <a:t>Get ready !</a:t>
             </a:r>
@@ -10087,7 +10222,7 @@
         <p:spPr>
           <a:xfrm>
             <a:off x="584200" y="1924050"/>
-            <a:ext cx="10557663" cy="647700"/>
+            <a:ext cx="12105878" cy="656590"/>
           </a:xfrm>
           <a:prstGeom prst="rect">
             <a:avLst/>
@@ -10109,16 +10244,22 @@
           <a:p>
             <a:pPr algn="l"/>
             <a:r>
-              <a:t>Kita akan menggunakan </a:t>
-            </a:r>
-            <a:r>
-              <a:rPr u="sng">
-                <a:hlinkClick r:id="rId2" invalidUrl="" action="" tgtFrame="" tooltip="" history="1" highlightClick="0" endSnd="0"/>
-              </a:rPr>
-              <a:t>brackets.io</a:t>
-            </a:r>
-            <a:r>
-              <a:t> sebagai editor</a:t>
+              <a:t>Kita akan </a:t>
+            </a:r>
+            <a:r>
+              <a:rPr/>
+              <a:t>menggunakan </a:t>
+            </a:r>
+            <a:r>
+              <a:rPr lang="en-US" u="sng" smtClean="0"/>
+              <a:t>visual studio code</a:t>
+            </a:r>
+            <a:r>
+              <a:rPr smtClean="0"/>
+              <a:t> </a:t>
+            </a:r>
+            <a:r>
+              <a:t>sebagai editor</a:t>
             </a:r>
           </a:p>
         </p:txBody>
@@ -10152,7 +10293,6 @@
           </a:bodyPr>
           <a:lstStyle/>
           <a:p>
-            <a:pPr/>
             <a:r>
               <a:t>Buat folder latih-javascript</a:t>
             </a:r>
@@ -10188,7 +10328,6 @@
           </a:bodyPr>
           <a:lstStyle/>
           <a:p>
-            <a:pPr/>
             <a:r>
               <a:t>Buka dengan brackets</a:t>
             </a:r>
@@ -10224,7 +10363,6 @@
           </a:bodyPr>
           <a:lstStyle/>
           <a:p>
-            <a:pPr/>
             <a:r>
               <a:t>Buat file index.html</a:t>
             </a:r>
@@ -10260,7 +10398,6 @@
           </a:bodyPr>
           <a:lstStyle/>
           <a:p>
-            <a:pPr/>
             <a:r>
               <a:t>Membuat Hello world ! dengan inline js dan external js</a:t>
             </a:r>
@@ -10272,12 +10409,19 @@
   <p:clrMapOvr>
     <a:masterClrMapping/>
   </p:clrMapOvr>
-  <p:transition xmlns:p14="http://schemas.microsoft.com/office/powerpoint/2010/main" spd="med" advClick="1" p14:dur="1000"/>
+  <p:transition spd="slow"/>
+  <p:timing>
+    <p:tnLst>
+      <p:par>
+        <p:cTn id="1" dur="indefinite" restart="never" nodeType="tmRoot"/>
+      </p:par>
+    </p:tnLst>
+  </p:timing>
 </p:sld>
 </file>
 
 <file path=ppt/slides/slide7.xml><?xml version="1.0" encoding="utf-8"?>
-<p:sld xmlns:a="http://schemas.openxmlformats.org/drawingml/2006/main" xmlns:r="http://schemas.openxmlformats.org/officeDocument/2006/relationships" xmlns:p="http://schemas.openxmlformats.org/presentationml/2006/main" showMasterSp="1" showMasterPhAnim="1">
+<p:sld xmlns:a="http://schemas.openxmlformats.org/drawingml/2006/main" xmlns:r="http://schemas.openxmlformats.org/officeDocument/2006/relationships" xmlns:p="http://schemas.openxmlformats.org/presentationml/2006/main">
   <p:cSld>
     <p:spTree>
       <p:nvGrpSpPr>
@@ -10296,7 +10440,9 @@
       <p:sp>
         <p:nvSpPr>
           <p:cNvPr id="146" name="Shape 146"/>
-          <p:cNvSpPr/>
+          <p:cNvSpPr>
+            <a:spLocks noGrp="1"/>
+          </p:cNvSpPr>
           <p:nvPr>
             <p:ph type="title"/>
           </p:nvPr>
@@ -10318,7 +10464,6 @@
             </a:lvl1pPr>
           </a:lstStyle>
           <a:p>
-            <a:pPr/>
             <a:r>
               <a:t>Variable</a:t>
             </a:r>
@@ -10359,12 +10504,19 @@
   <p:clrMapOvr>
     <a:masterClrMapping/>
   </p:clrMapOvr>
-  <p:transition xmlns:p14="http://schemas.microsoft.com/office/powerpoint/2010/main" spd="med" advClick="1" p14:dur="1000"/>
+  <p:transition spd="slow"/>
+  <p:timing>
+    <p:tnLst>
+      <p:par>
+        <p:cTn id="1" dur="indefinite" restart="never" nodeType="tmRoot"/>
+      </p:par>
+    </p:tnLst>
+  </p:timing>
 </p:sld>
 </file>
 
 <file path=ppt/slides/slide8.xml><?xml version="1.0" encoding="utf-8"?>
-<p:sld xmlns:a="http://schemas.openxmlformats.org/drawingml/2006/main" xmlns:r="http://schemas.openxmlformats.org/officeDocument/2006/relationships" xmlns:p="http://schemas.openxmlformats.org/presentationml/2006/main" showMasterSp="1" showMasterPhAnim="1">
+<p:sld xmlns:a="http://schemas.openxmlformats.org/drawingml/2006/main" xmlns:r="http://schemas.openxmlformats.org/officeDocument/2006/relationships" xmlns:p="http://schemas.openxmlformats.org/presentationml/2006/main">
   <p:cSld>
     <p:spTree>
       <p:nvGrpSpPr>
@@ -10384,7 +10536,7 @@
         <p:nvPicPr>
           <p:cNvPr id="149" name="varibale2.png"/>
           <p:cNvPicPr>
-            <a:picLocks noChangeAspect="1"/>
+            <a:picLocks noGrp="1" noChangeAspect="1"/>
           </p:cNvPicPr>
           <p:nvPr>
             <p:ph type="pic" idx="13"/>
@@ -10394,7 +10546,7 @@
           <a:blip r:embed="rId2">
             <a:extLst/>
           </a:blip>
-          <a:srcRect l="0" t="0" r="0" b="0"/>
+          <a:srcRect/>
           <a:stretch>
             <a:fillRect/>
           </a:stretch>
@@ -10414,12 +10566,19 @@
   <p:clrMapOvr>
     <a:masterClrMapping/>
   </p:clrMapOvr>
-  <p:transition xmlns:p14="http://schemas.microsoft.com/office/powerpoint/2010/main" spd="med" advClick="1" p14:dur="1000"/>
+  <p:transition spd="slow"/>
+  <p:timing>
+    <p:tnLst>
+      <p:par>
+        <p:cTn id="1" dur="indefinite" restart="never" nodeType="tmRoot"/>
+      </p:par>
+    </p:tnLst>
+  </p:timing>
 </p:sld>
 </file>
 
 <file path=ppt/slides/slide9.xml><?xml version="1.0" encoding="utf-8"?>
-<p:sld xmlns:a="http://schemas.openxmlformats.org/drawingml/2006/main" xmlns:r="http://schemas.openxmlformats.org/officeDocument/2006/relationships" xmlns:p="http://schemas.openxmlformats.org/presentationml/2006/main" showMasterSp="1" showMasterPhAnim="1">
+<p:sld xmlns:a="http://schemas.openxmlformats.org/drawingml/2006/main" xmlns:r="http://schemas.openxmlformats.org/officeDocument/2006/relationships" xmlns:p="http://schemas.openxmlformats.org/presentationml/2006/main">
   <p:cSld>
     <p:spTree>
       <p:nvGrpSpPr>
@@ -10469,12 +10628,12 @@
   <p:clrMapOvr>
     <a:masterClrMapping/>
   </p:clrMapOvr>
-  <p:transition xmlns:p14="http://schemas.microsoft.com/office/powerpoint/2010/main" spd="med" advClick="1" p14:dur="1000"/>
+  <p:transition spd="slow"/>
 </p:sld>
 </file>
 
 <file path=ppt/theme/theme1.xml><?xml version="1.0" encoding="utf-8"?>
-<a:theme xmlns:a="http://schemas.openxmlformats.org/drawingml/2006/main" xmlns:r="http://schemas.openxmlformats.org/officeDocument/2006/relationships" name="White">
+<a:theme xmlns:a="http://schemas.openxmlformats.org/drawingml/2006/main" name="White">
   <a:themeElements>
     <a:clrScheme name="White">
       <a:dk1>
@@ -10600,7 +10759,7 @@
       <a:effectStyleLst>
         <a:effectStyle>
           <a:effectLst>
-            <a:outerShdw sx="100000" sy="100000" kx="0" ky="0" algn="b" rotWithShape="0" blurRad="38100" dist="25400" dir="5400000">
+            <a:outerShdw blurRad="38100" dist="25400" dir="5400000" rotWithShape="0">
               <a:srgbClr val="000000">
                 <a:alpha val="50000"/>
               </a:srgbClr>
@@ -10609,7 +10768,7 @@
         </a:effectStyle>
         <a:effectStyle>
           <a:effectLst>
-            <a:outerShdw sx="100000" sy="100000" kx="0" ky="0" algn="b" rotWithShape="0" blurRad="50800" dist="12700" dir="0">
+            <a:outerShdw blurRad="50800" dist="12700" rotWithShape="0">
               <a:srgbClr val="000000">
                 <a:alpha val="50000"/>
               </a:srgbClr>
@@ -10618,7 +10777,7 @@
         </a:effectStyle>
         <a:effectStyle>
           <a:effectLst>
-            <a:outerShdw sx="100000" sy="100000" kx="0" ky="0" algn="b" rotWithShape="0" blurRad="38100" dist="25400" dir="5400000">
+            <a:outerShdw blurRad="38100" dist="25400" dir="5400000" rotWithShape="0">
               <a:srgbClr val="000000">
                 <a:alpha val="50000"/>
               </a:srgbClr>
@@ -10682,8 +10841,8 @@
     <a:spDef>
       <a:spPr>
         <a:blipFill rotWithShape="1">
-          <a:blip r:embed="rId1"/>
-          <a:srcRect l="0" t="0" r="0" b="0"/>
+          <a:blip xmlns:r="http://schemas.openxmlformats.org/officeDocument/2006/relationships" r:embed="rId1"/>
+          <a:srcRect/>
           <a:tile tx="0" ty="0" sx="100000" sy="100000" flip="none" algn="tl"/>
         </a:blipFill>
         <a:ln w="12700" cap="flat">
@@ -10691,7 +10850,7 @@
           <a:miter lim="400000"/>
         </a:ln>
         <a:effectLst>
-          <a:outerShdw sx="100000" sy="100000" kx="0" ky="0" algn="b" rotWithShape="0" blurRad="38100" dist="25400" dir="5400000">
+          <a:outerShdw blurRad="38100" dist="25400" dir="5400000" rotWithShape="0">
             <a:srgbClr val="000000">
               <a:alpha val="50000"/>
             </a:srgbClr>
@@ -10699,7 +10858,7 @@
         </a:effectLst>
         <a:sp3d/>
       </a:spPr>
-      <a:bodyPr rot="0" spcFirstLastPara="1" vertOverflow="overflow" horzOverflow="overflow" vert="horz" wrap="square" lIns="50800" tIns="50800" rIns="50800" bIns="50800" numCol="1" spcCol="38100" rtlCol="0" anchor="ctr" upright="0">
+      <a:bodyPr rot="0" spcFirstLastPara="1" vertOverflow="overflow" horzOverflow="overflow" vert="horz" wrap="square" lIns="50800" tIns="50800" rIns="50800" bIns="50800" numCol="1" spcCol="38100" rtlCol="0" anchor="ctr">
         <a:spAutoFit/>
       </a:bodyPr>
       <a:lstStyle>
@@ -10718,7 +10877,7 @@
           <a:buFontTx/>
           <a:buNone/>
           <a:tabLst/>
-          <a:defRPr b="0" baseline="0" cap="none" i="0" spc="0" strike="noStrike" sz="2400" u="none" kumimoji="0" normalizeH="0">
+          <a:defRPr kumimoji="0" sz="2400" b="0" i="0" u="none" strike="noStrike" cap="none" spc="0" normalizeH="0" baseline="0">
             <a:ln>
               <a:noFill/>
             </a:ln>
@@ -10748,7 +10907,7 @@
           <a:buFontTx/>
           <a:buNone/>
           <a:tabLst/>
-          <a:defRPr b="0" baseline="0" cap="none" i="0" spc="0" strike="noStrike" sz="1800" u="none" kumimoji="0" normalizeH="0">
+          <a:defRPr kumimoji="0" sz="1800" b="0" i="0" u="none" strike="noStrike" cap="none" spc="0" normalizeH="0" baseline="0">
             <a:ln>
               <a:noFill/>
             </a:ln>
@@ -10774,7 +10933,7 @@
           <a:buFontTx/>
           <a:buNone/>
           <a:tabLst/>
-          <a:defRPr b="0" baseline="0" cap="none" i="0" spc="0" strike="noStrike" sz="1800" u="none" kumimoji="0" normalizeH="0">
+          <a:defRPr kumimoji="0" sz="1800" b="0" i="0" u="none" strike="noStrike" cap="none" spc="0" normalizeH="0" baseline="0">
             <a:ln>
               <a:noFill/>
             </a:ln>
@@ -10800,7 +10959,7 @@
           <a:buFontTx/>
           <a:buNone/>
           <a:tabLst/>
-          <a:defRPr b="0" baseline="0" cap="none" i="0" spc="0" strike="noStrike" sz="1800" u="none" kumimoji="0" normalizeH="0">
+          <a:defRPr kumimoji="0" sz="1800" b="0" i="0" u="none" strike="noStrike" cap="none" spc="0" normalizeH="0" baseline="0">
             <a:ln>
               <a:noFill/>
             </a:ln>
@@ -10826,7 +10985,7 @@
           <a:buFontTx/>
           <a:buNone/>
           <a:tabLst/>
-          <a:defRPr b="0" baseline="0" cap="none" i="0" spc="0" strike="noStrike" sz="1800" u="none" kumimoji="0" normalizeH="0">
+          <a:defRPr kumimoji="0" sz="1800" b="0" i="0" u="none" strike="noStrike" cap="none" spc="0" normalizeH="0" baseline="0">
             <a:ln>
               <a:noFill/>
             </a:ln>
@@ -10852,7 +11011,7 @@
           <a:buFontTx/>
           <a:buNone/>
           <a:tabLst/>
-          <a:defRPr b="0" baseline="0" cap="none" i="0" spc="0" strike="noStrike" sz="1800" u="none" kumimoji="0" normalizeH="0">
+          <a:defRPr kumimoji="0" sz="1800" b="0" i="0" u="none" strike="noStrike" cap="none" spc="0" normalizeH="0" baseline="0">
             <a:ln>
               <a:noFill/>
             </a:ln>
@@ -10878,7 +11037,7 @@
           <a:buFontTx/>
           <a:buNone/>
           <a:tabLst/>
-          <a:defRPr b="0" baseline="0" cap="none" i="0" spc="0" strike="noStrike" sz="1800" u="none" kumimoji="0" normalizeH="0">
+          <a:defRPr kumimoji="0" sz="1800" b="0" i="0" u="none" strike="noStrike" cap="none" spc="0" normalizeH="0" baseline="0">
             <a:ln>
               <a:noFill/>
             </a:ln>
@@ -10904,7 +11063,7 @@
           <a:buFontTx/>
           <a:buNone/>
           <a:tabLst/>
-          <a:defRPr b="0" baseline="0" cap="none" i="0" spc="0" strike="noStrike" sz="1800" u="none" kumimoji="0" normalizeH="0">
+          <a:defRPr kumimoji="0" sz="1800" b="0" i="0" u="none" strike="noStrike" cap="none" spc="0" normalizeH="0" baseline="0">
             <a:ln>
               <a:noFill/>
             </a:ln>
@@ -10930,7 +11089,7 @@
           <a:buFontTx/>
           <a:buNone/>
           <a:tabLst/>
-          <a:defRPr b="0" baseline="0" cap="none" i="0" spc="0" strike="noStrike" sz="1800" u="none" kumimoji="0" normalizeH="0">
+          <a:defRPr kumimoji="0" sz="1800" b="0" i="0" u="none" strike="noStrike" cap="none" spc="0" normalizeH="0" baseline="0">
             <a:ln>
               <a:noFill/>
             </a:ln>
@@ -10956,7 +11115,7 @@
           <a:buFontTx/>
           <a:buNone/>
           <a:tabLst/>
-          <a:defRPr b="0" baseline="0" cap="none" i="0" spc="0" strike="noStrike" sz="1800" u="none" kumimoji="0" normalizeH="0">
+          <a:defRPr kumimoji="0" sz="1800" b="0" i="0" u="none" strike="noStrike" cap="none" spc="0" normalizeH="0" baseline="0">
             <a:ln>
               <a:noFill/>
             </a:ln>
@@ -10969,9 +11128,15 @@
         </a:lvl9pPr>
       </a:lstStyle>
       <a:style>
-        <a:lnRef idx="0"/>
-        <a:fillRef idx="0"/>
-        <a:effectRef idx="0"/>
+        <a:lnRef idx="0">
+          <a:scrgbClr r="0" g="0" b="0"/>
+        </a:lnRef>
+        <a:fillRef idx="0">
+          <a:scrgbClr r="0" g="0" b="0"/>
+        </a:fillRef>
+        <a:effectRef idx="0">
+          <a:scrgbClr r="0" g="0" b="0"/>
+        </a:effectRef>
         <a:fontRef idx="none"/>
       </a:style>
     </a:spDef>
@@ -10988,7 +11153,7 @@
         <a:effectLst/>
         <a:sp3d/>
       </a:spPr>
-      <a:bodyPr rot="0" spcFirstLastPara="1" vertOverflow="overflow" horzOverflow="overflow" vert="horz" wrap="square" lIns="91439" tIns="45719" rIns="91439" bIns="45719" numCol="1" spcCol="38100" rtlCol="0" anchor="t" upright="0">
+      <a:bodyPr rot="0" spcFirstLastPara="1" vertOverflow="overflow" horzOverflow="overflow" vert="horz" wrap="square" lIns="91439" tIns="45719" rIns="91439" bIns="45719" numCol="1" spcCol="38100" rtlCol="0" anchor="t">
         <a:noAutofit/>
       </a:bodyPr>
       <a:lstStyle>
@@ -11007,7 +11172,7 @@
           <a:buFontTx/>
           <a:buNone/>
           <a:tabLst/>
-          <a:defRPr b="0" baseline="0" cap="none" i="0" spc="0" strike="noStrike" sz="1800" u="none" kumimoji="0" normalizeH="0">
+          <a:defRPr kumimoji="0" sz="1800" b="0" i="0" u="none" strike="noStrike" cap="none" spc="0" normalizeH="0" baseline="0">
             <a:ln>
               <a:noFill/>
             </a:ln>
@@ -11033,7 +11198,7 @@
           <a:buFontTx/>
           <a:buNone/>
           <a:tabLst/>
-          <a:defRPr b="0" baseline="0" cap="none" i="0" spc="0" strike="noStrike" sz="1800" u="none" kumimoji="0" normalizeH="0">
+          <a:defRPr kumimoji="0" sz="1800" b="0" i="0" u="none" strike="noStrike" cap="none" spc="0" normalizeH="0" baseline="0">
             <a:ln>
               <a:noFill/>
             </a:ln>
@@ -11059,7 +11224,7 @@
           <a:buFontTx/>
           <a:buNone/>
           <a:tabLst/>
-          <a:defRPr b="0" baseline="0" cap="none" i="0" spc="0" strike="noStrike" sz="1800" u="none" kumimoji="0" normalizeH="0">
+          <a:defRPr kumimoji="0" sz="1800" b="0" i="0" u="none" strike="noStrike" cap="none" spc="0" normalizeH="0" baseline="0">
             <a:ln>
               <a:noFill/>
             </a:ln>
@@ -11085,7 +11250,7 @@
           <a:buFontTx/>
           <a:buNone/>
           <a:tabLst/>
-          <a:defRPr b="0" baseline="0" cap="none" i="0" spc="0" strike="noStrike" sz="1800" u="none" kumimoji="0" normalizeH="0">
+          <a:defRPr kumimoji="0" sz="1800" b="0" i="0" u="none" strike="noStrike" cap="none" spc="0" normalizeH="0" baseline="0">
             <a:ln>
               <a:noFill/>
             </a:ln>
@@ -11111,7 +11276,7 @@
           <a:buFontTx/>
           <a:buNone/>
           <a:tabLst/>
-          <a:defRPr b="0" baseline="0" cap="none" i="0" spc="0" strike="noStrike" sz="1800" u="none" kumimoji="0" normalizeH="0">
+          <a:defRPr kumimoji="0" sz="1800" b="0" i="0" u="none" strike="noStrike" cap="none" spc="0" normalizeH="0" baseline="0">
             <a:ln>
               <a:noFill/>
             </a:ln>
@@ -11137,7 +11302,7 @@
           <a:buFontTx/>
           <a:buNone/>
           <a:tabLst/>
-          <a:defRPr b="0" baseline="0" cap="none" i="0" spc="0" strike="noStrike" sz="1800" u="none" kumimoji="0" normalizeH="0">
+          <a:defRPr kumimoji="0" sz="1800" b="0" i="0" u="none" strike="noStrike" cap="none" spc="0" normalizeH="0" baseline="0">
             <a:ln>
               <a:noFill/>
             </a:ln>
@@ -11163,7 +11328,7 @@
           <a:buFontTx/>
           <a:buNone/>
           <a:tabLst/>
-          <a:defRPr b="0" baseline="0" cap="none" i="0" spc="0" strike="noStrike" sz="1800" u="none" kumimoji="0" normalizeH="0">
+          <a:defRPr kumimoji="0" sz="1800" b="0" i="0" u="none" strike="noStrike" cap="none" spc="0" normalizeH="0" baseline="0">
             <a:ln>
               <a:noFill/>
             </a:ln>
@@ -11189,7 +11354,7 @@
           <a:buFontTx/>
           <a:buNone/>
           <a:tabLst/>
-          <a:defRPr b="0" baseline="0" cap="none" i="0" spc="0" strike="noStrike" sz="1800" u="none" kumimoji="0" normalizeH="0">
+          <a:defRPr kumimoji="0" sz="1800" b="0" i="0" u="none" strike="noStrike" cap="none" spc="0" normalizeH="0" baseline="0">
             <a:ln>
               <a:noFill/>
             </a:ln>
@@ -11215,7 +11380,7 @@
           <a:buFontTx/>
           <a:buNone/>
           <a:tabLst/>
-          <a:defRPr b="0" baseline="0" cap="none" i="0" spc="0" strike="noStrike" sz="1800" u="none" kumimoji="0" normalizeH="0">
+          <a:defRPr kumimoji="0" sz="1800" b="0" i="0" u="none" strike="noStrike" cap="none" spc="0" normalizeH="0" baseline="0">
             <a:ln>
               <a:noFill/>
             </a:ln>
@@ -11241,7 +11406,7 @@
           <a:buFontTx/>
           <a:buNone/>
           <a:tabLst/>
-          <a:defRPr b="0" baseline="0" cap="none" i="0" spc="0" strike="noStrike" sz="1800" u="none" kumimoji="0" normalizeH="0">
+          <a:defRPr kumimoji="0" sz="1800" b="0" i="0" u="none" strike="noStrike" cap="none" spc="0" normalizeH="0" baseline="0">
             <a:ln>
               <a:noFill/>
             </a:ln>
@@ -11254,9 +11419,15 @@
         </a:lvl9pPr>
       </a:lstStyle>
       <a:style>
-        <a:lnRef idx="0"/>
-        <a:fillRef idx="0"/>
-        <a:effectRef idx="0"/>
+        <a:lnRef idx="0">
+          <a:scrgbClr r="0" g="0" b="0"/>
+        </a:lnRef>
+        <a:fillRef idx="0">
+          <a:scrgbClr r="0" g="0" b="0"/>
+        </a:fillRef>
+        <a:effectRef idx="0">
+          <a:scrgbClr r="0" g="0" b="0"/>
+        </a:effectRef>
         <a:fontRef idx="none"/>
       </a:style>
     </a:lnDef>
@@ -11270,7 +11441,7 @@
         <a:effectLst/>
         <a:sp3d/>
       </a:spPr>
-      <a:bodyPr rot="0" spcFirstLastPara="1" vertOverflow="overflow" horzOverflow="overflow" vert="horz" wrap="square" lIns="50800" tIns="50800" rIns="50800" bIns="50800" numCol="1" spcCol="38100" rtlCol="0" anchor="ctr" upright="0">
+      <a:bodyPr rot="0" spcFirstLastPara="1" vertOverflow="overflow" horzOverflow="overflow" vert="horz" wrap="square" lIns="50800" tIns="50800" rIns="50800" bIns="50800" numCol="1" spcCol="38100" rtlCol="0" anchor="ctr">
         <a:spAutoFit/>
       </a:bodyPr>
       <a:lstStyle>
@@ -11289,7 +11460,7 @@
           <a:buFontTx/>
           <a:buNone/>
           <a:tabLst/>
-          <a:defRPr b="0" baseline="0" cap="none" i="0" spc="0" strike="noStrike" sz="3600" u="none" kumimoji="0" normalizeH="0">
+          <a:defRPr kumimoji="0" sz="3600" b="0" i="0" u="none" strike="noStrike" cap="none" spc="0" normalizeH="0" baseline="0">
             <a:ln>
               <a:noFill/>
             </a:ln>
@@ -11319,7 +11490,7 @@
           <a:buFontTx/>
           <a:buNone/>
           <a:tabLst/>
-          <a:defRPr b="0" baseline="0" cap="none" i="0" spc="0" strike="noStrike" sz="1800" u="none" kumimoji="0" normalizeH="0">
+          <a:defRPr kumimoji="0" sz="1800" b="0" i="0" u="none" strike="noStrike" cap="none" spc="0" normalizeH="0" baseline="0">
             <a:ln>
               <a:noFill/>
             </a:ln>
@@ -11345,7 +11516,7 @@
           <a:buFontTx/>
           <a:buNone/>
           <a:tabLst/>
-          <a:defRPr b="0" baseline="0" cap="none" i="0" spc="0" strike="noStrike" sz="1800" u="none" kumimoji="0" normalizeH="0">
+          <a:defRPr kumimoji="0" sz="1800" b="0" i="0" u="none" strike="noStrike" cap="none" spc="0" normalizeH="0" baseline="0">
             <a:ln>
               <a:noFill/>
             </a:ln>
@@ -11371,7 +11542,7 @@
           <a:buFontTx/>
           <a:buNone/>
           <a:tabLst/>
-          <a:defRPr b="0" baseline="0" cap="none" i="0" spc="0" strike="noStrike" sz="1800" u="none" kumimoji="0" normalizeH="0">
+          <a:defRPr kumimoji="0" sz="1800" b="0" i="0" u="none" strike="noStrike" cap="none" spc="0" normalizeH="0" baseline="0">
             <a:ln>
               <a:noFill/>
             </a:ln>
@@ -11397,7 +11568,7 @@
           <a:buFontTx/>
           <a:buNone/>
           <a:tabLst/>
-          <a:defRPr b="0" baseline="0" cap="none" i="0" spc="0" strike="noStrike" sz="1800" u="none" kumimoji="0" normalizeH="0">
+          <a:defRPr kumimoji="0" sz="1800" b="0" i="0" u="none" strike="noStrike" cap="none" spc="0" normalizeH="0" baseline="0">
             <a:ln>
               <a:noFill/>
             </a:ln>
@@ -11423,7 +11594,7 @@
           <a:buFontTx/>
           <a:buNone/>
           <a:tabLst/>
-          <a:defRPr b="0" baseline="0" cap="none" i="0" spc="0" strike="noStrike" sz="1800" u="none" kumimoji="0" normalizeH="0">
+          <a:defRPr kumimoji="0" sz="1800" b="0" i="0" u="none" strike="noStrike" cap="none" spc="0" normalizeH="0" baseline="0">
             <a:ln>
               <a:noFill/>
             </a:ln>
@@ -11449,7 +11620,7 @@
           <a:buFontTx/>
           <a:buNone/>
           <a:tabLst/>
-          <a:defRPr b="0" baseline="0" cap="none" i="0" spc="0" strike="noStrike" sz="1800" u="none" kumimoji="0" normalizeH="0">
+          <a:defRPr kumimoji="0" sz="1800" b="0" i="0" u="none" strike="noStrike" cap="none" spc="0" normalizeH="0" baseline="0">
             <a:ln>
               <a:noFill/>
             </a:ln>
@@ -11475,7 +11646,7 @@
           <a:buFontTx/>
           <a:buNone/>
           <a:tabLst/>
-          <a:defRPr b="0" baseline="0" cap="none" i="0" spc="0" strike="noStrike" sz="1800" u="none" kumimoji="0" normalizeH="0">
+          <a:defRPr kumimoji="0" sz="1800" b="0" i="0" u="none" strike="noStrike" cap="none" spc="0" normalizeH="0" baseline="0">
             <a:ln>
               <a:noFill/>
             </a:ln>
@@ -11501,7 +11672,7 @@
           <a:buFontTx/>
           <a:buNone/>
           <a:tabLst/>
-          <a:defRPr b="0" baseline="0" cap="none" i="0" spc="0" strike="noStrike" sz="1800" u="none" kumimoji="0" normalizeH="0">
+          <a:defRPr kumimoji="0" sz="1800" b="0" i="0" u="none" strike="noStrike" cap="none" spc="0" normalizeH="0" baseline="0">
             <a:ln>
               <a:noFill/>
             </a:ln>
@@ -11527,7 +11698,7 @@
           <a:buFontTx/>
           <a:buNone/>
           <a:tabLst/>
-          <a:defRPr b="0" baseline="0" cap="none" i="0" spc="0" strike="noStrike" sz="1800" u="none" kumimoji="0" normalizeH="0">
+          <a:defRPr kumimoji="0" sz="1800" b="0" i="0" u="none" strike="noStrike" cap="none" spc="0" normalizeH="0" baseline="0">
             <a:ln>
               <a:noFill/>
             </a:ln>
@@ -11540,18 +11711,25 @@
         </a:lvl9pPr>
       </a:lstStyle>
       <a:style>
-        <a:lnRef idx="0"/>
-        <a:fillRef idx="0"/>
-        <a:effectRef idx="0"/>
+        <a:lnRef idx="0">
+          <a:scrgbClr r="0" g="0" b="0"/>
+        </a:lnRef>
+        <a:fillRef idx="0">
+          <a:scrgbClr r="0" g="0" b="0"/>
+        </a:fillRef>
+        <a:effectRef idx="0">
+          <a:scrgbClr r="0" g="0" b="0"/>
+        </a:effectRef>
         <a:fontRef idx="none"/>
       </a:style>
     </a:txDef>
   </a:objectDefaults>
+  <a:extraClrSchemeLst/>
 </a:theme>
 </file>
 
 <file path=ppt/theme/theme2.xml><?xml version="1.0" encoding="utf-8"?>
-<a:theme xmlns:a="http://schemas.openxmlformats.org/drawingml/2006/main" xmlns:r="http://schemas.openxmlformats.org/officeDocument/2006/relationships" name="White">
+<a:theme xmlns:a="http://schemas.openxmlformats.org/drawingml/2006/main" name="White">
   <a:themeElements>
     <a:clrScheme name="White">
       <a:dk1>
@@ -11677,7 +11855,7 @@
       <a:effectStyleLst>
         <a:effectStyle>
           <a:effectLst>
-            <a:outerShdw sx="100000" sy="100000" kx="0" ky="0" algn="b" rotWithShape="0" blurRad="38100" dist="25400" dir="5400000">
+            <a:outerShdw blurRad="38100" dist="25400" dir="5400000" rotWithShape="0">
               <a:srgbClr val="000000">
                 <a:alpha val="50000"/>
               </a:srgbClr>
@@ -11686,7 +11864,7 @@
         </a:effectStyle>
         <a:effectStyle>
           <a:effectLst>
-            <a:outerShdw sx="100000" sy="100000" kx="0" ky="0" algn="b" rotWithShape="0" blurRad="50800" dist="12700" dir="0">
+            <a:outerShdw blurRad="50800" dist="12700" rotWithShape="0">
               <a:srgbClr val="000000">
                 <a:alpha val="50000"/>
               </a:srgbClr>
@@ -11695,7 +11873,7 @@
         </a:effectStyle>
         <a:effectStyle>
           <a:effectLst>
-            <a:outerShdw sx="100000" sy="100000" kx="0" ky="0" algn="b" rotWithShape="0" blurRad="38100" dist="25400" dir="5400000">
+            <a:outerShdw blurRad="38100" dist="25400" dir="5400000" rotWithShape="0">
               <a:srgbClr val="000000">
                 <a:alpha val="50000"/>
               </a:srgbClr>
@@ -11759,8 +11937,8 @@
     <a:spDef>
       <a:spPr>
         <a:blipFill rotWithShape="1">
-          <a:blip r:embed="rId1"/>
-          <a:srcRect l="0" t="0" r="0" b="0"/>
+          <a:blip xmlns:r="http://schemas.openxmlformats.org/officeDocument/2006/relationships" r:embed="rId1"/>
+          <a:srcRect/>
           <a:tile tx="0" ty="0" sx="100000" sy="100000" flip="none" algn="tl"/>
         </a:blipFill>
         <a:ln w="12700" cap="flat">
@@ -11768,7 +11946,7 @@
           <a:miter lim="400000"/>
         </a:ln>
         <a:effectLst>
-          <a:outerShdw sx="100000" sy="100000" kx="0" ky="0" algn="b" rotWithShape="0" blurRad="38100" dist="25400" dir="5400000">
+          <a:outerShdw blurRad="38100" dist="25400" dir="5400000" rotWithShape="0">
             <a:srgbClr val="000000">
               <a:alpha val="50000"/>
             </a:srgbClr>
@@ -11776,7 +11954,7 @@
         </a:effectLst>
         <a:sp3d/>
       </a:spPr>
-      <a:bodyPr rot="0" spcFirstLastPara="1" vertOverflow="overflow" horzOverflow="overflow" vert="horz" wrap="square" lIns="50800" tIns="50800" rIns="50800" bIns="50800" numCol="1" spcCol="38100" rtlCol="0" anchor="ctr" upright="0">
+      <a:bodyPr rot="0" spcFirstLastPara="1" vertOverflow="overflow" horzOverflow="overflow" vert="horz" wrap="square" lIns="50800" tIns="50800" rIns="50800" bIns="50800" numCol="1" spcCol="38100" rtlCol="0" anchor="ctr">
         <a:spAutoFit/>
       </a:bodyPr>
       <a:lstStyle>
@@ -11795,7 +11973,7 @@
           <a:buFontTx/>
           <a:buNone/>
           <a:tabLst/>
-          <a:defRPr b="0" baseline="0" cap="none" i="0" spc="0" strike="noStrike" sz="2400" u="none" kumimoji="0" normalizeH="0">
+          <a:defRPr kumimoji="0" sz="2400" b="0" i="0" u="none" strike="noStrike" cap="none" spc="0" normalizeH="0" baseline="0">
             <a:ln>
               <a:noFill/>
             </a:ln>
@@ -11825,7 +12003,7 @@
           <a:buFontTx/>
           <a:buNone/>
           <a:tabLst/>
-          <a:defRPr b="0" baseline="0" cap="none" i="0" spc="0" strike="noStrike" sz="1800" u="none" kumimoji="0" normalizeH="0">
+          <a:defRPr kumimoji="0" sz="1800" b="0" i="0" u="none" strike="noStrike" cap="none" spc="0" normalizeH="0" baseline="0">
             <a:ln>
               <a:noFill/>
             </a:ln>
@@ -11851,7 +12029,7 @@
           <a:buFontTx/>
           <a:buNone/>
           <a:tabLst/>
-          <a:defRPr b="0" baseline="0" cap="none" i="0" spc="0" strike="noStrike" sz="1800" u="none" kumimoji="0" normalizeH="0">
+          <a:defRPr kumimoji="0" sz="1800" b="0" i="0" u="none" strike="noStrike" cap="none" spc="0" normalizeH="0" baseline="0">
             <a:ln>
               <a:noFill/>
             </a:ln>
@@ -11877,7 +12055,7 @@
           <a:buFontTx/>
           <a:buNone/>
           <a:tabLst/>
-          <a:defRPr b="0" baseline="0" cap="none" i="0" spc="0" strike="noStrike" sz="1800" u="none" kumimoji="0" normalizeH="0">
+          <a:defRPr kumimoji="0" sz="1800" b="0" i="0" u="none" strike="noStrike" cap="none" spc="0" normalizeH="0" baseline="0">
             <a:ln>
               <a:noFill/>
             </a:ln>
@@ -11903,7 +12081,7 @@
           <a:buFontTx/>
           <a:buNone/>
           <a:tabLst/>
-          <a:defRPr b="0" baseline="0" cap="none" i="0" spc="0" strike="noStrike" sz="1800" u="none" kumimoji="0" normalizeH="0">
+          <a:defRPr kumimoji="0" sz="1800" b="0" i="0" u="none" strike="noStrike" cap="none" spc="0" normalizeH="0" baseline="0">
             <a:ln>
               <a:noFill/>
             </a:ln>
@@ -11929,7 +12107,7 @@
           <a:buFontTx/>
           <a:buNone/>
           <a:tabLst/>
-          <a:defRPr b="0" baseline="0" cap="none" i="0" spc="0" strike="noStrike" sz="1800" u="none" kumimoji="0" normalizeH="0">
+          <a:defRPr kumimoji="0" sz="1800" b="0" i="0" u="none" strike="noStrike" cap="none" spc="0" normalizeH="0" baseline="0">
             <a:ln>
               <a:noFill/>
             </a:ln>
@@ -11955,7 +12133,7 @@
           <a:buFontTx/>
           <a:buNone/>
           <a:tabLst/>
-          <a:defRPr b="0" baseline="0" cap="none" i="0" spc="0" strike="noStrike" sz="1800" u="none" kumimoji="0" normalizeH="0">
+          <a:defRPr kumimoji="0" sz="1800" b="0" i="0" u="none" strike="noStrike" cap="none" spc="0" normalizeH="0" baseline="0">
             <a:ln>
               <a:noFill/>
             </a:ln>
@@ -11981,7 +12159,7 @@
           <a:buFontTx/>
           <a:buNone/>
           <a:tabLst/>
-          <a:defRPr b="0" baseline="0" cap="none" i="0" spc="0" strike="noStrike" sz="1800" u="none" kumimoji="0" normalizeH="0">
+          <a:defRPr kumimoji="0" sz="1800" b="0" i="0" u="none" strike="noStrike" cap="none" spc="0" normalizeH="0" baseline="0">
             <a:ln>
               <a:noFill/>
             </a:ln>
@@ -12007,7 +12185,7 @@
           <a:buFontTx/>
           <a:buNone/>
           <a:tabLst/>
-          <a:defRPr b="0" baseline="0" cap="none" i="0" spc="0" strike="noStrike" sz="1800" u="none" kumimoji="0" normalizeH="0">
+          <a:defRPr kumimoji="0" sz="1800" b="0" i="0" u="none" strike="noStrike" cap="none" spc="0" normalizeH="0" baseline="0">
             <a:ln>
               <a:noFill/>
             </a:ln>
@@ -12033,7 +12211,7 @@
           <a:buFontTx/>
           <a:buNone/>
           <a:tabLst/>
-          <a:defRPr b="0" baseline="0" cap="none" i="0" spc="0" strike="noStrike" sz="1800" u="none" kumimoji="0" normalizeH="0">
+          <a:defRPr kumimoji="0" sz="1800" b="0" i="0" u="none" strike="noStrike" cap="none" spc="0" normalizeH="0" baseline="0">
             <a:ln>
               <a:noFill/>
             </a:ln>
@@ -12046,9 +12224,15 @@
         </a:lvl9pPr>
       </a:lstStyle>
       <a:style>
-        <a:lnRef idx="0"/>
-        <a:fillRef idx="0"/>
-        <a:effectRef idx="0"/>
+        <a:lnRef idx="0">
+          <a:scrgbClr r="0" g="0" b="0"/>
+        </a:lnRef>
+        <a:fillRef idx="0">
+          <a:scrgbClr r="0" g="0" b="0"/>
+        </a:fillRef>
+        <a:effectRef idx="0">
+          <a:scrgbClr r="0" g="0" b="0"/>
+        </a:effectRef>
         <a:fontRef idx="none"/>
       </a:style>
     </a:spDef>
@@ -12065,7 +12249,7 @@
         <a:effectLst/>
         <a:sp3d/>
       </a:spPr>
-      <a:bodyPr rot="0" spcFirstLastPara="1" vertOverflow="overflow" horzOverflow="overflow" vert="horz" wrap="square" lIns="91439" tIns="45719" rIns="91439" bIns="45719" numCol="1" spcCol="38100" rtlCol="0" anchor="t" upright="0">
+      <a:bodyPr rot="0" spcFirstLastPara="1" vertOverflow="overflow" horzOverflow="overflow" vert="horz" wrap="square" lIns="91439" tIns="45719" rIns="91439" bIns="45719" numCol="1" spcCol="38100" rtlCol="0" anchor="t">
         <a:noAutofit/>
       </a:bodyPr>
       <a:lstStyle>
@@ -12084,7 +12268,7 @@
           <a:buFontTx/>
           <a:buNone/>
           <a:tabLst/>
-          <a:defRPr b="0" baseline="0" cap="none" i="0" spc="0" strike="noStrike" sz="1800" u="none" kumimoji="0" normalizeH="0">
+          <a:defRPr kumimoji="0" sz="1800" b="0" i="0" u="none" strike="noStrike" cap="none" spc="0" normalizeH="0" baseline="0">
             <a:ln>
               <a:noFill/>
             </a:ln>
@@ -12110,7 +12294,7 @@
           <a:buFontTx/>
           <a:buNone/>
           <a:tabLst/>
-          <a:defRPr b="0" baseline="0" cap="none" i="0" spc="0" strike="noStrike" sz="1800" u="none" kumimoji="0" normalizeH="0">
+          <a:defRPr kumimoji="0" sz="1800" b="0" i="0" u="none" strike="noStrike" cap="none" spc="0" normalizeH="0" baseline="0">
             <a:ln>
               <a:noFill/>
             </a:ln>
@@ -12136,7 +12320,7 @@
           <a:buFontTx/>
           <a:buNone/>
           <a:tabLst/>
-          <a:defRPr b="0" baseline="0" cap="none" i="0" spc="0" strike="noStrike" sz="1800" u="none" kumimoji="0" normalizeH="0">
+          <a:defRPr kumimoji="0" sz="1800" b="0" i="0" u="none" strike="noStrike" cap="none" spc="0" normalizeH="0" baseline="0">
             <a:ln>
               <a:noFill/>
             </a:ln>
@@ -12162,7 +12346,7 @@
           <a:buFontTx/>
           <a:buNone/>
           <a:tabLst/>
-          <a:defRPr b="0" baseline="0" cap="none" i="0" spc="0" strike="noStrike" sz="1800" u="none" kumimoji="0" normalizeH="0">
+          <a:defRPr kumimoji="0" sz="1800" b="0" i="0" u="none" strike="noStrike" cap="none" spc="0" normalizeH="0" baseline="0">
             <a:ln>
               <a:noFill/>
             </a:ln>
@@ -12188,7 +12372,7 @@
           <a:buFontTx/>
           <a:buNone/>
           <a:tabLst/>
-          <a:defRPr b="0" baseline="0" cap="none" i="0" spc="0" strike="noStrike" sz="1800" u="none" kumimoji="0" normalizeH="0">
+          <a:defRPr kumimoji="0" sz="1800" b="0" i="0" u="none" strike="noStrike" cap="none" spc="0" normalizeH="0" baseline="0">
             <a:ln>
               <a:noFill/>
             </a:ln>
@@ -12214,7 +12398,7 @@
           <a:buFontTx/>
           <a:buNone/>
           <a:tabLst/>
-          <a:defRPr b="0" baseline="0" cap="none" i="0" spc="0" strike="noStrike" sz="1800" u="none" kumimoji="0" normalizeH="0">
+          <a:defRPr kumimoji="0" sz="1800" b="0" i="0" u="none" strike="noStrike" cap="none" spc="0" normalizeH="0" baseline="0">
             <a:ln>
               <a:noFill/>
             </a:ln>
@@ -12240,7 +12424,7 @@
           <a:buFontTx/>
           <a:buNone/>
           <a:tabLst/>
-          <a:defRPr b="0" baseline="0" cap="none" i="0" spc="0" strike="noStrike" sz="1800" u="none" kumimoji="0" normalizeH="0">
+          <a:defRPr kumimoji="0" sz="1800" b="0" i="0" u="none" strike="noStrike" cap="none" spc="0" normalizeH="0" baseline="0">
             <a:ln>
               <a:noFill/>
             </a:ln>
@@ -12266,7 +12450,7 @@
           <a:buFontTx/>
           <a:buNone/>
           <a:tabLst/>
-          <a:defRPr b="0" baseline="0" cap="none" i="0" spc="0" strike="noStrike" sz="1800" u="none" kumimoji="0" normalizeH="0">
+          <a:defRPr kumimoji="0" sz="1800" b="0" i="0" u="none" strike="noStrike" cap="none" spc="0" normalizeH="0" baseline="0">
             <a:ln>
               <a:noFill/>
             </a:ln>
@@ -12292,7 +12476,7 @@
           <a:buFontTx/>
           <a:buNone/>
           <a:tabLst/>
-          <a:defRPr b="0" baseline="0" cap="none" i="0" spc="0" strike="noStrike" sz="1800" u="none" kumimoji="0" normalizeH="0">
+          <a:defRPr kumimoji="0" sz="1800" b="0" i="0" u="none" strike="noStrike" cap="none" spc="0" normalizeH="0" baseline="0">
             <a:ln>
               <a:noFill/>
             </a:ln>
@@ -12318,7 +12502,7 @@
           <a:buFontTx/>
           <a:buNone/>
           <a:tabLst/>
-          <a:defRPr b="0" baseline="0" cap="none" i="0" spc="0" strike="noStrike" sz="1800" u="none" kumimoji="0" normalizeH="0">
+          <a:defRPr kumimoji="0" sz="1800" b="0" i="0" u="none" strike="noStrike" cap="none" spc="0" normalizeH="0" baseline="0">
             <a:ln>
               <a:noFill/>
             </a:ln>
@@ -12331,9 +12515,15 @@
         </a:lvl9pPr>
       </a:lstStyle>
       <a:style>
-        <a:lnRef idx="0"/>
-        <a:fillRef idx="0"/>
-        <a:effectRef idx="0"/>
+        <a:lnRef idx="0">
+          <a:scrgbClr r="0" g="0" b="0"/>
+        </a:lnRef>
+        <a:fillRef idx="0">
+          <a:scrgbClr r="0" g="0" b="0"/>
+        </a:fillRef>
+        <a:effectRef idx="0">
+          <a:scrgbClr r="0" g="0" b="0"/>
+        </a:effectRef>
         <a:fontRef idx="none"/>
       </a:style>
     </a:lnDef>
@@ -12347,7 +12537,7 @@
         <a:effectLst/>
         <a:sp3d/>
       </a:spPr>
-      <a:bodyPr rot="0" spcFirstLastPara="1" vertOverflow="overflow" horzOverflow="overflow" vert="horz" wrap="square" lIns="50800" tIns="50800" rIns="50800" bIns="50800" numCol="1" spcCol="38100" rtlCol="0" anchor="ctr" upright="0">
+      <a:bodyPr rot="0" spcFirstLastPara="1" vertOverflow="overflow" horzOverflow="overflow" vert="horz" wrap="square" lIns="50800" tIns="50800" rIns="50800" bIns="50800" numCol="1" spcCol="38100" rtlCol="0" anchor="ctr">
         <a:spAutoFit/>
       </a:bodyPr>
       <a:lstStyle>
@@ -12366,7 +12556,7 @@
           <a:buFontTx/>
           <a:buNone/>
           <a:tabLst/>
-          <a:defRPr b="0" baseline="0" cap="none" i="0" spc="0" strike="noStrike" sz="3600" u="none" kumimoji="0" normalizeH="0">
+          <a:defRPr kumimoji="0" sz="3600" b="0" i="0" u="none" strike="noStrike" cap="none" spc="0" normalizeH="0" baseline="0">
             <a:ln>
               <a:noFill/>
             </a:ln>
@@ -12396,7 +12586,7 @@
           <a:buFontTx/>
           <a:buNone/>
           <a:tabLst/>
-          <a:defRPr b="0" baseline="0" cap="none" i="0" spc="0" strike="noStrike" sz="1800" u="none" kumimoji="0" normalizeH="0">
+          <a:defRPr kumimoji="0" sz="1800" b="0" i="0" u="none" strike="noStrike" cap="none" spc="0" normalizeH="0" baseline="0">
             <a:ln>
               <a:noFill/>
             </a:ln>
@@ -12422,7 +12612,7 @@
           <a:buFontTx/>
           <a:buNone/>
           <a:tabLst/>
-          <a:defRPr b="0" baseline="0" cap="none" i="0" spc="0" strike="noStrike" sz="1800" u="none" kumimoji="0" normalizeH="0">
+          <a:defRPr kumimoji="0" sz="1800" b="0" i="0" u="none" strike="noStrike" cap="none" spc="0" normalizeH="0" baseline="0">
             <a:ln>
               <a:noFill/>
             </a:ln>
@@ -12448,7 +12638,7 @@
           <a:buFontTx/>
           <a:buNone/>
           <a:tabLst/>
-          <a:defRPr b="0" baseline="0" cap="none" i="0" spc="0" strike="noStrike" sz="1800" u="none" kumimoji="0" normalizeH="0">
+          <a:defRPr kumimoji="0" sz="1800" b="0" i="0" u="none" strike="noStrike" cap="none" spc="0" normalizeH="0" baseline="0">
             <a:ln>
               <a:noFill/>
             </a:ln>
@@ -12474,7 +12664,7 @@
           <a:buFontTx/>
           <a:buNone/>
           <a:tabLst/>
-          <a:defRPr b="0" baseline="0" cap="none" i="0" spc="0" strike="noStrike" sz="1800" u="none" kumimoji="0" normalizeH="0">
+          <a:defRPr kumimoji="0" sz="1800" b="0" i="0" u="none" strike="noStrike" cap="none" spc="0" normalizeH="0" baseline="0">
             <a:ln>
               <a:noFill/>
             </a:ln>
@@ -12500,7 +12690,7 @@
           <a:buFontTx/>
           <a:buNone/>
           <a:tabLst/>
-          <a:defRPr b="0" baseline="0" cap="none" i="0" spc="0" strike="noStrike" sz="1800" u="none" kumimoji="0" normalizeH="0">
+          <a:defRPr kumimoji="0" sz="1800" b="0" i="0" u="none" strike="noStrike" cap="none" spc="0" normalizeH="0" baseline="0">
             <a:ln>
               <a:noFill/>
             </a:ln>
@@ -12526,7 +12716,7 @@
           <a:buFontTx/>
           <a:buNone/>
           <a:tabLst/>
-          <a:defRPr b="0" baseline="0" cap="none" i="0" spc="0" strike="noStrike" sz="1800" u="none" kumimoji="0" normalizeH="0">
+          <a:defRPr kumimoji="0" sz="1800" b="0" i="0" u="none" strike="noStrike" cap="none" spc="0" normalizeH="0" baseline="0">
             <a:ln>
               <a:noFill/>
             </a:ln>
@@ -12552,7 +12742,7 @@
           <a:buFontTx/>
           <a:buNone/>
           <a:tabLst/>
-          <a:defRPr b="0" baseline="0" cap="none" i="0" spc="0" strike="noStrike" sz="1800" u="none" kumimoji="0" normalizeH="0">
+          <a:defRPr kumimoji="0" sz="1800" b="0" i="0" u="none" strike="noStrike" cap="none" spc="0" normalizeH="0" baseline="0">
             <a:ln>
               <a:noFill/>
             </a:ln>
@@ -12578,7 +12768,7 @@
           <a:buFontTx/>
           <a:buNone/>
           <a:tabLst/>
-          <a:defRPr b="0" baseline="0" cap="none" i="0" spc="0" strike="noStrike" sz="1800" u="none" kumimoji="0" normalizeH="0">
+          <a:defRPr kumimoji="0" sz="1800" b="0" i="0" u="none" strike="noStrike" cap="none" spc="0" normalizeH="0" baseline="0">
             <a:ln>
               <a:noFill/>
             </a:ln>
@@ -12604,7 +12794,7 @@
           <a:buFontTx/>
           <a:buNone/>
           <a:tabLst/>
-          <a:defRPr b="0" baseline="0" cap="none" i="0" spc="0" strike="noStrike" sz="1800" u="none" kumimoji="0" normalizeH="0">
+          <a:defRPr kumimoji="0" sz="1800" b="0" i="0" u="none" strike="noStrike" cap="none" spc="0" normalizeH="0" baseline="0">
             <a:ln>
               <a:noFill/>
             </a:ln>
@@ -12617,12 +12807,19 @@
         </a:lvl9pPr>
       </a:lstStyle>
       <a:style>
-        <a:lnRef idx="0"/>
-        <a:fillRef idx="0"/>
-        <a:effectRef idx="0"/>
+        <a:lnRef idx="0">
+          <a:scrgbClr r="0" g="0" b="0"/>
+        </a:lnRef>
+        <a:fillRef idx="0">
+          <a:scrgbClr r="0" g="0" b="0"/>
+        </a:fillRef>
+        <a:effectRef idx="0">
+          <a:scrgbClr r="0" g="0" b="0"/>
+        </a:effectRef>
         <a:fontRef idx="none"/>
       </a:style>
     </a:txDef>
   </a:objectDefaults>
+  <a:extraClrSchemeLst/>
 </a:theme>
 </file>
</xml_diff>